<commit_message>
modify: vue vs react ppt modified
</commit_message>
<xml_diff>
--- a/ppt/Vue_React.pptx
+++ b/ppt/Vue_React.pptx
@@ -11,7 +11,10 @@
     <p:sldId id="259" r:id="rId5"/>
     <p:sldId id="260" r:id="rId6"/>
     <p:sldId id="261" r:id="rId7"/>
-    <p:sldId id="262" r:id="rId8"/>
+    <p:sldId id="265" r:id="rId8"/>
+    <p:sldId id="262" r:id="rId9"/>
+    <p:sldId id="266" r:id="rId10"/>
+    <p:sldId id="267" r:id="rId11"/>
   </p:sldIdLst>
   <p:sldSz cx="12192000" cy="6858000"/>
   <p:notesSz cx="6858000" cy="9144000"/>
@@ -272,7 +275,7 @@
                 </a:solidFill>
               </a:rPr>
               <a:pPr/>
-              <a:t>2021-04-12</a:t>
+              <a:t>2021-04-13</a:t>
             </a:fld>
             <a:endParaRPr lang="ko-KR" altLang="en-US">
               <a:solidFill>
@@ -502,7 +505,7 @@
                 </a:solidFill>
               </a:rPr>
               <a:pPr/>
-              <a:t>2021-04-12</a:t>
+              <a:t>2021-04-13</a:t>
             </a:fld>
             <a:endParaRPr lang="ko-KR" altLang="en-US">
               <a:solidFill>
@@ -742,7 +745,7 @@
                 </a:solidFill>
               </a:rPr>
               <a:pPr/>
-              <a:t>2021-04-12</a:t>
+              <a:t>2021-04-13</a:t>
             </a:fld>
             <a:endParaRPr lang="ko-KR" altLang="en-US">
               <a:solidFill>
@@ -972,7 +975,7 @@
                 </a:solidFill>
               </a:rPr>
               <a:pPr/>
-              <a:t>2021-04-12</a:t>
+              <a:t>2021-04-13</a:t>
             </a:fld>
             <a:endParaRPr lang="ko-KR" altLang="en-US">
               <a:solidFill>
@@ -1279,7 +1282,7 @@
                 </a:solidFill>
               </a:rPr>
               <a:pPr/>
-              <a:t>2021-04-12</a:t>
+              <a:t>2021-04-13</a:t>
             </a:fld>
             <a:endParaRPr lang="ko-KR" altLang="en-US">
               <a:solidFill>
@@ -1576,7 +1579,7 @@
                 </a:solidFill>
               </a:rPr>
               <a:pPr/>
-              <a:t>2021-04-12</a:t>
+              <a:t>2021-04-13</a:t>
             </a:fld>
             <a:endParaRPr lang="ko-KR" altLang="en-US">
               <a:solidFill>
@@ -2020,7 +2023,7 @@
                 </a:solidFill>
               </a:rPr>
               <a:pPr/>
-              <a:t>2021-04-12</a:t>
+              <a:t>2021-04-13</a:t>
             </a:fld>
             <a:endParaRPr lang="ko-KR" altLang="en-US">
               <a:solidFill>
@@ -2193,7 +2196,7 @@
                 </a:solidFill>
               </a:rPr>
               <a:pPr/>
-              <a:t>2021-04-12</a:t>
+              <a:t>2021-04-13</a:t>
             </a:fld>
             <a:endParaRPr lang="ko-KR" altLang="en-US">
               <a:solidFill>
@@ -2338,7 +2341,7 @@
                 </a:solidFill>
               </a:rPr>
               <a:pPr/>
-              <a:t>2021-04-12</a:t>
+              <a:t>2021-04-13</a:t>
             </a:fld>
             <a:endParaRPr lang="ko-KR" altLang="en-US">
               <a:solidFill>
@@ -2681,7 +2684,7 @@
                 </a:solidFill>
               </a:rPr>
               <a:pPr/>
-              <a:t>2021-04-12</a:t>
+              <a:t>2021-04-13</a:t>
             </a:fld>
             <a:endParaRPr lang="ko-KR" altLang="en-US">
               <a:solidFill>
@@ -3001,7 +3004,7 @@
                 </a:solidFill>
               </a:rPr>
               <a:pPr/>
-              <a:t>2021-04-12</a:t>
+              <a:t>2021-04-13</a:t>
             </a:fld>
             <a:endParaRPr lang="ko-KR" altLang="en-US">
               <a:solidFill>
@@ -3274,7 +3277,7 @@
                 </a:solidFill>
               </a:rPr>
               <a:pPr/>
-              <a:t>2021-04-12</a:t>
+              <a:t>2021-04-13</a:t>
             </a:fld>
             <a:endParaRPr lang="ko-KR" altLang="en-US">
               <a:solidFill>
@@ -4673,7 +4676,7 @@
 </p:sld>
 </file>
 
-<file path=ppt/slides/slide2.xml><?xml version="1.0" encoding="utf-8"?>
+<file path=ppt/slides/slide10.xml><?xml version="1.0" encoding="utf-8"?>
 <p:sld xmlns:a="http://schemas.openxmlformats.org/drawingml/2006/main" xmlns:r="http://schemas.openxmlformats.org/officeDocument/2006/relationships" xmlns:p="http://schemas.openxmlformats.org/presentationml/2006/main">
   <p:cSld>
     <p:spTree>
@@ -4813,10 +4816,6 @@
           <a:lstStyle/>
           <a:p>
             <a:pPr algn="ctr"/>
-            <a:r>
-              <a:rPr lang="en-US" altLang="ko-KR" b="1"/>
-              <a:t>React vs Vue</a:t>
-            </a:r>
             <a:endParaRPr lang="ko-KR" altLang="en-US">
               <a:solidFill>
                 <a:prstClr val="white"/>
@@ -4950,7 +4949,7 @@
                   <a:prstClr val="white"/>
                 </a:solidFill>
               </a:rPr>
-              <a:t>특징 비교</a:t>
+              <a:t>향후 계획</a:t>
             </a:r>
           </a:p>
         </p:txBody>
@@ -5370,7 +5369,7 @@
                   <a:prstClr val="white"/>
                 </a:solidFill>
               </a:rPr>
-              <a:t>01</a:t>
+              <a:t>05</a:t>
             </a:r>
             <a:endParaRPr lang="ko-KR" altLang="en-US" b="1" dirty="0">
               <a:solidFill>
@@ -5382,10 +5381,10 @@
       </p:sp>
       <p:sp>
         <p:nvSpPr>
-          <p:cNvPr id="27" name="TextBox 26">
+          <p:cNvPr id="25" name="TextBox 24">
             <a:extLst>
               <a:ext uri="{FF2B5EF4-FFF2-40B4-BE49-F238E27FC236}">
-                <a16:creationId xmlns:a16="http://schemas.microsoft.com/office/drawing/2014/main" id="{1A3EC2C7-D220-4AA3-96B1-75C2B5352421}"/>
+                <a16:creationId xmlns:a16="http://schemas.microsoft.com/office/drawing/2014/main" id="{1D3A90C7-6F27-4CAF-9CE0-CB06EFD813A0}"/>
               </a:ext>
             </a:extLst>
           </p:cNvPr>
@@ -5394,77 +5393,8 @@
         </p:nvSpPr>
         <p:spPr>
           <a:xfrm>
-            <a:off x="1847555" y="1326164"/>
-            <a:ext cx="2945162" cy="523220"/>
-          </a:xfrm>
-          <a:prstGeom prst="rect">
-            <a:avLst/>
-          </a:prstGeom>
-          <a:noFill/>
-        </p:spPr>
-        <p:txBody>
-          <a:bodyPr wrap="square" rtlCol="0">
-            <a:spAutoFit/>
-          </a:bodyPr>
-          <a:lstStyle/>
-          <a:p>
-            <a:r>
-              <a:rPr lang="en-US" altLang="ko-KR" sz="2800" b="1" dirty="0"/>
-              <a:t>React</a:t>
-            </a:r>
-            <a:r>
-              <a:rPr lang="ko-KR" altLang="en-US" sz="2800" b="1" dirty="0"/>
-              <a:t> 특징</a:t>
-            </a:r>
-          </a:p>
-        </p:txBody>
-      </p:sp>
-      <p:pic>
-        <p:nvPicPr>
-          <p:cNvPr id="29" name="그림 28">
-            <a:extLst>
-              <a:ext uri="{FF2B5EF4-FFF2-40B4-BE49-F238E27FC236}">
-                <a16:creationId xmlns:a16="http://schemas.microsoft.com/office/drawing/2014/main" id="{EB78762D-ABA6-4955-A7EA-4AB65BFB968C}"/>
-              </a:ext>
-            </a:extLst>
-          </p:cNvPr>
-          <p:cNvPicPr>
-            <a:picLocks noChangeAspect="1"/>
-          </p:cNvPicPr>
-          <p:nvPr/>
-        </p:nvPicPr>
-        <p:blipFill>
-          <a:blip r:embed="rId2"/>
-          <a:stretch>
-            <a:fillRect/>
-          </a:stretch>
-        </p:blipFill>
-        <p:spPr>
-          <a:xfrm>
-            <a:off x="696673" y="1390310"/>
-            <a:ext cx="933450" cy="333375"/>
-          </a:xfrm>
-          <a:prstGeom prst="rect">
-            <a:avLst/>
-          </a:prstGeom>
-        </p:spPr>
-      </p:pic>
-      <p:sp>
-        <p:nvSpPr>
-          <p:cNvPr id="30" name="TextBox 29">
-            <a:extLst>
-              <a:ext uri="{FF2B5EF4-FFF2-40B4-BE49-F238E27FC236}">
-                <a16:creationId xmlns:a16="http://schemas.microsoft.com/office/drawing/2014/main" id="{4716607E-61DC-4ADF-833E-DD44B75A65E3}"/>
-              </a:ext>
-            </a:extLst>
-          </p:cNvPr>
-          <p:cNvSpPr txBox="1"/>
-          <p:nvPr/>
-        </p:nvSpPr>
-        <p:spPr>
-          <a:xfrm>
-            <a:off x="1630123" y="2092779"/>
-            <a:ext cx="7769412" cy="2790957"/>
+            <a:off x="1188820" y="2101543"/>
+            <a:ext cx="10077341" cy="1128963"/>
           </a:xfrm>
           <a:prstGeom prst="rect">
             <a:avLst/>
@@ -5492,7 +5422,7 @@
                   </a:schemeClr>
                 </a:solidFill>
               </a:rPr>
-              <a:t>JSX </a:t>
+              <a:t>React</a:t>
             </a:r>
             <a:r>
               <a:rPr lang="ko-KR" altLang="en-US" sz="2400" b="1" dirty="0">
@@ -5502,16 +5432,132 @@
                   </a:schemeClr>
                 </a:solidFill>
               </a:rPr>
-              <a:t>기반 컴포넌트 구문</a:t>
-            </a:r>
-            <a:endParaRPr lang="en-US" altLang="ko-KR" sz="2400" b="1" dirty="0">
-              <a:solidFill>
-                <a:schemeClr val="bg2">
-                  <a:lumMod val="25000"/>
-                </a:schemeClr>
-              </a:solidFill>
-            </a:endParaRPr>
-          </a:p>
+              <a:t>의 넓은 커뮤니티의 장점이 </a:t>
+            </a:r>
+            <a:r>
+              <a:rPr lang="en-US" altLang="ko-KR" sz="2400" b="1" dirty="0">
+                <a:solidFill>
+                  <a:schemeClr val="bg2">
+                    <a:lumMod val="25000"/>
+                  </a:schemeClr>
+                </a:solidFill>
+              </a:rPr>
+              <a:t>Vue</a:t>
+            </a:r>
+            <a:r>
+              <a:rPr lang="ko-KR" altLang="en-US" sz="2400" b="1" dirty="0">
+                <a:solidFill>
+                  <a:schemeClr val="bg2">
+                    <a:lumMod val="25000"/>
+                  </a:schemeClr>
+                </a:solidFill>
+              </a:rPr>
+              <a:t>의 장점들을 </a:t>
+            </a:r>
+            <a:r>
+              <a:rPr lang="en-US" altLang="ko-KR" sz="2400" b="1" dirty="0">
+                <a:solidFill>
+                  <a:schemeClr val="bg2">
+                    <a:lumMod val="25000"/>
+                  </a:schemeClr>
+                </a:solidFill>
+              </a:rPr>
+              <a:t>cover</a:t>
+            </a:r>
+            <a:r>
+              <a:rPr lang="ko-KR" altLang="en-US" sz="2400" b="1" dirty="0">
+                <a:solidFill>
+                  <a:schemeClr val="bg2">
+                    <a:lumMod val="25000"/>
+                  </a:schemeClr>
+                </a:solidFill>
+              </a:rPr>
+              <a:t>할 수 있을 것 인가</a:t>
+            </a:r>
+            <a:r>
+              <a:rPr lang="en-US" altLang="ko-KR" sz="2400" b="1" dirty="0">
+                <a:solidFill>
+                  <a:schemeClr val="bg2">
+                    <a:lumMod val="25000"/>
+                  </a:schemeClr>
+                </a:solidFill>
+              </a:rPr>
+              <a:t>?</a:t>
+            </a:r>
+          </a:p>
+        </p:txBody>
+      </p:sp>
+      <p:sp>
+        <p:nvSpPr>
+          <p:cNvPr id="26" name="TextBox 25">
+            <a:extLst>
+              <a:ext uri="{FF2B5EF4-FFF2-40B4-BE49-F238E27FC236}">
+                <a16:creationId xmlns:a16="http://schemas.microsoft.com/office/drawing/2014/main" id="{99F1A16B-C332-41FF-9935-CCDD67A00B5F}"/>
+              </a:ext>
+            </a:extLst>
+          </p:cNvPr>
+          <p:cNvSpPr txBox="1"/>
+          <p:nvPr/>
+        </p:nvSpPr>
+        <p:spPr>
+          <a:xfrm>
+            <a:off x="901060" y="1586833"/>
+            <a:ext cx="6330250" cy="523220"/>
+          </a:xfrm>
+          <a:prstGeom prst="rect">
+            <a:avLst/>
+          </a:prstGeom>
+          <a:noFill/>
+        </p:spPr>
+        <p:txBody>
+          <a:bodyPr wrap="square" rtlCol="0">
+            <a:spAutoFit/>
+          </a:bodyPr>
+          <a:lstStyle/>
+          <a:p>
+            <a:r>
+              <a:rPr lang="en-US" altLang="ko-KR" sz="2800" b="1" dirty="0"/>
+              <a:t>1. Vue</a:t>
+            </a:r>
+            <a:r>
+              <a:rPr lang="ko-KR" altLang="en-US" sz="2800" b="1" dirty="0"/>
+              <a:t>보다는 </a:t>
+            </a:r>
+            <a:r>
+              <a:rPr lang="en-US" altLang="ko-KR" sz="2800" b="1" dirty="0"/>
+              <a:t>React?</a:t>
+            </a:r>
+            <a:endParaRPr lang="ko-KR" altLang="en-US" sz="2800" b="1" dirty="0"/>
+          </a:p>
+        </p:txBody>
+      </p:sp>
+      <p:sp>
+        <p:nvSpPr>
+          <p:cNvPr id="12" name="TextBox 11">
+            <a:extLst>
+              <a:ext uri="{FF2B5EF4-FFF2-40B4-BE49-F238E27FC236}">
+                <a16:creationId xmlns:a16="http://schemas.microsoft.com/office/drawing/2014/main" id="{046FF2AA-0ABC-48EC-BA50-7D55DBFAD866}"/>
+              </a:ext>
+            </a:extLst>
+          </p:cNvPr>
+          <p:cNvSpPr txBox="1"/>
+          <p:nvPr/>
+        </p:nvSpPr>
+        <p:spPr>
+          <a:xfrm>
+            <a:off x="1188820" y="4076280"/>
+            <a:ext cx="10195041" cy="1128963"/>
+          </a:xfrm>
+          <a:prstGeom prst="rect">
+            <a:avLst/>
+          </a:prstGeom>
+          <a:noFill/>
+        </p:spPr>
+        <p:txBody>
+          <a:bodyPr wrap="square" rtlCol="0">
+            <a:spAutoFit/>
+          </a:bodyPr>
+          <a:lstStyle/>
           <a:p>
             <a:pPr marL="342900" indent="-342900">
               <a:lnSpc>
@@ -5521,6 +5567,16 @@
               <a:buChar char="-"/>
             </a:pPr>
             <a:r>
+              <a:rPr lang="en-US" altLang="ko-KR" sz="2400" b="1" dirty="0">
+                <a:solidFill>
+                  <a:schemeClr val="bg2">
+                    <a:lumMod val="25000"/>
+                  </a:schemeClr>
+                </a:solidFill>
+              </a:rPr>
+              <a:t>Vue</a:t>
+            </a:r>
+            <a:r>
               <a:rPr lang="ko-KR" altLang="en-US" sz="2400" b="1" dirty="0">
                 <a:solidFill>
                   <a:schemeClr val="bg2">
@@ -5528,24 +5584,8 @@
                   </a:schemeClr>
                 </a:solidFill>
               </a:rPr>
-              <a:t>대규모 서비스 운영에 적합</a:t>
-            </a:r>
-            <a:endParaRPr lang="en-US" altLang="ko-KR" sz="2400" b="1" dirty="0">
-              <a:solidFill>
-                <a:schemeClr val="bg2">
-                  <a:lumMod val="25000"/>
-                </a:schemeClr>
-              </a:solidFill>
-            </a:endParaRPr>
-          </a:p>
-          <a:p>
-            <a:pPr marL="342900" indent="-342900">
-              <a:lnSpc>
-                <a:spcPct val="150000"/>
-              </a:lnSpc>
-              <a:buFontTx/>
-              <a:buChar char="-"/>
-            </a:pPr>
+              <a:t>를</a:t>
+            </a:r>
             <a:r>
               <a:rPr lang="en-US" altLang="ko-KR" sz="2400" b="1" dirty="0">
                 <a:solidFill>
@@ -5554,7 +5594,7 @@
                   </a:schemeClr>
                 </a:solidFill>
               </a:rPr>
-              <a:t>Web</a:t>
+              <a:t> </a:t>
             </a:r>
             <a:r>
               <a:rPr lang="ko-KR" altLang="en-US" sz="2400" b="1" dirty="0">
@@ -5564,7 +5604,7 @@
                   </a:schemeClr>
                 </a:solidFill>
               </a:rPr>
-              <a:t>과 </a:t>
+              <a:t>회사 표준 </a:t>
             </a:r>
             <a:r>
               <a:rPr lang="en-US" altLang="ko-KR" sz="2400" b="1" dirty="0">
@@ -5574,7 +5614,7 @@
                   </a:schemeClr>
                 </a:solidFill>
               </a:rPr>
-              <a:t>React native</a:t>
+              <a:t>FE Framework</a:t>
             </a:r>
             <a:r>
               <a:rPr lang="ko-KR" altLang="en-US" sz="2400" b="1" dirty="0">
@@ -5584,64 +5624,69 @@
                   </a:schemeClr>
                 </a:solidFill>
               </a:rPr>
-              <a:t>로 앱 개발에 모두 사용 가능</a:t>
-            </a:r>
-            <a:endParaRPr lang="en-US" altLang="ko-KR" sz="2400" b="1" dirty="0">
-              <a:solidFill>
-                <a:schemeClr val="bg2">
-                  <a:lumMod val="25000"/>
-                </a:schemeClr>
-              </a:solidFill>
-            </a:endParaRPr>
-          </a:p>
-          <a:p>
-            <a:pPr marL="342900" indent="-342900">
-              <a:lnSpc>
-                <a:spcPct val="150000"/>
-              </a:lnSpc>
-              <a:buFontTx/>
-              <a:buChar char="-"/>
-            </a:pPr>
-            <a:r>
-              <a:rPr lang="ko-KR" altLang="en-US" sz="2400" b="1" dirty="0">
+              <a:t>로 채택한 상황에서 다른 팀과의 협업에 문제가 없는가</a:t>
+            </a:r>
+            <a:r>
+              <a:rPr lang="en-US" altLang="ko-KR" sz="2400" b="1" dirty="0">
                 <a:solidFill>
                   <a:schemeClr val="bg2">
                     <a:lumMod val="25000"/>
                   </a:schemeClr>
                 </a:solidFill>
               </a:rPr>
-              <a:t>더 큰 개발자 생태계에서 오는 많은 레퍼런스</a:t>
-            </a:r>
-            <a:endParaRPr lang="en-US" altLang="ko-KR" sz="2400" b="1" dirty="0">
-              <a:solidFill>
-                <a:schemeClr val="bg2">
-                  <a:lumMod val="25000"/>
-                </a:schemeClr>
-              </a:solidFill>
-            </a:endParaRPr>
-          </a:p>
-          <a:p>
-            <a:pPr marL="342900" indent="-342900">
-              <a:lnSpc>
-                <a:spcPct val="150000"/>
-              </a:lnSpc>
-              <a:buFontTx/>
-              <a:buChar char="-"/>
-            </a:pPr>
-            <a:endParaRPr lang="ko-KR" altLang="en-US" sz="2400" b="1" dirty="0">
-              <a:solidFill>
-                <a:schemeClr val="bg2">
-                  <a:lumMod val="25000"/>
-                </a:schemeClr>
-              </a:solidFill>
-            </a:endParaRPr>
+              <a:t>?</a:t>
+            </a:r>
+          </a:p>
+        </p:txBody>
+      </p:sp>
+      <p:sp>
+        <p:nvSpPr>
+          <p:cNvPr id="13" name="TextBox 12">
+            <a:extLst>
+              <a:ext uri="{FF2B5EF4-FFF2-40B4-BE49-F238E27FC236}">
+                <a16:creationId xmlns:a16="http://schemas.microsoft.com/office/drawing/2014/main" id="{0F19FE6A-2AE0-47E7-AEE3-F695065E6F37}"/>
+              </a:ext>
+            </a:extLst>
+          </p:cNvPr>
+          <p:cNvSpPr txBox="1"/>
+          <p:nvPr/>
+        </p:nvSpPr>
+        <p:spPr>
+          <a:xfrm>
+            <a:off x="901060" y="3561570"/>
+            <a:ext cx="6330250" cy="523220"/>
+          </a:xfrm>
+          <a:prstGeom prst="rect">
+            <a:avLst/>
+          </a:prstGeom>
+          <a:noFill/>
+        </p:spPr>
+        <p:txBody>
+          <a:bodyPr wrap="square" rtlCol="0">
+            <a:spAutoFit/>
+          </a:bodyPr>
+          <a:lstStyle/>
+          <a:p>
+            <a:r>
+              <a:rPr lang="en-US" altLang="ko-KR" sz="2800" b="1" dirty="0"/>
+              <a:t>2. </a:t>
+            </a:r>
+            <a:r>
+              <a:rPr lang="ko-KR" altLang="en-US" sz="2800" b="1" dirty="0"/>
+              <a:t>회사 표준 </a:t>
+            </a:r>
+            <a:r>
+              <a:rPr lang="en-US" altLang="ko-KR" sz="2800" b="1" dirty="0"/>
+              <a:t>Framework?</a:t>
+            </a:r>
+            <a:endParaRPr lang="ko-KR" altLang="en-US" sz="2800" b="1" dirty="0"/>
           </a:p>
         </p:txBody>
       </p:sp>
     </p:spTree>
     <p:extLst>
       <p:ext uri="{BB962C8B-B14F-4D97-AF65-F5344CB8AC3E}">
-        <p14:creationId xmlns:p14="http://schemas.microsoft.com/office/powerpoint/2010/main" val="1452777616"/>
+        <p14:creationId xmlns:p14="http://schemas.microsoft.com/office/powerpoint/2010/main" val="2240602901"/>
       </p:ext>
     </p:extLst>
   </p:cSld>
@@ -5651,7 +5696,7 @@
 </p:sld>
 </file>
 
-<file path=ppt/slides/slide3.xml><?xml version="1.0" encoding="utf-8"?>
+<file path=ppt/slides/slide2.xml><?xml version="1.0" encoding="utf-8"?>
 <p:sld xmlns:a="http://schemas.openxmlformats.org/drawingml/2006/main" xmlns:r="http://schemas.openxmlformats.org/officeDocument/2006/relationships" xmlns:p="http://schemas.openxmlformats.org/presentationml/2006/main">
   <p:cSld>
     <p:spTree>
@@ -6388,7 +6433,7 @@
           <a:p>
             <a:r>
               <a:rPr lang="en-US" altLang="ko-KR" sz="2800" b="1" dirty="0"/>
-              <a:t>Vue</a:t>
+              <a:t>React</a:t>
             </a:r>
             <a:r>
               <a:rPr lang="ko-KR" altLang="en-US" sz="2800" b="1" dirty="0"/>
@@ -6397,6 +6442,36 @@
           </a:p>
         </p:txBody>
       </p:sp>
+      <p:pic>
+        <p:nvPicPr>
+          <p:cNvPr id="29" name="그림 28">
+            <a:extLst>
+              <a:ext uri="{FF2B5EF4-FFF2-40B4-BE49-F238E27FC236}">
+                <a16:creationId xmlns:a16="http://schemas.microsoft.com/office/drawing/2014/main" id="{EB78762D-ABA6-4955-A7EA-4AB65BFB968C}"/>
+              </a:ext>
+            </a:extLst>
+          </p:cNvPr>
+          <p:cNvPicPr>
+            <a:picLocks noChangeAspect="1"/>
+          </p:cNvPicPr>
+          <p:nvPr/>
+        </p:nvPicPr>
+        <p:blipFill>
+          <a:blip r:embed="rId2"/>
+          <a:stretch>
+            <a:fillRect/>
+          </a:stretch>
+        </p:blipFill>
+        <p:spPr>
+          <a:xfrm>
+            <a:off x="696673" y="1390310"/>
+            <a:ext cx="933450" cy="333375"/>
+          </a:xfrm>
+          <a:prstGeom prst="rect">
+            <a:avLst/>
+          </a:prstGeom>
+        </p:spPr>
+      </p:pic>
       <p:sp>
         <p:nvSpPr>
           <p:cNvPr id="30" name="TextBox 29">
@@ -6435,12 +6510,18 @@
             <a:r>
               <a:rPr lang="en-US" altLang="ko-KR" sz="2400" b="1" dirty="0">
                 <a:solidFill>
-                  <a:schemeClr val="bg2">
-                    <a:lumMod val="25000"/>
-                  </a:schemeClr>
+                  <a:srgbClr val="FF0000"/>
                 </a:solidFill>
               </a:rPr>
-              <a:t>HTML</a:t>
+              <a:t>JSX </a:t>
+            </a:r>
+            <a:r>
+              <a:rPr lang="ko-KR" altLang="en-US" sz="2400" b="1" dirty="0">
+                <a:solidFill>
+                  <a:srgbClr val="FF0000"/>
+                </a:solidFill>
+              </a:rPr>
+              <a:t>기반 컴포넌트</a:t>
             </a:r>
             <a:r>
               <a:rPr lang="ko-KR" altLang="en-US" sz="2400" b="1" dirty="0">
@@ -6450,7 +6531,7 @@
                   </a:schemeClr>
                 </a:solidFill>
               </a:rPr>
-              <a:t> 기반 템플릿 구문</a:t>
+              <a:t> 구문</a:t>
             </a:r>
             <a:endParaRPr lang="en-US" altLang="ko-KR" sz="2400" b="1" dirty="0">
               <a:solidFill>
@@ -6476,7 +6557,7 @@
                   </a:schemeClr>
                 </a:solidFill>
               </a:rPr>
-              <a:t>단일 파일 컴포넌트</a:t>
+              <a:t>대규모 서비스 운영</a:t>
             </a:r>
             <a:r>
               <a:rPr lang="en-US" altLang="ko-KR" sz="2400" b="1" dirty="0">
@@ -6486,7 +6567,7 @@
                   </a:schemeClr>
                 </a:solidFill>
               </a:rPr>
-              <a:t>(Single</a:t>
+              <a:t>(</a:t>
             </a:r>
             <a:r>
               <a:rPr lang="ko-KR" altLang="en-US" sz="2400" b="1" dirty="0">
@@ -6496,7 +6577,7 @@
                   </a:schemeClr>
                 </a:solidFill>
               </a:rPr>
-              <a:t> </a:t>
+              <a:t>역할 분리</a:t>
             </a:r>
             <a:r>
               <a:rPr lang="en-US" altLang="ko-KR" sz="2400" b="1" dirty="0">
@@ -6506,7 +6587,7 @@
                   </a:schemeClr>
                 </a:solidFill>
               </a:rPr>
-              <a:t>File</a:t>
+              <a:t>)</a:t>
             </a:r>
             <a:r>
               <a:rPr lang="ko-KR" altLang="en-US" sz="2400" b="1" dirty="0">
@@ -6516,8 +6597,24 @@
                   </a:schemeClr>
                 </a:solidFill>
               </a:rPr>
-              <a:t> </a:t>
-            </a:r>
+              <a:t>에 적합</a:t>
+            </a:r>
+            <a:endParaRPr lang="en-US" altLang="ko-KR" sz="2400" b="1" dirty="0">
+              <a:solidFill>
+                <a:schemeClr val="bg2">
+                  <a:lumMod val="25000"/>
+                </a:schemeClr>
+              </a:solidFill>
+            </a:endParaRPr>
+          </a:p>
+          <a:p>
+            <a:pPr marL="342900" indent="-342900">
+              <a:lnSpc>
+                <a:spcPct val="150000"/>
+              </a:lnSpc>
+              <a:buFontTx/>
+              <a:buChar char="-"/>
+            </a:pPr>
             <a:r>
               <a:rPr lang="en-US" altLang="ko-KR" sz="2400" b="1" dirty="0">
                 <a:solidFill>
@@ -6526,8 +6623,945 @@
                   </a:schemeClr>
                 </a:solidFill>
               </a:rPr>
-              <a:t>Component)</a:t>
-            </a:r>
+              <a:t>Web</a:t>
+            </a:r>
+            <a:r>
+              <a:rPr lang="ko-KR" altLang="en-US" sz="2400" b="1" dirty="0">
+                <a:solidFill>
+                  <a:schemeClr val="bg2">
+                    <a:lumMod val="25000"/>
+                  </a:schemeClr>
+                </a:solidFill>
+              </a:rPr>
+              <a:t>과 </a:t>
+            </a:r>
+            <a:r>
+              <a:rPr lang="en-US" altLang="ko-KR" sz="2400" b="1" dirty="0">
+                <a:solidFill>
+                  <a:schemeClr val="bg2">
+                    <a:lumMod val="25000"/>
+                  </a:schemeClr>
+                </a:solidFill>
+              </a:rPr>
+              <a:t>React native</a:t>
+            </a:r>
+            <a:r>
+              <a:rPr lang="ko-KR" altLang="en-US" sz="2400" b="1" dirty="0">
+                <a:solidFill>
+                  <a:schemeClr val="bg2">
+                    <a:lumMod val="25000"/>
+                  </a:schemeClr>
+                </a:solidFill>
+              </a:rPr>
+              <a:t>로 앱 개발에 모두 사용 가능</a:t>
+            </a:r>
+            <a:endParaRPr lang="en-US" altLang="ko-KR" sz="2400" b="1" dirty="0">
+              <a:solidFill>
+                <a:schemeClr val="bg2">
+                  <a:lumMod val="25000"/>
+                </a:schemeClr>
+              </a:solidFill>
+            </a:endParaRPr>
+          </a:p>
+          <a:p>
+            <a:pPr marL="342900" indent="-342900">
+              <a:lnSpc>
+                <a:spcPct val="150000"/>
+              </a:lnSpc>
+              <a:buFontTx/>
+              <a:buChar char="-"/>
+            </a:pPr>
+            <a:r>
+              <a:rPr lang="ko-KR" altLang="en-US" sz="2400" b="1" dirty="0">
+                <a:solidFill>
+                  <a:srgbClr val="FF0000"/>
+                </a:solidFill>
+              </a:rPr>
+              <a:t>더 큰 개발자 커뮤니티</a:t>
+            </a:r>
+            <a:r>
+              <a:rPr lang="ko-KR" altLang="en-US" sz="2400" b="1" dirty="0">
+                <a:solidFill>
+                  <a:schemeClr val="bg2">
+                    <a:lumMod val="25000"/>
+                  </a:schemeClr>
+                </a:solidFill>
+              </a:rPr>
+              <a:t>에서 오는 많은 레퍼런스</a:t>
+            </a:r>
+            <a:endParaRPr lang="en-US" altLang="ko-KR" sz="2400" b="1" dirty="0">
+              <a:solidFill>
+                <a:schemeClr val="bg2">
+                  <a:lumMod val="25000"/>
+                </a:schemeClr>
+              </a:solidFill>
+            </a:endParaRPr>
+          </a:p>
+          <a:p>
+            <a:pPr marL="342900" indent="-342900">
+              <a:lnSpc>
+                <a:spcPct val="150000"/>
+              </a:lnSpc>
+              <a:buFontTx/>
+              <a:buChar char="-"/>
+            </a:pPr>
+            <a:endParaRPr lang="ko-KR" altLang="en-US" sz="2400" b="1" dirty="0">
+              <a:solidFill>
+                <a:schemeClr val="bg2">
+                  <a:lumMod val="25000"/>
+                </a:schemeClr>
+              </a:solidFill>
+            </a:endParaRPr>
+          </a:p>
+        </p:txBody>
+      </p:sp>
+    </p:spTree>
+    <p:extLst>
+      <p:ext uri="{BB962C8B-B14F-4D97-AF65-F5344CB8AC3E}">
+        <p14:creationId xmlns:p14="http://schemas.microsoft.com/office/powerpoint/2010/main" val="1452777616"/>
+      </p:ext>
+    </p:extLst>
+  </p:cSld>
+  <p:clrMapOvr>
+    <a:masterClrMapping/>
+  </p:clrMapOvr>
+</p:sld>
+</file>
+
+<file path=ppt/slides/slide3.xml><?xml version="1.0" encoding="utf-8"?>
+<p:sld xmlns:a="http://schemas.openxmlformats.org/drawingml/2006/main" xmlns:r="http://schemas.openxmlformats.org/officeDocument/2006/relationships" xmlns:p="http://schemas.openxmlformats.org/presentationml/2006/main">
+  <p:cSld>
+    <p:spTree>
+      <p:nvGrpSpPr>
+        <p:cNvPr id="1" name=""/>
+        <p:cNvGrpSpPr/>
+        <p:nvPr/>
+      </p:nvGrpSpPr>
+      <p:grpSpPr>
+        <a:xfrm>
+          <a:off x="0" y="0"/>
+          <a:ext cx="0" cy="0"/>
+          <a:chOff x="0" y="0"/>
+          <a:chExt cx="0" cy="0"/>
+        </a:xfrm>
+      </p:grpSpPr>
+      <p:sp>
+        <p:nvSpPr>
+          <p:cNvPr id="15" name="모서리가 둥근 직사각형 14"/>
+          <p:cNvSpPr/>
+          <p:nvPr/>
+        </p:nvSpPr>
+        <p:spPr>
+          <a:xfrm>
+            <a:off x="297543" y="581819"/>
+            <a:ext cx="11771086" cy="6142718"/>
+          </a:xfrm>
+          <a:prstGeom prst="roundRect">
+            <a:avLst>
+              <a:gd name="adj" fmla="val 3722"/>
+            </a:avLst>
+          </a:prstGeom>
+          <a:solidFill>
+            <a:schemeClr val="tx1">
+              <a:lumMod val="75000"/>
+              <a:lumOff val="25000"/>
+            </a:schemeClr>
+          </a:solidFill>
+          <a:ln w="25400">
+            <a:solidFill>
+              <a:schemeClr val="tx1">
+                <a:lumMod val="85000"/>
+                <a:lumOff val="15000"/>
+              </a:schemeClr>
+            </a:solidFill>
+          </a:ln>
+          <a:effectLst>
+            <a:outerShdw blurRad="50800" dist="76200" dir="5400000" algn="t" rotWithShape="0">
+              <a:prstClr val="black">
+                <a:alpha val="19000"/>
+              </a:prstClr>
+            </a:outerShdw>
+          </a:effectLst>
+        </p:spPr>
+        <p:style>
+          <a:lnRef idx="2">
+            <a:schemeClr val="accent1">
+              <a:shade val="50000"/>
+            </a:schemeClr>
+          </a:lnRef>
+          <a:fillRef idx="1">
+            <a:schemeClr val="accent1"/>
+          </a:fillRef>
+          <a:effectRef idx="0">
+            <a:schemeClr val="accent1"/>
+          </a:effectRef>
+          <a:fontRef idx="minor">
+            <a:schemeClr val="lt1"/>
+          </a:fontRef>
+        </p:style>
+        <p:txBody>
+          <a:bodyPr rtlCol="0" anchor="ctr"/>
+          <a:lstStyle/>
+          <a:p>
+            <a:pPr algn="ctr"/>
+            <a:endParaRPr lang="ko-KR" altLang="en-US">
+              <a:solidFill>
+                <a:prstClr val="white"/>
+              </a:solidFill>
+            </a:endParaRPr>
+          </a:p>
+        </p:txBody>
+      </p:sp>
+      <p:sp>
+        <p:nvSpPr>
+          <p:cNvPr id="8" name="모서리가 둥근 직사각형 7"/>
+          <p:cNvSpPr/>
+          <p:nvPr/>
+        </p:nvSpPr>
+        <p:spPr>
+          <a:xfrm>
+            <a:off x="246743" y="504825"/>
+            <a:ext cx="11771086" cy="6142718"/>
+          </a:xfrm>
+          <a:prstGeom prst="roundRect">
+            <a:avLst>
+              <a:gd name="adj" fmla="val 3722"/>
+            </a:avLst>
+          </a:prstGeom>
+          <a:solidFill>
+            <a:schemeClr val="bg1"/>
+          </a:solidFill>
+          <a:ln w="25400">
+            <a:solidFill>
+              <a:schemeClr val="tx1">
+                <a:lumMod val="85000"/>
+                <a:lumOff val="15000"/>
+              </a:schemeClr>
+            </a:solidFill>
+          </a:ln>
+          <a:effectLst>
+            <a:outerShdw blurRad="50800" dist="76200" dir="5400000" algn="t" rotWithShape="0">
+              <a:prstClr val="black">
+                <a:alpha val="19000"/>
+              </a:prstClr>
+            </a:outerShdw>
+          </a:effectLst>
+        </p:spPr>
+        <p:style>
+          <a:lnRef idx="2">
+            <a:schemeClr val="accent1">
+              <a:shade val="50000"/>
+            </a:schemeClr>
+          </a:lnRef>
+          <a:fillRef idx="1">
+            <a:schemeClr val="accent1"/>
+          </a:fillRef>
+          <a:effectRef idx="0">
+            <a:schemeClr val="accent1"/>
+          </a:effectRef>
+          <a:fontRef idx="minor">
+            <a:schemeClr val="lt1"/>
+          </a:fontRef>
+        </p:style>
+        <p:txBody>
+          <a:bodyPr rtlCol="0" anchor="ctr"/>
+          <a:lstStyle/>
+          <a:p>
+            <a:pPr algn="ctr"/>
+            <a:r>
+              <a:rPr lang="en-US" altLang="ko-KR" b="1"/>
+              <a:t>React vs Vue</a:t>
+            </a:r>
+            <a:endParaRPr lang="ko-KR" altLang="en-US">
+              <a:solidFill>
+                <a:prstClr val="white"/>
+              </a:solidFill>
+            </a:endParaRPr>
+          </a:p>
+        </p:txBody>
+      </p:sp>
+      <p:sp>
+        <p:nvSpPr>
+          <p:cNvPr id="14" name="모서리가 둥근 직사각형 13"/>
+          <p:cNvSpPr/>
+          <p:nvPr/>
+        </p:nvSpPr>
+        <p:spPr>
+          <a:xfrm>
+            <a:off x="1407402" y="192881"/>
+            <a:ext cx="3558297" cy="677069"/>
+          </a:xfrm>
+          <a:prstGeom prst="roundRect">
+            <a:avLst/>
+          </a:prstGeom>
+          <a:solidFill>
+            <a:schemeClr val="bg1"/>
+          </a:solidFill>
+          <a:ln w="25400">
+            <a:solidFill>
+              <a:schemeClr val="tx1">
+                <a:lumMod val="85000"/>
+                <a:lumOff val="15000"/>
+              </a:schemeClr>
+            </a:solidFill>
+          </a:ln>
+          <a:effectLst>
+            <a:outerShdw blurRad="50800" dist="76200" dir="5400000" algn="t" rotWithShape="0">
+              <a:prstClr val="black">
+                <a:alpha val="19000"/>
+              </a:prstClr>
+            </a:outerShdw>
+          </a:effectLst>
+        </p:spPr>
+        <p:style>
+          <a:lnRef idx="2">
+            <a:schemeClr val="accent1">
+              <a:shade val="50000"/>
+            </a:schemeClr>
+          </a:lnRef>
+          <a:fillRef idx="1">
+            <a:schemeClr val="accent1"/>
+          </a:fillRef>
+          <a:effectRef idx="0">
+            <a:schemeClr val="accent1"/>
+          </a:effectRef>
+          <a:fontRef idx="minor">
+            <a:schemeClr val="lt1"/>
+          </a:fontRef>
+        </p:style>
+        <p:txBody>
+          <a:bodyPr rtlCol="0" anchor="ctr"/>
+          <a:lstStyle/>
+          <a:p>
+            <a:pPr algn="ctr"/>
+            <a:endParaRPr lang="ko-KR" altLang="en-US" sz="1600" dirty="0">
+              <a:solidFill>
+                <a:prstClr val="white"/>
+              </a:solidFill>
+            </a:endParaRPr>
+          </a:p>
+        </p:txBody>
+      </p:sp>
+      <p:sp>
+        <p:nvSpPr>
+          <p:cNvPr id="9" name="모서리가 둥근 직사각형 8"/>
+          <p:cNvSpPr/>
+          <p:nvPr/>
+        </p:nvSpPr>
+        <p:spPr>
+          <a:xfrm>
+            <a:off x="1356600" y="135731"/>
+            <a:ext cx="3551949" cy="677069"/>
+          </a:xfrm>
+          <a:prstGeom prst="roundRect">
+            <a:avLst/>
+          </a:prstGeom>
+          <a:solidFill>
+            <a:schemeClr val="tx1">
+              <a:lumMod val="75000"/>
+              <a:lumOff val="25000"/>
+            </a:schemeClr>
+          </a:solidFill>
+          <a:ln w="25400">
+            <a:solidFill>
+              <a:schemeClr val="tx1">
+                <a:lumMod val="85000"/>
+                <a:lumOff val="15000"/>
+              </a:schemeClr>
+            </a:solidFill>
+          </a:ln>
+          <a:effectLst>
+            <a:outerShdw blurRad="50800" dist="76200" dir="5400000" algn="t" rotWithShape="0">
+              <a:prstClr val="black">
+                <a:alpha val="19000"/>
+              </a:prstClr>
+            </a:outerShdw>
+          </a:effectLst>
+        </p:spPr>
+        <p:style>
+          <a:lnRef idx="2">
+            <a:schemeClr val="accent1">
+              <a:shade val="50000"/>
+            </a:schemeClr>
+          </a:lnRef>
+          <a:fillRef idx="1">
+            <a:schemeClr val="accent1"/>
+          </a:fillRef>
+          <a:effectRef idx="0">
+            <a:schemeClr val="accent1"/>
+          </a:effectRef>
+          <a:fontRef idx="minor">
+            <a:schemeClr val="lt1"/>
+          </a:fontRef>
+        </p:style>
+        <p:txBody>
+          <a:bodyPr rtlCol="0" anchor="ctr"/>
+          <a:lstStyle/>
+          <a:p>
+            <a:pPr algn="ctr"/>
+            <a:r>
+              <a:rPr lang="ko-KR" altLang="en-US" sz="2400" b="1" dirty="0">
+                <a:solidFill>
+                  <a:prstClr val="white"/>
+                </a:solidFill>
+              </a:rPr>
+              <a:t>특징 비교</a:t>
+            </a:r>
+          </a:p>
+        </p:txBody>
+      </p:sp>
+      <p:sp>
+        <p:nvSpPr>
+          <p:cNvPr id="17" name="자유형 16"/>
+          <p:cNvSpPr/>
+          <p:nvPr/>
+        </p:nvSpPr>
+        <p:spPr>
+          <a:xfrm>
+            <a:off x="604271" y="173831"/>
+            <a:ext cx="682479" cy="847385"/>
+          </a:xfrm>
+          <a:custGeom>
+            <a:avLst/>
+            <a:gdLst>
+              <a:gd name="connsiteX0" fmla="*/ 112847 w 682479"/>
+              <a:gd name="connsiteY0" fmla="*/ 0 h 847385"/>
+              <a:gd name="connsiteX1" fmla="*/ 569632 w 682479"/>
+              <a:gd name="connsiteY1" fmla="*/ 0 h 847385"/>
+              <a:gd name="connsiteX2" fmla="*/ 682479 w 682479"/>
+              <a:gd name="connsiteY2" fmla="*/ 112847 h 847385"/>
+              <a:gd name="connsiteX3" fmla="*/ 682479 w 682479"/>
+              <a:gd name="connsiteY3" fmla="*/ 564222 h 847385"/>
+              <a:gd name="connsiteX4" fmla="*/ 569632 w 682479"/>
+              <a:gd name="connsiteY4" fmla="*/ 677069 h 847385"/>
+              <a:gd name="connsiteX5" fmla="*/ 383870 w 682479"/>
+              <a:gd name="connsiteY5" fmla="*/ 677069 h 847385"/>
+              <a:gd name="connsiteX6" fmla="*/ 192014 w 682479"/>
+              <a:gd name="connsiteY6" fmla="*/ 847385 h 847385"/>
+              <a:gd name="connsiteX7" fmla="*/ 226964 w 682479"/>
+              <a:gd name="connsiteY7" fmla="*/ 677069 h 847385"/>
+              <a:gd name="connsiteX8" fmla="*/ 112847 w 682479"/>
+              <a:gd name="connsiteY8" fmla="*/ 677069 h 847385"/>
+              <a:gd name="connsiteX9" fmla="*/ 0 w 682479"/>
+              <a:gd name="connsiteY9" fmla="*/ 564222 h 847385"/>
+              <a:gd name="connsiteX10" fmla="*/ 0 w 682479"/>
+              <a:gd name="connsiteY10" fmla="*/ 112847 h 847385"/>
+              <a:gd name="connsiteX11" fmla="*/ 112847 w 682479"/>
+              <a:gd name="connsiteY11" fmla="*/ 0 h 847385"/>
+            </a:gdLst>
+            <a:ahLst/>
+            <a:cxnLst>
+              <a:cxn ang="0">
+                <a:pos x="connsiteX0" y="connsiteY0"/>
+              </a:cxn>
+              <a:cxn ang="0">
+                <a:pos x="connsiteX1" y="connsiteY1"/>
+              </a:cxn>
+              <a:cxn ang="0">
+                <a:pos x="connsiteX2" y="connsiteY2"/>
+              </a:cxn>
+              <a:cxn ang="0">
+                <a:pos x="connsiteX3" y="connsiteY3"/>
+              </a:cxn>
+              <a:cxn ang="0">
+                <a:pos x="connsiteX4" y="connsiteY4"/>
+              </a:cxn>
+              <a:cxn ang="0">
+                <a:pos x="connsiteX5" y="connsiteY5"/>
+              </a:cxn>
+              <a:cxn ang="0">
+                <a:pos x="connsiteX6" y="connsiteY6"/>
+              </a:cxn>
+              <a:cxn ang="0">
+                <a:pos x="connsiteX7" y="connsiteY7"/>
+              </a:cxn>
+              <a:cxn ang="0">
+                <a:pos x="connsiteX8" y="connsiteY8"/>
+              </a:cxn>
+              <a:cxn ang="0">
+                <a:pos x="connsiteX9" y="connsiteY9"/>
+              </a:cxn>
+              <a:cxn ang="0">
+                <a:pos x="connsiteX10" y="connsiteY10"/>
+              </a:cxn>
+              <a:cxn ang="0">
+                <a:pos x="connsiteX11" y="connsiteY11"/>
+              </a:cxn>
+            </a:cxnLst>
+            <a:rect l="l" t="t" r="r" b="b"/>
+            <a:pathLst>
+              <a:path w="682479" h="847385">
+                <a:moveTo>
+                  <a:pt x="112847" y="0"/>
+                </a:moveTo>
+                <a:lnTo>
+                  <a:pt x="569632" y="0"/>
+                </a:lnTo>
+                <a:cubicBezTo>
+                  <a:pt x="631956" y="0"/>
+                  <a:pt x="682479" y="50523"/>
+                  <a:pt x="682479" y="112847"/>
+                </a:cubicBezTo>
+                <a:lnTo>
+                  <a:pt x="682479" y="564222"/>
+                </a:lnTo>
+                <a:cubicBezTo>
+                  <a:pt x="682479" y="626546"/>
+                  <a:pt x="631956" y="677069"/>
+                  <a:pt x="569632" y="677069"/>
+                </a:cubicBezTo>
+                <a:lnTo>
+                  <a:pt x="383870" y="677069"/>
+                </a:lnTo>
+                <a:lnTo>
+                  <a:pt x="192014" y="847385"/>
+                </a:lnTo>
+                <a:lnTo>
+                  <a:pt x="226964" y="677069"/>
+                </a:lnTo>
+                <a:lnTo>
+                  <a:pt x="112847" y="677069"/>
+                </a:lnTo>
+                <a:cubicBezTo>
+                  <a:pt x="50523" y="677069"/>
+                  <a:pt x="0" y="626546"/>
+                  <a:pt x="0" y="564222"/>
+                </a:cubicBezTo>
+                <a:lnTo>
+                  <a:pt x="0" y="112847"/>
+                </a:lnTo>
+                <a:cubicBezTo>
+                  <a:pt x="0" y="50523"/>
+                  <a:pt x="50523" y="0"/>
+                  <a:pt x="112847" y="0"/>
+                </a:cubicBezTo>
+                <a:close/>
+              </a:path>
+            </a:pathLst>
+          </a:custGeom>
+          <a:solidFill>
+            <a:schemeClr val="bg1"/>
+          </a:solidFill>
+          <a:ln w="25400">
+            <a:solidFill>
+              <a:schemeClr val="tx1">
+                <a:lumMod val="85000"/>
+                <a:lumOff val="15000"/>
+              </a:schemeClr>
+            </a:solidFill>
+          </a:ln>
+          <a:effectLst>
+            <a:outerShdw blurRad="50800" dist="76200" dir="5400000" algn="t" rotWithShape="0">
+              <a:prstClr val="black">
+                <a:alpha val="19000"/>
+              </a:prstClr>
+            </a:outerShdw>
+          </a:effectLst>
+        </p:spPr>
+        <p:style>
+          <a:lnRef idx="2">
+            <a:schemeClr val="accent1">
+              <a:shade val="50000"/>
+            </a:schemeClr>
+          </a:lnRef>
+          <a:fillRef idx="1">
+            <a:schemeClr val="accent1"/>
+          </a:fillRef>
+          <a:effectRef idx="0">
+            <a:schemeClr val="accent1"/>
+          </a:effectRef>
+          <a:fontRef idx="minor">
+            <a:schemeClr val="lt1"/>
+          </a:fontRef>
+        </p:style>
+        <p:txBody>
+          <a:bodyPr rtlCol="0" anchor="ctr"/>
+          <a:lstStyle/>
+          <a:p>
+            <a:pPr algn="ctr"/>
+            <a:endParaRPr lang="ko-KR" altLang="en-US">
+              <a:solidFill>
+                <a:prstClr val="white"/>
+              </a:solidFill>
+            </a:endParaRPr>
+          </a:p>
+        </p:txBody>
+      </p:sp>
+      <p:sp>
+        <p:nvSpPr>
+          <p:cNvPr id="16" name="자유형 15"/>
+          <p:cNvSpPr/>
+          <p:nvPr/>
+        </p:nvSpPr>
+        <p:spPr>
+          <a:xfrm>
+            <a:off x="559821" y="135731"/>
+            <a:ext cx="682479" cy="847385"/>
+          </a:xfrm>
+          <a:custGeom>
+            <a:avLst/>
+            <a:gdLst>
+              <a:gd name="connsiteX0" fmla="*/ 112847 w 682479"/>
+              <a:gd name="connsiteY0" fmla="*/ 0 h 847385"/>
+              <a:gd name="connsiteX1" fmla="*/ 569632 w 682479"/>
+              <a:gd name="connsiteY1" fmla="*/ 0 h 847385"/>
+              <a:gd name="connsiteX2" fmla="*/ 682479 w 682479"/>
+              <a:gd name="connsiteY2" fmla="*/ 112847 h 847385"/>
+              <a:gd name="connsiteX3" fmla="*/ 682479 w 682479"/>
+              <a:gd name="connsiteY3" fmla="*/ 564222 h 847385"/>
+              <a:gd name="connsiteX4" fmla="*/ 569632 w 682479"/>
+              <a:gd name="connsiteY4" fmla="*/ 677069 h 847385"/>
+              <a:gd name="connsiteX5" fmla="*/ 383870 w 682479"/>
+              <a:gd name="connsiteY5" fmla="*/ 677069 h 847385"/>
+              <a:gd name="connsiteX6" fmla="*/ 192014 w 682479"/>
+              <a:gd name="connsiteY6" fmla="*/ 847385 h 847385"/>
+              <a:gd name="connsiteX7" fmla="*/ 226964 w 682479"/>
+              <a:gd name="connsiteY7" fmla="*/ 677069 h 847385"/>
+              <a:gd name="connsiteX8" fmla="*/ 112847 w 682479"/>
+              <a:gd name="connsiteY8" fmla="*/ 677069 h 847385"/>
+              <a:gd name="connsiteX9" fmla="*/ 0 w 682479"/>
+              <a:gd name="connsiteY9" fmla="*/ 564222 h 847385"/>
+              <a:gd name="connsiteX10" fmla="*/ 0 w 682479"/>
+              <a:gd name="connsiteY10" fmla="*/ 112847 h 847385"/>
+              <a:gd name="connsiteX11" fmla="*/ 112847 w 682479"/>
+              <a:gd name="connsiteY11" fmla="*/ 0 h 847385"/>
+            </a:gdLst>
+            <a:ahLst/>
+            <a:cxnLst>
+              <a:cxn ang="0">
+                <a:pos x="connsiteX0" y="connsiteY0"/>
+              </a:cxn>
+              <a:cxn ang="0">
+                <a:pos x="connsiteX1" y="connsiteY1"/>
+              </a:cxn>
+              <a:cxn ang="0">
+                <a:pos x="connsiteX2" y="connsiteY2"/>
+              </a:cxn>
+              <a:cxn ang="0">
+                <a:pos x="connsiteX3" y="connsiteY3"/>
+              </a:cxn>
+              <a:cxn ang="0">
+                <a:pos x="connsiteX4" y="connsiteY4"/>
+              </a:cxn>
+              <a:cxn ang="0">
+                <a:pos x="connsiteX5" y="connsiteY5"/>
+              </a:cxn>
+              <a:cxn ang="0">
+                <a:pos x="connsiteX6" y="connsiteY6"/>
+              </a:cxn>
+              <a:cxn ang="0">
+                <a:pos x="connsiteX7" y="connsiteY7"/>
+              </a:cxn>
+              <a:cxn ang="0">
+                <a:pos x="connsiteX8" y="connsiteY8"/>
+              </a:cxn>
+              <a:cxn ang="0">
+                <a:pos x="connsiteX9" y="connsiteY9"/>
+              </a:cxn>
+              <a:cxn ang="0">
+                <a:pos x="connsiteX10" y="connsiteY10"/>
+              </a:cxn>
+              <a:cxn ang="0">
+                <a:pos x="connsiteX11" y="connsiteY11"/>
+              </a:cxn>
+            </a:cxnLst>
+            <a:rect l="l" t="t" r="r" b="b"/>
+            <a:pathLst>
+              <a:path w="682479" h="847385">
+                <a:moveTo>
+                  <a:pt x="112847" y="0"/>
+                </a:moveTo>
+                <a:lnTo>
+                  <a:pt x="569632" y="0"/>
+                </a:lnTo>
+                <a:cubicBezTo>
+                  <a:pt x="631956" y="0"/>
+                  <a:pt x="682479" y="50523"/>
+                  <a:pt x="682479" y="112847"/>
+                </a:cubicBezTo>
+                <a:lnTo>
+                  <a:pt x="682479" y="564222"/>
+                </a:lnTo>
+                <a:cubicBezTo>
+                  <a:pt x="682479" y="626546"/>
+                  <a:pt x="631956" y="677069"/>
+                  <a:pt x="569632" y="677069"/>
+                </a:cubicBezTo>
+                <a:lnTo>
+                  <a:pt x="383870" y="677069"/>
+                </a:lnTo>
+                <a:lnTo>
+                  <a:pt x="192014" y="847385"/>
+                </a:lnTo>
+                <a:lnTo>
+                  <a:pt x="226964" y="677069"/>
+                </a:lnTo>
+                <a:lnTo>
+                  <a:pt x="112847" y="677069"/>
+                </a:lnTo>
+                <a:cubicBezTo>
+                  <a:pt x="50523" y="677069"/>
+                  <a:pt x="0" y="626546"/>
+                  <a:pt x="0" y="564222"/>
+                </a:cubicBezTo>
+                <a:lnTo>
+                  <a:pt x="0" y="112847"/>
+                </a:lnTo>
+                <a:cubicBezTo>
+                  <a:pt x="0" y="50523"/>
+                  <a:pt x="50523" y="0"/>
+                  <a:pt x="112847" y="0"/>
+                </a:cubicBezTo>
+                <a:close/>
+              </a:path>
+            </a:pathLst>
+          </a:custGeom>
+          <a:solidFill>
+            <a:schemeClr val="tx1">
+              <a:lumMod val="75000"/>
+              <a:lumOff val="25000"/>
+            </a:schemeClr>
+          </a:solidFill>
+          <a:ln w="25400">
+            <a:solidFill>
+              <a:schemeClr val="tx1">
+                <a:lumMod val="85000"/>
+                <a:lumOff val="15000"/>
+              </a:schemeClr>
+            </a:solidFill>
+          </a:ln>
+          <a:effectLst>
+            <a:outerShdw blurRad="50800" dist="76200" dir="5400000" algn="t" rotWithShape="0">
+              <a:prstClr val="black">
+                <a:alpha val="19000"/>
+              </a:prstClr>
+            </a:outerShdw>
+          </a:effectLst>
+        </p:spPr>
+        <p:style>
+          <a:lnRef idx="2">
+            <a:schemeClr val="accent1">
+              <a:shade val="50000"/>
+            </a:schemeClr>
+          </a:lnRef>
+          <a:fillRef idx="1">
+            <a:schemeClr val="accent1"/>
+          </a:fillRef>
+          <a:effectRef idx="0">
+            <a:schemeClr val="accent1"/>
+          </a:effectRef>
+          <a:fontRef idx="minor">
+            <a:schemeClr val="lt1"/>
+          </a:fontRef>
+        </p:style>
+        <p:txBody>
+          <a:bodyPr rtlCol="0" anchor="ctr"/>
+          <a:lstStyle/>
+          <a:p>
+            <a:pPr algn="ctr"/>
+            <a:endParaRPr lang="ko-KR" altLang="en-US">
+              <a:solidFill>
+                <a:prstClr val="white"/>
+              </a:solidFill>
+            </a:endParaRPr>
+          </a:p>
+        </p:txBody>
+      </p:sp>
+      <p:sp>
+        <p:nvSpPr>
+          <p:cNvPr id="7" name="타원 6"/>
+          <p:cNvSpPr/>
+          <p:nvPr/>
+        </p:nvSpPr>
+        <p:spPr>
+          <a:xfrm>
+            <a:off x="696673" y="269081"/>
+            <a:ext cx="414000" cy="413544"/>
+          </a:xfrm>
+          <a:prstGeom prst="ellipse">
+            <a:avLst/>
+          </a:prstGeom>
+          <a:solidFill>
+            <a:srgbClr val="FF6600"/>
+          </a:solidFill>
+          <a:ln w="9525" cmpd="sng">
+            <a:solidFill>
+              <a:schemeClr val="tx1">
+                <a:lumMod val="75000"/>
+                <a:lumOff val="25000"/>
+              </a:schemeClr>
+            </a:solidFill>
+          </a:ln>
+          <a:effectLst>
+            <a:outerShdw sx="110000" sy="110000" algn="ctr" rotWithShape="0">
+              <a:schemeClr val="bg1"/>
+            </a:outerShdw>
+          </a:effectLst>
+        </p:spPr>
+        <p:style>
+          <a:lnRef idx="2">
+            <a:schemeClr val="accent1">
+              <a:shade val="50000"/>
+            </a:schemeClr>
+          </a:lnRef>
+          <a:fillRef idx="1">
+            <a:schemeClr val="accent1"/>
+          </a:fillRef>
+          <a:effectRef idx="0">
+            <a:schemeClr val="accent1"/>
+          </a:effectRef>
+          <a:fontRef idx="minor">
+            <a:schemeClr val="lt1"/>
+          </a:fontRef>
+        </p:style>
+        <p:txBody>
+          <a:bodyPr wrap="none" rtlCol="0" anchor="ctr"/>
+          <a:lstStyle/>
+          <a:p>
+            <a:pPr algn="ctr"/>
+            <a:r>
+              <a:rPr lang="en-US" altLang="ko-KR" b="1" dirty="0">
+                <a:solidFill>
+                  <a:prstClr val="white"/>
+                </a:solidFill>
+              </a:rPr>
+              <a:t>01</a:t>
+            </a:r>
+            <a:endParaRPr lang="ko-KR" altLang="en-US" b="1" dirty="0">
+              <a:solidFill>
+                <a:prstClr val="white"/>
+              </a:solidFill>
+            </a:endParaRPr>
+          </a:p>
+        </p:txBody>
+      </p:sp>
+      <p:sp>
+        <p:nvSpPr>
+          <p:cNvPr id="27" name="TextBox 26">
+            <a:extLst>
+              <a:ext uri="{FF2B5EF4-FFF2-40B4-BE49-F238E27FC236}">
+                <a16:creationId xmlns:a16="http://schemas.microsoft.com/office/drawing/2014/main" id="{1A3EC2C7-D220-4AA3-96B1-75C2B5352421}"/>
+              </a:ext>
+            </a:extLst>
+          </p:cNvPr>
+          <p:cNvSpPr txBox="1"/>
+          <p:nvPr/>
+        </p:nvSpPr>
+        <p:spPr>
+          <a:xfrm>
+            <a:off x="1847555" y="1326164"/>
+            <a:ext cx="2945162" cy="523220"/>
+          </a:xfrm>
+          <a:prstGeom prst="rect">
+            <a:avLst/>
+          </a:prstGeom>
+          <a:noFill/>
+        </p:spPr>
+        <p:txBody>
+          <a:bodyPr wrap="square" rtlCol="0">
+            <a:spAutoFit/>
+          </a:bodyPr>
+          <a:lstStyle/>
+          <a:p>
+            <a:r>
+              <a:rPr lang="en-US" altLang="ko-KR" sz="2800" b="1" dirty="0"/>
+              <a:t>Vue</a:t>
+            </a:r>
+            <a:r>
+              <a:rPr lang="ko-KR" altLang="en-US" sz="2800" b="1" dirty="0"/>
+              <a:t> 특징</a:t>
+            </a:r>
+          </a:p>
+        </p:txBody>
+      </p:sp>
+      <p:sp>
+        <p:nvSpPr>
+          <p:cNvPr id="30" name="TextBox 29">
+            <a:extLst>
+              <a:ext uri="{FF2B5EF4-FFF2-40B4-BE49-F238E27FC236}">
+                <a16:creationId xmlns:a16="http://schemas.microsoft.com/office/drawing/2014/main" id="{4716607E-61DC-4ADF-833E-DD44B75A65E3}"/>
+              </a:ext>
+            </a:extLst>
+          </p:cNvPr>
+          <p:cNvSpPr txBox="1"/>
+          <p:nvPr/>
+        </p:nvSpPr>
+        <p:spPr>
+          <a:xfrm>
+            <a:off x="1630123" y="2092779"/>
+            <a:ext cx="7769412" cy="2236959"/>
+          </a:xfrm>
+          <a:prstGeom prst="rect">
+            <a:avLst/>
+          </a:prstGeom>
+          <a:noFill/>
+        </p:spPr>
+        <p:txBody>
+          <a:bodyPr wrap="square" rtlCol="0">
+            <a:spAutoFit/>
+          </a:bodyPr>
+          <a:lstStyle/>
+          <a:p>
+            <a:pPr marL="342900" indent="-342900">
+              <a:lnSpc>
+                <a:spcPct val="150000"/>
+              </a:lnSpc>
+              <a:buFontTx/>
+              <a:buChar char="-"/>
+            </a:pPr>
+            <a:r>
+              <a:rPr lang="en-US" altLang="ko-KR" sz="2400" b="1" dirty="0">
+                <a:solidFill>
+                  <a:srgbClr val="FF0000"/>
+                </a:solidFill>
+              </a:rPr>
+              <a:t>HTML</a:t>
+            </a:r>
+            <a:r>
+              <a:rPr lang="ko-KR" altLang="en-US" sz="2400" b="1" dirty="0">
+                <a:solidFill>
+                  <a:srgbClr val="FF0000"/>
+                </a:solidFill>
+              </a:rPr>
+              <a:t> 기반 템플릿</a:t>
+            </a:r>
+            <a:r>
+              <a:rPr lang="ko-KR" altLang="en-US" sz="2400" b="1" dirty="0">
+                <a:solidFill>
+                  <a:schemeClr val="bg2">
+                    <a:lumMod val="25000"/>
+                  </a:schemeClr>
+                </a:solidFill>
+              </a:rPr>
+              <a:t> 구문</a:t>
+            </a:r>
+            <a:r>
+              <a:rPr lang="en-US" altLang="ko-KR" sz="2400" b="1" dirty="0">
+                <a:solidFill>
+                  <a:schemeClr val="bg2">
+                    <a:lumMod val="25000"/>
+                  </a:schemeClr>
+                </a:solidFill>
+              </a:rPr>
+              <a:t>, </a:t>
+            </a:r>
+            <a:r>
+              <a:rPr lang="ko-KR" altLang="en-US" sz="2400" b="1" dirty="0">
+                <a:solidFill>
+                  <a:schemeClr val="bg2">
+                    <a:lumMod val="25000"/>
+                  </a:schemeClr>
+                </a:solidFill>
+              </a:rPr>
+              <a:t>싱글 파일 컴포넌트</a:t>
+            </a:r>
+            <a:endParaRPr lang="en-US" altLang="ko-KR" sz="2400" b="1" dirty="0">
+              <a:solidFill>
+                <a:schemeClr val="bg2">
+                  <a:lumMod val="25000"/>
+                </a:schemeClr>
+              </a:solidFill>
+            </a:endParaRPr>
           </a:p>
           <a:p>
             <a:pPr marL="342900" indent="-342900">
@@ -6560,9 +7594,7 @@
             <a:r>
               <a:rPr lang="ko-KR" altLang="en-US" sz="2400" b="1" dirty="0">
                 <a:solidFill>
-                  <a:schemeClr val="bg2">
-                    <a:lumMod val="25000"/>
-                  </a:schemeClr>
+                  <a:srgbClr val="FF0000"/>
                 </a:solidFill>
               </a:rPr>
               <a:t>학습 용이</a:t>
@@ -6594,7 +7626,7 @@
                   </a:schemeClr>
                 </a:solidFill>
               </a:rPr>
-              <a:t>공식 가이드 문서가 학습을 용이하게 함</a:t>
+              <a:t>배우기 쉬운 공식 가이드 </a:t>
             </a:r>
             <a:endParaRPr lang="en-US" altLang="ko-KR" sz="2400" b="1" dirty="0">
               <a:solidFill>
@@ -7371,36 +8403,6 @@
           </a:p>
         </p:txBody>
       </p:sp>
-      <p:pic>
-        <p:nvPicPr>
-          <p:cNvPr id="3" name="그림 2">
-            <a:extLst>
-              <a:ext uri="{FF2B5EF4-FFF2-40B4-BE49-F238E27FC236}">
-                <a16:creationId xmlns:a16="http://schemas.microsoft.com/office/drawing/2014/main" id="{74E92554-5F7F-4C4A-AC23-A570439EF141}"/>
-              </a:ext>
-            </a:extLst>
-          </p:cNvPr>
-          <p:cNvPicPr>
-            <a:picLocks noChangeAspect="1"/>
-          </p:cNvPicPr>
-          <p:nvPr/>
-        </p:nvPicPr>
-        <p:blipFill>
-          <a:blip r:embed="rId2"/>
-          <a:stretch>
-            <a:fillRect/>
-          </a:stretch>
-        </p:blipFill>
-        <p:spPr>
-          <a:xfrm>
-            <a:off x="649273" y="1967220"/>
-            <a:ext cx="11010900" cy="4295467"/>
-          </a:xfrm>
-          <a:prstGeom prst="rect">
-            <a:avLst/>
-          </a:prstGeom>
-        </p:spPr>
-      </p:pic>
       <p:sp>
         <p:nvSpPr>
           <p:cNvPr id="13" name="TextBox 12">
@@ -7453,6 +8455,35 @@
           </a:p>
         </p:txBody>
       </p:sp>
+      <p:pic>
+        <p:nvPicPr>
+          <p:cNvPr id="4" name="그림 3">
+            <a:extLst>
+              <a:ext uri="{FF2B5EF4-FFF2-40B4-BE49-F238E27FC236}">
+                <a16:creationId xmlns:a16="http://schemas.microsoft.com/office/drawing/2014/main" id="{3E344D36-D57F-49F8-843E-CA5DA253A125}"/>
+              </a:ext>
+            </a:extLst>
+          </p:cNvPr>
+          <p:cNvPicPr>
+            <a:picLocks noChangeAspect="1"/>
+          </p:cNvPicPr>
+          <p:nvPr/>
+        </p:nvPicPr>
+        <p:blipFill rotWithShape="1">
+          <a:blip r:embed="rId2"/>
+          <a:srcRect t="2126"/>
+          <a:stretch/>
+        </p:blipFill>
+        <p:spPr>
+          <a:xfrm>
+            <a:off x="834770" y="2043420"/>
+            <a:ext cx="10595032" cy="4076780"/>
+          </a:xfrm>
+          <a:prstGeom prst="rect">
+            <a:avLst/>
+          </a:prstGeom>
+        </p:spPr>
+      </p:pic>
     </p:spTree>
     <p:extLst>
       <p:ext uri="{BB962C8B-B14F-4D97-AF65-F5344CB8AC3E}">
@@ -8223,10 +9254,10 @@
       </p:sp>
       <p:pic>
         <p:nvPicPr>
-          <p:cNvPr id="4" name="그림 3">
+          <p:cNvPr id="3" name="그림 2">
             <a:extLst>
               <a:ext uri="{FF2B5EF4-FFF2-40B4-BE49-F238E27FC236}">
-                <a16:creationId xmlns:a16="http://schemas.microsoft.com/office/drawing/2014/main" id="{F1801719-0044-4042-AE50-D3A6870F46EA}"/>
+                <a16:creationId xmlns:a16="http://schemas.microsoft.com/office/drawing/2014/main" id="{BE20B9E9-8801-4034-9D7A-4B5D10AA9148}"/>
               </a:ext>
             </a:extLst>
           </p:cNvPr>
@@ -8243,8 +9274,8 @@
         </p:blipFill>
         <p:spPr>
           <a:xfrm>
-            <a:off x="559821" y="1967220"/>
-            <a:ext cx="10982325" cy="4140818"/>
+            <a:off x="945510" y="2024545"/>
+            <a:ext cx="10561740" cy="3917390"/>
           </a:xfrm>
           <a:prstGeom prst="rect">
             <a:avLst/>
@@ -9160,7 +10191,7 @@
         </p:blipFill>
         <p:spPr>
           <a:xfrm>
-            <a:off x="696673" y="4874749"/>
+            <a:off x="696672" y="4866381"/>
             <a:ext cx="9639300" cy="815646"/>
           </a:xfrm>
           <a:prstGeom prst="rect">
@@ -9183,7 +10214,7 @@
         <p:spPr>
           <a:xfrm>
             <a:off x="696672" y="4154179"/>
-            <a:ext cx="6903753" cy="461665"/>
+            <a:ext cx="9639300" cy="461665"/>
           </a:xfrm>
           <a:prstGeom prst="rect">
             <a:avLst/>
@@ -9198,7 +10229,23 @@
           <a:p>
             <a:r>
               <a:rPr lang="en-US" altLang="ko-KR" sz="2400" b="1" dirty="0"/>
-              <a:t>React vs Vue (Developer Survey Results 2020)</a:t>
+              <a:t>Most</a:t>
+            </a:r>
+            <a:r>
+              <a:rPr lang="ko-KR" altLang="en-US" sz="2400" b="1" dirty="0"/>
+              <a:t> </a:t>
+            </a:r>
+            <a:r>
+              <a:rPr lang="en-US" altLang="ko-KR" sz="2400" b="1" dirty="0"/>
+              <a:t>Loved</a:t>
+            </a:r>
+            <a:r>
+              <a:rPr lang="ko-KR" altLang="en-US" sz="2400" b="1" dirty="0"/>
+              <a:t> </a:t>
+            </a:r>
+            <a:r>
+              <a:rPr lang="en-US" altLang="ko-KR" sz="2400" b="1" dirty="0"/>
+              <a:t>Web Frameworks (Developer Survey Results 2020)</a:t>
             </a:r>
             <a:endParaRPr lang="ko-KR" altLang="en-US" sz="2400" b="1" dirty="0"/>
           </a:p>
@@ -9485,20 +10532,12 @@
           <a:p>
             <a:pPr algn="ctr"/>
             <a:r>
-              <a:rPr lang="ko-KR" altLang="en-US" sz="2400" b="1" dirty="0">
+              <a:rPr lang="en-US" altLang="ko-KR" sz="2400" b="1" dirty="0">
                 <a:solidFill>
                   <a:prstClr val="white"/>
                 </a:solidFill>
               </a:rPr>
-              <a:t>결론 및 </a:t>
-            </a:r>
-            <a:r>
-              <a:rPr lang="ko-KR" altLang="en-US" sz="2400" b="1" dirty="0" err="1">
-                <a:solidFill>
-                  <a:prstClr val="white"/>
-                </a:solidFill>
-              </a:rPr>
-              <a:t>느낀점</a:t>
+              <a:t>Hello World</a:t>
             </a:r>
             <a:endParaRPr lang="ko-KR" altLang="en-US" sz="2400" b="1" dirty="0">
               <a:solidFill>
@@ -9933,6 +10972,722 @@
           </a:p>
         </p:txBody>
       </p:sp>
+    </p:spTree>
+    <p:extLst>
+      <p:ext uri="{BB962C8B-B14F-4D97-AF65-F5344CB8AC3E}">
+        <p14:creationId xmlns:p14="http://schemas.microsoft.com/office/powerpoint/2010/main" val="2922686060"/>
+      </p:ext>
+    </p:extLst>
+  </p:cSld>
+  <p:clrMapOvr>
+    <a:masterClrMapping/>
+  </p:clrMapOvr>
+</p:sld>
+</file>
+
+<file path=ppt/slides/slide8.xml><?xml version="1.0" encoding="utf-8"?>
+<p:sld xmlns:a="http://schemas.openxmlformats.org/drawingml/2006/main" xmlns:r="http://schemas.openxmlformats.org/officeDocument/2006/relationships" xmlns:p="http://schemas.openxmlformats.org/presentationml/2006/main">
+  <p:cSld>
+    <p:spTree>
+      <p:nvGrpSpPr>
+        <p:cNvPr id="1" name=""/>
+        <p:cNvGrpSpPr/>
+        <p:nvPr/>
+      </p:nvGrpSpPr>
+      <p:grpSpPr>
+        <a:xfrm>
+          <a:off x="0" y="0"/>
+          <a:ext cx="0" cy="0"/>
+          <a:chOff x="0" y="0"/>
+          <a:chExt cx="0" cy="0"/>
+        </a:xfrm>
+      </p:grpSpPr>
+      <p:sp>
+        <p:nvSpPr>
+          <p:cNvPr id="15" name="모서리가 둥근 직사각형 14"/>
+          <p:cNvSpPr/>
+          <p:nvPr/>
+        </p:nvSpPr>
+        <p:spPr>
+          <a:xfrm>
+            <a:off x="297543" y="581819"/>
+            <a:ext cx="11771086" cy="6142718"/>
+          </a:xfrm>
+          <a:prstGeom prst="roundRect">
+            <a:avLst>
+              <a:gd name="adj" fmla="val 3722"/>
+            </a:avLst>
+          </a:prstGeom>
+          <a:solidFill>
+            <a:schemeClr val="tx1">
+              <a:lumMod val="75000"/>
+              <a:lumOff val="25000"/>
+            </a:schemeClr>
+          </a:solidFill>
+          <a:ln w="25400">
+            <a:solidFill>
+              <a:schemeClr val="tx1">
+                <a:lumMod val="85000"/>
+                <a:lumOff val="15000"/>
+              </a:schemeClr>
+            </a:solidFill>
+          </a:ln>
+          <a:effectLst>
+            <a:outerShdw blurRad="50800" dist="76200" dir="5400000" algn="t" rotWithShape="0">
+              <a:prstClr val="black">
+                <a:alpha val="19000"/>
+              </a:prstClr>
+            </a:outerShdw>
+          </a:effectLst>
+        </p:spPr>
+        <p:style>
+          <a:lnRef idx="2">
+            <a:schemeClr val="accent1">
+              <a:shade val="50000"/>
+            </a:schemeClr>
+          </a:lnRef>
+          <a:fillRef idx="1">
+            <a:schemeClr val="accent1"/>
+          </a:fillRef>
+          <a:effectRef idx="0">
+            <a:schemeClr val="accent1"/>
+          </a:effectRef>
+          <a:fontRef idx="minor">
+            <a:schemeClr val="lt1"/>
+          </a:fontRef>
+        </p:style>
+        <p:txBody>
+          <a:bodyPr rtlCol="0" anchor="ctr"/>
+          <a:lstStyle/>
+          <a:p>
+            <a:pPr algn="ctr"/>
+            <a:endParaRPr lang="ko-KR" altLang="en-US">
+              <a:solidFill>
+                <a:prstClr val="white"/>
+              </a:solidFill>
+            </a:endParaRPr>
+          </a:p>
+        </p:txBody>
+      </p:sp>
+      <p:sp>
+        <p:nvSpPr>
+          <p:cNvPr id="8" name="모서리가 둥근 직사각형 7"/>
+          <p:cNvSpPr/>
+          <p:nvPr/>
+        </p:nvSpPr>
+        <p:spPr>
+          <a:xfrm>
+            <a:off x="246743" y="504825"/>
+            <a:ext cx="11771086" cy="6142718"/>
+          </a:xfrm>
+          <a:prstGeom prst="roundRect">
+            <a:avLst>
+              <a:gd name="adj" fmla="val 3722"/>
+            </a:avLst>
+          </a:prstGeom>
+          <a:solidFill>
+            <a:schemeClr val="bg1"/>
+          </a:solidFill>
+          <a:ln w="25400">
+            <a:solidFill>
+              <a:schemeClr val="tx1">
+                <a:lumMod val="85000"/>
+                <a:lumOff val="15000"/>
+              </a:schemeClr>
+            </a:solidFill>
+          </a:ln>
+          <a:effectLst>
+            <a:outerShdw blurRad="50800" dist="76200" dir="5400000" algn="t" rotWithShape="0">
+              <a:prstClr val="black">
+                <a:alpha val="19000"/>
+              </a:prstClr>
+            </a:outerShdw>
+          </a:effectLst>
+        </p:spPr>
+        <p:style>
+          <a:lnRef idx="2">
+            <a:schemeClr val="accent1">
+              <a:shade val="50000"/>
+            </a:schemeClr>
+          </a:lnRef>
+          <a:fillRef idx="1">
+            <a:schemeClr val="accent1"/>
+          </a:fillRef>
+          <a:effectRef idx="0">
+            <a:schemeClr val="accent1"/>
+          </a:effectRef>
+          <a:fontRef idx="minor">
+            <a:schemeClr val="lt1"/>
+          </a:fontRef>
+        </p:style>
+        <p:txBody>
+          <a:bodyPr rtlCol="0" anchor="ctr"/>
+          <a:lstStyle/>
+          <a:p>
+            <a:pPr algn="ctr"/>
+            <a:endParaRPr lang="ko-KR" altLang="en-US">
+              <a:solidFill>
+                <a:prstClr val="white"/>
+              </a:solidFill>
+            </a:endParaRPr>
+          </a:p>
+        </p:txBody>
+      </p:sp>
+      <p:sp>
+        <p:nvSpPr>
+          <p:cNvPr id="14" name="모서리가 둥근 직사각형 13"/>
+          <p:cNvSpPr/>
+          <p:nvPr/>
+        </p:nvSpPr>
+        <p:spPr>
+          <a:xfrm>
+            <a:off x="1407402" y="192881"/>
+            <a:ext cx="3558297" cy="677069"/>
+          </a:xfrm>
+          <a:prstGeom prst="roundRect">
+            <a:avLst/>
+          </a:prstGeom>
+          <a:solidFill>
+            <a:schemeClr val="bg1"/>
+          </a:solidFill>
+          <a:ln w="25400">
+            <a:solidFill>
+              <a:schemeClr val="tx1">
+                <a:lumMod val="85000"/>
+                <a:lumOff val="15000"/>
+              </a:schemeClr>
+            </a:solidFill>
+          </a:ln>
+          <a:effectLst>
+            <a:outerShdw blurRad="50800" dist="76200" dir="5400000" algn="t" rotWithShape="0">
+              <a:prstClr val="black">
+                <a:alpha val="19000"/>
+              </a:prstClr>
+            </a:outerShdw>
+          </a:effectLst>
+        </p:spPr>
+        <p:style>
+          <a:lnRef idx="2">
+            <a:schemeClr val="accent1">
+              <a:shade val="50000"/>
+            </a:schemeClr>
+          </a:lnRef>
+          <a:fillRef idx="1">
+            <a:schemeClr val="accent1"/>
+          </a:fillRef>
+          <a:effectRef idx="0">
+            <a:schemeClr val="accent1"/>
+          </a:effectRef>
+          <a:fontRef idx="minor">
+            <a:schemeClr val="lt1"/>
+          </a:fontRef>
+        </p:style>
+        <p:txBody>
+          <a:bodyPr rtlCol="0" anchor="ctr"/>
+          <a:lstStyle/>
+          <a:p>
+            <a:pPr algn="ctr"/>
+            <a:endParaRPr lang="ko-KR" altLang="en-US" sz="1600" dirty="0">
+              <a:solidFill>
+                <a:prstClr val="white"/>
+              </a:solidFill>
+            </a:endParaRPr>
+          </a:p>
+        </p:txBody>
+      </p:sp>
+      <p:sp>
+        <p:nvSpPr>
+          <p:cNvPr id="9" name="모서리가 둥근 직사각형 8"/>
+          <p:cNvSpPr/>
+          <p:nvPr/>
+        </p:nvSpPr>
+        <p:spPr>
+          <a:xfrm>
+            <a:off x="1356600" y="135731"/>
+            <a:ext cx="3551949" cy="677069"/>
+          </a:xfrm>
+          <a:prstGeom prst="roundRect">
+            <a:avLst/>
+          </a:prstGeom>
+          <a:solidFill>
+            <a:schemeClr val="tx1">
+              <a:lumMod val="75000"/>
+              <a:lumOff val="25000"/>
+            </a:schemeClr>
+          </a:solidFill>
+          <a:ln w="25400">
+            <a:solidFill>
+              <a:schemeClr val="tx1">
+                <a:lumMod val="85000"/>
+                <a:lumOff val="15000"/>
+              </a:schemeClr>
+            </a:solidFill>
+          </a:ln>
+          <a:effectLst>
+            <a:outerShdw blurRad="50800" dist="76200" dir="5400000" algn="t" rotWithShape="0">
+              <a:prstClr val="black">
+                <a:alpha val="19000"/>
+              </a:prstClr>
+            </a:outerShdw>
+          </a:effectLst>
+        </p:spPr>
+        <p:style>
+          <a:lnRef idx="2">
+            <a:schemeClr val="accent1">
+              <a:shade val="50000"/>
+            </a:schemeClr>
+          </a:lnRef>
+          <a:fillRef idx="1">
+            <a:schemeClr val="accent1"/>
+          </a:fillRef>
+          <a:effectRef idx="0">
+            <a:schemeClr val="accent1"/>
+          </a:effectRef>
+          <a:fontRef idx="minor">
+            <a:schemeClr val="lt1"/>
+          </a:fontRef>
+        </p:style>
+        <p:txBody>
+          <a:bodyPr rtlCol="0" anchor="ctr"/>
+          <a:lstStyle/>
+          <a:p>
+            <a:pPr algn="ctr"/>
+            <a:r>
+              <a:rPr lang="ko-KR" altLang="en-US" sz="2400" b="1" dirty="0">
+                <a:solidFill>
+                  <a:prstClr val="white"/>
+                </a:solidFill>
+              </a:rPr>
+              <a:t>결론 및 느낀 점</a:t>
+            </a:r>
+          </a:p>
+        </p:txBody>
+      </p:sp>
+      <p:sp>
+        <p:nvSpPr>
+          <p:cNvPr id="17" name="자유형 16"/>
+          <p:cNvSpPr/>
+          <p:nvPr/>
+        </p:nvSpPr>
+        <p:spPr>
+          <a:xfrm>
+            <a:off x="604271" y="173831"/>
+            <a:ext cx="682479" cy="847385"/>
+          </a:xfrm>
+          <a:custGeom>
+            <a:avLst/>
+            <a:gdLst>
+              <a:gd name="connsiteX0" fmla="*/ 112847 w 682479"/>
+              <a:gd name="connsiteY0" fmla="*/ 0 h 847385"/>
+              <a:gd name="connsiteX1" fmla="*/ 569632 w 682479"/>
+              <a:gd name="connsiteY1" fmla="*/ 0 h 847385"/>
+              <a:gd name="connsiteX2" fmla="*/ 682479 w 682479"/>
+              <a:gd name="connsiteY2" fmla="*/ 112847 h 847385"/>
+              <a:gd name="connsiteX3" fmla="*/ 682479 w 682479"/>
+              <a:gd name="connsiteY3" fmla="*/ 564222 h 847385"/>
+              <a:gd name="connsiteX4" fmla="*/ 569632 w 682479"/>
+              <a:gd name="connsiteY4" fmla="*/ 677069 h 847385"/>
+              <a:gd name="connsiteX5" fmla="*/ 383870 w 682479"/>
+              <a:gd name="connsiteY5" fmla="*/ 677069 h 847385"/>
+              <a:gd name="connsiteX6" fmla="*/ 192014 w 682479"/>
+              <a:gd name="connsiteY6" fmla="*/ 847385 h 847385"/>
+              <a:gd name="connsiteX7" fmla="*/ 226964 w 682479"/>
+              <a:gd name="connsiteY7" fmla="*/ 677069 h 847385"/>
+              <a:gd name="connsiteX8" fmla="*/ 112847 w 682479"/>
+              <a:gd name="connsiteY8" fmla="*/ 677069 h 847385"/>
+              <a:gd name="connsiteX9" fmla="*/ 0 w 682479"/>
+              <a:gd name="connsiteY9" fmla="*/ 564222 h 847385"/>
+              <a:gd name="connsiteX10" fmla="*/ 0 w 682479"/>
+              <a:gd name="connsiteY10" fmla="*/ 112847 h 847385"/>
+              <a:gd name="connsiteX11" fmla="*/ 112847 w 682479"/>
+              <a:gd name="connsiteY11" fmla="*/ 0 h 847385"/>
+            </a:gdLst>
+            <a:ahLst/>
+            <a:cxnLst>
+              <a:cxn ang="0">
+                <a:pos x="connsiteX0" y="connsiteY0"/>
+              </a:cxn>
+              <a:cxn ang="0">
+                <a:pos x="connsiteX1" y="connsiteY1"/>
+              </a:cxn>
+              <a:cxn ang="0">
+                <a:pos x="connsiteX2" y="connsiteY2"/>
+              </a:cxn>
+              <a:cxn ang="0">
+                <a:pos x="connsiteX3" y="connsiteY3"/>
+              </a:cxn>
+              <a:cxn ang="0">
+                <a:pos x="connsiteX4" y="connsiteY4"/>
+              </a:cxn>
+              <a:cxn ang="0">
+                <a:pos x="connsiteX5" y="connsiteY5"/>
+              </a:cxn>
+              <a:cxn ang="0">
+                <a:pos x="connsiteX6" y="connsiteY6"/>
+              </a:cxn>
+              <a:cxn ang="0">
+                <a:pos x="connsiteX7" y="connsiteY7"/>
+              </a:cxn>
+              <a:cxn ang="0">
+                <a:pos x="connsiteX8" y="connsiteY8"/>
+              </a:cxn>
+              <a:cxn ang="0">
+                <a:pos x="connsiteX9" y="connsiteY9"/>
+              </a:cxn>
+              <a:cxn ang="0">
+                <a:pos x="connsiteX10" y="connsiteY10"/>
+              </a:cxn>
+              <a:cxn ang="0">
+                <a:pos x="connsiteX11" y="connsiteY11"/>
+              </a:cxn>
+            </a:cxnLst>
+            <a:rect l="l" t="t" r="r" b="b"/>
+            <a:pathLst>
+              <a:path w="682479" h="847385">
+                <a:moveTo>
+                  <a:pt x="112847" y="0"/>
+                </a:moveTo>
+                <a:lnTo>
+                  <a:pt x="569632" y="0"/>
+                </a:lnTo>
+                <a:cubicBezTo>
+                  <a:pt x="631956" y="0"/>
+                  <a:pt x="682479" y="50523"/>
+                  <a:pt x="682479" y="112847"/>
+                </a:cubicBezTo>
+                <a:lnTo>
+                  <a:pt x="682479" y="564222"/>
+                </a:lnTo>
+                <a:cubicBezTo>
+                  <a:pt x="682479" y="626546"/>
+                  <a:pt x="631956" y="677069"/>
+                  <a:pt x="569632" y="677069"/>
+                </a:cubicBezTo>
+                <a:lnTo>
+                  <a:pt x="383870" y="677069"/>
+                </a:lnTo>
+                <a:lnTo>
+                  <a:pt x="192014" y="847385"/>
+                </a:lnTo>
+                <a:lnTo>
+                  <a:pt x="226964" y="677069"/>
+                </a:lnTo>
+                <a:lnTo>
+                  <a:pt x="112847" y="677069"/>
+                </a:lnTo>
+                <a:cubicBezTo>
+                  <a:pt x="50523" y="677069"/>
+                  <a:pt x="0" y="626546"/>
+                  <a:pt x="0" y="564222"/>
+                </a:cubicBezTo>
+                <a:lnTo>
+                  <a:pt x="0" y="112847"/>
+                </a:lnTo>
+                <a:cubicBezTo>
+                  <a:pt x="0" y="50523"/>
+                  <a:pt x="50523" y="0"/>
+                  <a:pt x="112847" y="0"/>
+                </a:cubicBezTo>
+                <a:close/>
+              </a:path>
+            </a:pathLst>
+          </a:custGeom>
+          <a:solidFill>
+            <a:schemeClr val="bg1"/>
+          </a:solidFill>
+          <a:ln w="25400">
+            <a:solidFill>
+              <a:schemeClr val="tx1">
+                <a:lumMod val="85000"/>
+                <a:lumOff val="15000"/>
+              </a:schemeClr>
+            </a:solidFill>
+          </a:ln>
+          <a:effectLst>
+            <a:outerShdw blurRad="50800" dist="76200" dir="5400000" algn="t" rotWithShape="0">
+              <a:prstClr val="black">
+                <a:alpha val="19000"/>
+              </a:prstClr>
+            </a:outerShdw>
+          </a:effectLst>
+        </p:spPr>
+        <p:style>
+          <a:lnRef idx="2">
+            <a:schemeClr val="accent1">
+              <a:shade val="50000"/>
+            </a:schemeClr>
+          </a:lnRef>
+          <a:fillRef idx="1">
+            <a:schemeClr val="accent1"/>
+          </a:fillRef>
+          <a:effectRef idx="0">
+            <a:schemeClr val="accent1"/>
+          </a:effectRef>
+          <a:fontRef idx="minor">
+            <a:schemeClr val="lt1"/>
+          </a:fontRef>
+        </p:style>
+        <p:txBody>
+          <a:bodyPr rtlCol="0" anchor="ctr"/>
+          <a:lstStyle/>
+          <a:p>
+            <a:pPr algn="ctr"/>
+            <a:endParaRPr lang="ko-KR" altLang="en-US">
+              <a:solidFill>
+                <a:prstClr val="white"/>
+              </a:solidFill>
+            </a:endParaRPr>
+          </a:p>
+        </p:txBody>
+      </p:sp>
+      <p:sp>
+        <p:nvSpPr>
+          <p:cNvPr id="16" name="자유형 15"/>
+          <p:cNvSpPr/>
+          <p:nvPr/>
+        </p:nvSpPr>
+        <p:spPr>
+          <a:xfrm>
+            <a:off x="559821" y="135731"/>
+            <a:ext cx="682479" cy="847385"/>
+          </a:xfrm>
+          <a:custGeom>
+            <a:avLst/>
+            <a:gdLst>
+              <a:gd name="connsiteX0" fmla="*/ 112847 w 682479"/>
+              <a:gd name="connsiteY0" fmla="*/ 0 h 847385"/>
+              <a:gd name="connsiteX1" fmla="*/ 569632 w 682479"/>
+              <a:gd name="connsiteY1" fmla="*/ 0 h 847385"/>
+              <a:gd name="connsiteX2" fmla="*/ 682479 w 682479"/>
+              <a:gd name="connsiteY2" fmla="*/ 112847 h 847385"/>
+              <a:gd name="connsiteX3" fmla="*/ 682479 w 682479"/>
+              <a:gd name="connsiteY3" fmla="*/ 564222 h 847385"/>
+              <a:gd name="connsiteX4" fmla="*/ 569632 w 682479"/>
+              <a:gd name="connsiteY4" fmla="*/ 677069 h 847385"/>
+              <a:gd name="connsiteX5" fmla="*/ 383870 w 682479"/>
+              <a:gd name="connsiteY5" fmla="*/ 677069 h 847385"/>
+              <a:gd name="connsiteX6" fmla="*/ 192014 w 682479"/>
+              <a:gd name="connsiteY6" fmla="*/ 847385 h 847385"/>
+              <a:gd name="connsiteX7" fmla="*/ 226964 w 682479"/>
+              <a:gd name="connsiteY7" fmla="*/ 677069 h 847385"/>
+              <a:gd name="connsiteX8" fmla="*/ 112847 w 682479"/>
+              <a:gd name="connsiteY8" fmla="*/ 677069 h 847385"/>
+              <a:gd name="connsiteX9" fmla="*/ 0 w 682479"/>
+              <a:gd name="connsiteY9" fmla="*/ 564222 h 847385"/>
+              <a:gd name="connsiteX10" fmla="*/ 0 w 682479"/>
+              <a:gd name="connsiteY10" fmla="*/ 112847 h 847385"/>
+              <a:gd name="connsiteX11" fmla="*/ 112847 w 682479"/>
+              <a:gd name="connsiteY11" fmla="*/ 0 h 847385"/>
+            </a:gdLst>
+            <a:ahLst/>
+            <a:cxnLst>
+              <a:cxn ang="0">
+                <a:pos x="connsiteX0" y="connsiteY0"/>
+              </a:cxn>
+              <a:cxn ang="0">
+                <a:pos x="connsiteX1" y="connsiteY1"/>
+              </a:cxn>
+              <a:cxn ang="0">
+                <a:pos x="connsiteX2" y="connsiteY2"/>
+              </a:cxn>
+              <a:cxn ang="0">
+                <a:pos x="connsiteX3" y="connsiteY3"/>
+              </a:cxn>
+              <a:cxn ang="0">
+                <a:pos x="connsiteX4" y="connsiteY4"/>
+              </a:cxn>
+              <a:cxn ang="0">
+                <a:pos x="connsiteX5" y="connsiteY5"/>
+              </a:cxn>
+              <a:cxn ang="0">
+                <a:pos x="connsiteX6" y="connsiteY6"/>
+              </a:cxn>
+              <a:cxn ang="0">
+                <a:pos x="connsiteX7" y="connsiteY7"/>
+              </a:cxn>
+              <a:cxn ang="0">
+                <a:pos x="connsiteX8" y="connsiteY8"/>
+              </a:cxn>
+              <a:cxn ang="0">
+                <a:pos x="connsiteX9" y="connsiteY9"/>
+              </a:cxn>
+              <a:cxn ang="0">
+                <a:pos x="connsiteX10" y="connsiteY10"/>
+              </a:cxn>
+              <a:cxn ang="0">
+                <a:pos x="connsiteX11" y="connsiteY11"/>
+              </a:cxn>
+            </a:cxnLst>
+            <a:rect l="l" t="t" r="r" b="b"/>
+            <a:pathLst>
+              <a:path w="682479" h="847385">
+                <a:moveTo>
+                  <a:pt x="112847" y="0"/>
+                </a:moveTo>
+                <a:lnTo>
+                  <a:pt x="569632" y="0"/>
+                </a:lnTo>
+                <a:cubicBezTo>
+                  <a:pt x="631956" y="0"/>
+                  <a:pt x="682479" y="50523"/>
+                  <a:pt x="682479" y="112847"/>
+                </a:cubicBezTo>
+                <a:lnTo>
+                  <a:pt x="682479" y="564222"/>
+                </a:lnTo>
+                <a:cubicBezTo>
+                  <a:pt x="682479" y="626546"/>
+                  <a:pt x="631956" y="677069"/>
+                  <a:pt x="569632" y="677069"/>
+                </a:cubicBezTo>
+                <a:lnTo>
+                  <a:pt x="383870" y="677069"/>
+                </a:lnTo>
+                <a:lnTo>
+                  <a:pt x="192014" y="847385"/>
+                </a:lnTo>
+                <a:lnTo>
+                  <a:pt x="226964" y="677069"/>
+                </a:lnTo>
+                <a:lnTo>
+                  <a:pt x="112847" y="677069"/>
+                </a:lnTo>
+                <a:cubicBezTo>
+                  <a:pt x="50523" y="677069"/>
+                  <a:pt x="0" y="626546"/>
+                  <a:pt x="0" y="564222"/>
+                </a:cubicBezTo>
+                <a:lnTo>
+                  <a:pt x="0" y="112847"/>
+                </a:lnTo>
+                <a:cubicBezTo>
+                  <a:pt x="0" y="50523"/>
+                  <a:pt x="50523" y="0"/>
+                  <a:pt x="112847" y="0"/>
+                </a:cubicBezTo>
+                <a:close/>
+              </a:path>
+            </a:pathLst>
+          </a:custGeom>
+          <a:solidFill>
+            <a:schemeClr val="tx1">
+              <a:lumMod val="75000"/>
+              <a:lumOff val="25000"/>
+            </a:schemeClr>
+          </a:solidFill>
+          <a:ln w="25400">
+            <a:solidFill>
+              <a:schemeClr val="tx1">
+                <a:lumMod val="85000"/>
+                <a:lumOff val="15000"/>
+              </a:schemeClr>
+            </a:solidFill>
+          </a:ln>
+          <a:effectLst>
+            <a:outerShdw blurRad="50800" dist="76200" dir="5400000" algn="t" rotWithShape="0">
+              <a:prstClr val="black">
+                <a:alpha val="19000"/>
+              </a:prstClr>
+            </a:outerShdw>
+          </a:effectLst>
+        </p:spPr>
+        <p:style>
+          <a:lnRef idx="2">
+            <a:schemeClr val="accent1">
+              <a:shade val="50000"/>
+            </a:schemeClr>
+          </a:lnRef>
+          <a:fillRef idx="1">
+            <a:schemeClr val="accent1"/>
+          </a:fillRef>
+          <a:effectRef idx="0">
+            <a:schemeClr val="accent1"/>
+          </a:effectRef>
+          <a:fontRef idx="minor">
+            <a:schemeClr val="lt1"/>
+          </a:fontRef>
+        </p:style>
+        <p:txBody>
+          <a:bodyPr rtlCol="0" anchor="ctr"/>
+          <a:lstStyle/>
+          <a:p>
+            <a:pPr algn="ctr"/>
+            <a:endParaRPr lang="ko-KR" altLang="en-US">
+              <a:solidFill>
+                <a:prstClr val="white"/>
+              </a:solidFill>
+            </a:endParaRPr>
+          </a:p>
+        </p:txBody>
+      </p:sp>
+      <p:sp>
+        <p:nvSpPr>
+          <p:cNvPr id="7" name="타원 6"/>
+          <p:cNvSpPr/>
+          <p:nvPr/>
+        </p:nvSpPr>
+        <p:spPr>
+          <a:xfrm>
+            <a:off x="696673" y="269081"/>
+            <a:ext cx="414000" cy="413544"/>
+          </a:xfrm>
+          <a:prstGeom prst="ellipse">
+            <a:avLst/>
+          </a:prstGeom>
+          <a:solidFill>
+            <a:srgbClr val="FF6600"/>
+          </a:solidFill>
+          <a:ln w="9525" cmpd="sng">
+            <a:solidFill>
+              <a:schemeClr val="tx1">
+                <a:lumMod val="75000"/>
+                <a:lumOff val="25000"/>
+              </a:schemeClr>
+            </a:solidFill>
+          </a:ln>
+          <a:effectLst>
+            <a:outerShdw sx="110000" sy="110000" algn="ctr" rotWithShape="0">
+              <a:schemeClr val="bg1"/>
+            </a:outerShdw>
+          </a:effectLst>
+        </p:spPr>
+        <p:style>
+          <a:lnRef idx="2">
+            <a:schemeClr val="accent1">
+              <a:shade val="50000"/>
+            </a:schemeClr>
+          </a:lnRef>
+          <a:fillRef idx="1">
+            <a:schemeClr val="accent1"/>
+          </a:fillRef>
+          <a:effectRef idx="0">
+            <a:schemeClr val="accent1"/>
+          </a:effectRef>
+          <a:fontRef idx="minor">
+            <a:schemeClr val="lt1"/>
+          </a:fontRef>
+        </p:style>
+        <p:txBody>
+          <a:bodyPr wrap="none" rtlCol="0" anchor="ctr"/>
+          <a:lstStyle/>
+          <a:p>
+            <a:pPr algn="ctr"/>
+            <a:r>
+              <a:rPr lang="en-US" altLang="ko-KR" b="1" dirty="0">
+                <a:solidFill>
+                  <a:prstClr val="white"/>
+                </a:solidFill>
+              </a:rPr>
+              <a:t>04</a:t>
+            </a:r>
+            <a:endParaRPr lang="ko-KR" altLang="en-US" b="1" dirty="0">
+              <a:solidFill>
+                <a:prstClr val="white"/>
+              </a:solidFill>
+            </a:endParaRPr>
+          </a:p>
+        </p:txBody>
+      </p:sp>
       <p:sp>
         <p:nvSpPr>
           <p:cNvPr id="20" name="TextBox 19">
@@ -9948,7 +11703,7 @@
         <p:spPr>
           <a:xfrm>
             <a:off x="1242300" y="1932519"/>
-            <a:ext cx="10077341" cy="2236959"/>
+            <a:ext cx="10077341" cy="3344955"/>
           </a:xfrm>
           <a:prstGeom prst="rect">
             <a:avLst/>
@@ -10065,6 +11820,76 @@
                 </a:solidFill>
               </a:rPr>
               <a:t>에 비해 읽기 쉽고 체계적</a:t>
+            </a:r>
+            <a:endParaRPr lang="en-US" altLang="ko-KR" sz="2400" b="1" dirty="0">
+              <a:solidFill>
+                <a:schemeClr val="bg2">
+                  <a:lumMod val="25000"/>
+                </a:schemeClr>
+              </a:solidFill>
+            </a:endParaRPr>
+          </a:p>
+          <a:p>
+            <a:pPr marL="342900" indent="-342900">
+              <a:lnSpc>
+                <a:spcPct val="150000"/>
+              </a:lnSpc>
+              <a:buFontTx/>
+              <a:buChar char="-"/>
+            </a:pPr>
+            <a:r>
+              <a:rPr lang="en-US" altLang="ko-KR" sz="2400" b="1" dirty="0">
+                <a:solidFill>
+                  <a:srgbClr val="FF0000"/>
+                </a:solidFill>
+              </a:rPr>
+              <a:t>Right Way</a:t>
+            </a:r>
+            <a:r>
+              <a:rPr lang="en-US" altLang="ko-KR" sz="2400" b="1" dirty="0">
+                <a:solidFill>
+                  <a:schemeClr val="bg2">
+                    <a:lumMod val="25000"/>
+                  </a:schemeClr>
+                </a:solidFill>
+              </a:rPr>
+              <a:t> </a:t>
+            </a:r>
+            <a:r>
+              <a:rPr lang="ko-KR" altLang="en-US" sz="2400" b="1" dirty="0">
+                <a:solidFill>
+                  <a:schemeClr val="bg2">
+                    <a:lumMod val="25000"/>
+                  </a:schemeClr>
+                </a:solidFill>
+              </a:rPr>
+              <a:t>제공</a:t>
+            </a:r>
+            <a:endParaRPr lang="en-US" altLang="ko-KR" sz="2400" b="1" dirty="0">
+              <a:solidFill>
+                <a:schemeClr val="bg2">
+                  <a:lumMod val="25000"/>
+                </a:schemeClr>
+              </a:solidFill>
+            </a:endParaRPr>
+          </a:p>
+          <a:p>
+            <a:pPr marL="342900" indent="-342900">
+              <a:lnSpc>
+                <a:spcPct val="150000"/>
+              </a:lnSpc>
+              <a:buFontTx/>
+              <a:buChar char="-"/>
+            </a:pPr>
+            <a:r>
+              <a:rPr lang="ko-KR" altLang="en-US" sz="2400" b="1" dirty="0">
+                <a:solidFill>
+                  <a:schemeClr val="bg2">
+                    <a:lumMod val="25000"/>
+                  </a:schemeClr>
+                </a:solidFill>
+              </a:rPr>
+              <a:t>따라서 빠르게 실제로 개발해야 할 상황일 경우 사용</a:t>
             </a:r>
             <a:endParaRPr lang="en-US" altLang="ko-KR" sz="2400" b="1" dirty="0">
               <a:solidFill>
@@ -10177,6 +12002,722 @@
           </a:prstGeom>
         </p:spPr>
       </p:pic>
+    </p:spTree>
+    <p:extLst>
+      <p:ext uri="{BB962C8B-B14F-4D97-AF65-F5344CB8AC3E}">
+        <p14:creationId xmlns:p14="http://schemas.microsoft.com/office/powerpoint/2010/main" val="3609804837"/>
+      </p:ext>
+    </p:extLst>
+  </p:cSld>
+  <p:clrMapOvr>
+    <a:masterClrMapping/>
+  </p:clrMapOvr>
+</p:sld>
+</file>
+
+<file path=ppt/slides/slide9.xml><?xml version="1.0" encoding="utf-8"?>
+<p:sld xmlns:a="http://schemas.openxmlformats.org/drawingml/2006/main" xmlns:r="http://schemas.openxmlformats.org/officeDocument/2006/relationships" xmlns:p="http://schemas.openxmlformats.org/presentationml/2006/main">
+  <p:cSld>
+    <p:spTree>
+      <p:nvGrpSpPr>
+        <p:cNvPr id="1" name=""/>
+        <p:cNvGrpSpPr/>
+        <p:nvPr/>
+      </p:nvGrpSpPr>
+      <p:grpSpPr>
+        <a:xfrm>
+          <a:off x="0" y="0"/>
+          <a:ext cx="0" cy="0"/>
+          <a:chOff x="0" y="0"/>
+          <a:chExt cx="0" cy="0"/>
+        </a:xfrm>
+      </p:grpSpPr>
+      <p:sp>
+        <p:nvSpPr>
+          <p:cNvPr id="15" name="모서리가 둥근 직사각형 14"/>
+          <p:cNvSpPr/>
+          <p:nvPr/>
+        </p:nvSpPr>
+        <p:spPr>
+          <a:xfrm>
+            <a:off x="297543" y="581819"/>
+            <a:ext cx="11771086" cy="6142718"/>
+          </a:xfrm>
+          <a:prstGeom prst="roundRect">
+            <a:avLst>
+              <a:gd name="adj" fmla="val 3722"/>
+            </a:avLst>
+          </a:prstGeom>
+          <a:solidFill>
+            <a:schemeClr val="tx1">
+              <a:lumMod val="75000"/>
+              <a:lumOff val="25000"/>
+            </a:schemeClr>
+          </a:solidFill>
+          <a:ln w="25400">
+            <a:solidFill>
+              <a:schemeClr val="tx1">
+                <a:lumMod val="85000"/>
+                <a:lumOff val="15000"/>
+              </a:schemeClr>
+            </a:solidFill>
+          </a:ln>
+          <a:effectLst>
+            <a:outerShdw blurRad="50800" dist="76200" dir="5400000" algn="t" rotWithShape="0">
+              <a:prstClr val="black">
+                <a:alpha val="19000"/>
+              </a:prstClr>
+            </a:outerShdw>
+          </a:effectLst>
+        </p:spPr>
+        <p:style>
+          <a:lnRef idx="2">
+            <a:schemeClr val="accent1">
+              <a:shade val="50000"/>
+            </a:schemeClr>
+          </a:lnRef>
+          <a:fillRef idx="1">
+            <a:schemeClr val="accent1"/>
+          </a:fillRef>
+          <a:effectRef idx="0">
+            <a:schemeClr val="accent1"/>
+          </a:effectRef>
+          <a:fontRef idx="minor">
+            <a:schemeClr val="lt1"/>
+          </a:fontRef>
+        </p:style>
+        <p:txBody>
+          <a:bodyPr rtlCol="0" anchor="ctr"/>
+          <a:lstStyle/>
+          <a:p>
+            <a:pPr algn="ctr"/>
+            <a:endParaRPr lang="ko-KR" altLang="en-US">
+              <a:solidFill>
+                <a:prstClr val="white"/>
+              </a:solidFill>
+            </a:endParaRPr>
+          </a:p>
+        </p:txBody>
+      </p:sp>
+      <p:sp>
+        <p:nvSpPr>
+          <p:cNvPr id="8" name="모서리가 둥근 직사각형 7"/>
+          <p:cNvSpPr/>
+          <p:nvPr/>
+        </p:nvSpPr>
+        <p:spPr>
+          <a:xfrm>
+            <a:off x="246743" y="504825"/>
+            <a:ext cx="11771086" cy="6142718"/>
+          </a:xfrm>
+          <a:prstGeom prst="roundRect">
+            <a:avLst>
+              <a:gd name="adj" fmla="val 3722"/>
+            </a:avLst>
+          </a:prstGeom>
+          <a:solidFill>
+            <a:schemeClr val="bg1"/>
+          </a:solidFill>
+          <a:ln w="25400">
+            <a:solidFill>
+              <a:schemeClr val="tx1">
+                <a:lumMod val="85000"/>
+                <a:lumOff val="15000"/>
+              </a:schemeClr>
+            </a:solidFill>
+          </a:ln>
+          <a:effectLst>
+            <a:outerShdw blurRad="50800" dist="76200" dir="5400000" algn="t" rotWithShape="0">
+              <a:prstClr val="black">
+                <a:alpha val="19000"/>
+              </a:prstClr>
+            </a:outerShdw>
+          </a:effectLst>
+        </p:spPr>
+        <p:style>
+          <a:lnRef idx="2">
+            <a:schemeClr val="accent1">
+              <a:shade val="50000"/>
+            </a:schemeClr>
+          </a:lnRef>
+          <a:fillRef idx="1">
+            <a:schemeClr val="accent1"/>
+          </a:fillRef>
+          <a:effectRef idx="0">
+            <a:schemeClr val="accent1"/>
+          </a:effectRef>
+          <a:fontRef idx="minor">
+            <a:schemeClr val="lt1"/>
+          </a:fontRef>
+        </p:style>
+        <p:txBody>
+          <a:bodyPr rtlCol="0" anchor="ctr"/>
+          <a:lstStyle/>
+          <a:p>
+            <a:pPr algn="ctr"/>
+            <a:endParaRPr lang="ko-KR" altLang="en-US">
+              <a:solidFill>
+                <a:prstClr val="white"/>
+              </a:solidFill>
+            </a:endParaRPr>
+          </a:p>
+        </p:txBody>
+      </p:sp>
+      <p:sp>
+        <p:nvSpPr>
+          <p:cNvPr id="14" name="모서리가 둥근 직사각형 13"/>
+          <p:cNvSpPr/>
+          <p:nvPr/>
+        </p:nvSpPr>
+        <p:spPr>
+          <a:xfrm>
+            <a:off x="1407402" y="192881"/>
+            <a:ext cx="3558297" cy="677069"/>
+          </a:xfrm>
+          <a:prstGeom prst="roundRect">
+            <a:avLst/>
+          </a:prstGeom>
+          <a:solidFill>
+            <a:schemeClr val="bg1"/>
+          </a:solidFill>
+          <a:ln w="25400">
+            <a:solidFill>
+              <a:schemeClr val="tx1">
+                <a:lumMod val="85000"/>
+                <a:lumOff val="15000"/>
+              </a:schemeClr>
+            </a:solidFill>
+          </a:ln>
+          <a:effectLst>
+            <a:outerShdw blurRad="50800" dist="76200" dir="5400000" algn="t" rotWithShape="0">
+              <a:prstClr val="black">
+                <a:alpha val="19000"/>
+              </a:prstClr>
+            </a:outerShdw>
+          </a:effectLst>
+        </p:spPr>
+        <p:style>
+          <a:lnRef idx="2">
+            <a:schemeClr val="accent1">
+              <a:shade val="50000"/>
+            </a:schemeClr>
+          </a:lnRef>
+          <a:fillRef idx="1">
+            <a:schemeClr val="accent1"/>
+          </a:fillRef>
+          <a:effectRef idx="0">
+            <a:schemeClr val="accent1"/>
+          </a:effectRef>
+          <a:fontRef idx="minor">
+            <a:schemeClr val="lt1"/>
+          </a:fontRef>
+        </p:style>
+        <p:txBody>
+          <a:bodyPr rtlCol="0" anchor="ctr"/>
+          <a:lstStyle/>
+          <a:p>
+            <a:pPr algn="ctr"/>
+            <a:endParaRPr lang="ko-KR" altLang="en-US" sz="1600" dirty="0">
+              <a:solidFill>
+                <a:prstClr val="white"/>
+              </a:solidFill>
+            </a:endParaRPr>
+          </a:p>
+        </p:txBody>
+      </p:sp>
+      <p:sp>
+        <p:nvSpPr>
+          <p:cNvPr id="9" name="모서리가 둥근 직사각형 8"/>
+          <p:cNvSpPr/>
+          <p:nvPr/>
+        </p:nvSpPr>
+        <p:spPr>
+          <a:xfrm>
+            <a:off x="1356600" y="135731"/>
+            <a:ext cx="3551949" cy="677069"/>
+          </a:xfrm>
+          <a:prstGeom prst="roundRect">
+            <a:avLst/>
+          </a:prstGeom>
+          <a:solidFill>
+            <a:schemeClr val="tx1">
+              <a:lumMod val="75000"/>
+              <a:lumOff val="25000"/>
+            </a:schemeClr>
+          </a:solidFill>
+          <a:ln w="25400">
+            <a:solidFill>
+              <a:schemeClr val="tx1">
+                <a:lumMod val="85000"/>
+                <a:lumOff val="15000"/>
+              </a:schemeClr>
+            </a:solidFill>
+          </a:ln>
+          <a:effectLst>
+            <a:outerShdw blurRad="50800" dist="76200" dir="5400000" algn="t" rotWithShape="0">
+              <a:prstClr val="black">
+                <a:alpha val="19000"/>
+              </a:prstClr>
+            </a:outerShdw>
+          </a:effectLst>
+        </p:spPr>
+        <p:style>
+          <a:lnRef idx="2">
+            <a:schemeClr val="accent1">
+              <a:shade val="50000"/>
+            </a:schemeClr>
+          </a:lnRef>
+          <a:fillRef idx="1">
+            <a:schemeClr val="accent1"/>
+          </a:fillRef>
+          <a:effectRef idx="0">
+            <a:schemeClr val="accent1"/>
+          </a:effectRef>
+          <a:fontRef idx="minor">
+            <a:schemeClr val="lt1"/>
+          </a:fontRef>
+        </p:style>
+        <p:txBody>
+          <a:bodyPr rtlCol="0" anchor="ctr"/>
+          <a:lstStyle/>
+          <a:p>
+            <a:pPr algn="ctr"/>
+            <a:r>
+              <a:rPr lang="ko-KR" altLang="en-US" sz="2400" b="1" dirty="0">
+                <a:solidFill>
+                  <a:prstClr val="white"/>
+                </a:solidFill>
+              </a:rPr>
+              <a:t>결론 및 느낀 점</a:t>
+            </a:r>
+          </a:p>
+        </p:txBody>
+      </p:sp>
+      <p:sp>
+        <p:nvSpPr>
+          <p:cNvPr id="17" name="자유형 16"/>
+          <p:cNvSpPr/>
+          <p:nvPr/>
+        </p:nvSpPr>
+        <p:spPr>
+          <a:xfrm>
+            <a:off x="604271" y="173831"/>
+            <a:ext cx="682479" cy="847385"/>
+          </a:xfrm>
+          <a:custGeom>
+            <a:avLst/>
+            <a:gdLst>
+              <a:gd name="connsiteX0" fmla="*/ 112847 w 682479"/>
+              <a:gd name="connsiteY0" fmla="*/ 0 h 847385"/>
+              <a:gd name="connsiteX1" fmla="*/ 569632 w 682479"/>
+              <a:gd name="connsiteY1" fmla="*/ 0 h 847385"/>
+              <a:gd name="connsiteX2" fmla="*/ 682479 w 682479"/>
+              <a:gd name="connsiteY2" fmla="*/ 112847 h 847385"/>
+              <a:gd name="connsiteX3" fmla="*/ 682479 w 682479"/>
+              <a:gd name="connsiteY3" fmla="*/ 564222 h 847385"/>
+              <a:gd name="connsiteX4" fmla="*/ 569632 w 682479"/>
+              <a:gd name="connsiteY4" fmla="*/ 677069 h 847385"/>
+              <a:gd name="connsiteX5" fmla="*/ 383870 w 682479"/>
+              <a:gd name="connsiteY5" fmla="*/ 677069 h 847385"/>
+              <a:gd name="connsiteX6" fmla="*/ 192014 w 682479"/>
+              <a:gd name="connsiteY6" fmla="*/ 847385 h 847385"/>
+              <a:gd name="connsiteX7" fmla="*/ 226964 w 682479"/>
+              <a:gd name="connsiteY7" fmla="*/ 677069 h 847385"/>
+              <a:gd name="connsiteX8" fmla="*/ 112847 w 682479"/>
+              <a:gd name="connsiteY8" fmla="*/ 677069 h 847385"/>
+              <a:gd name="connsiteX9" fmla="*/ 0 w 682479"/>
+              <a:gd name="connsiteY9" fmla="*/ 564222 h 847385"/>
+              <a:gd name="connsiteX10" fmla="*/ 0 w 682479"/>
+              <a:gd name="connsiteY10" fmla="*/ 112847 h 847385"/>
+              <a:gd name="connsiteX11" fmla="*/ 112847 w 682479"/>
+              <a:gd name="connsiteY11" fmla="*/ 0 h 847385"/>
+            </a:gdLst>
+            <a:ahLst/>
+            <a:cxnLst>
+              <a:cxn ang="0">
+                <a:pos x="connsiteX0" y="connsiteY0"/>
+              </a:cxn>
+              <a:cxn ang="0">
+                <a:pos x="connsiteX1" y="connsiteY1"/>
+              </a:cxn>
+              <a:cxn ang="0">
+                <a:pos x="connsiteX2" y="connsiteY2"/>
+              </a:cxn>
+              <a:cxn ang="0">
+                <a:pos x="connsiteX3" y="connsiteY3"/>
+              </a:cxn>
+              <a:cxn ang="0">
+                <a:pos x="connsiteX4" y="connsiteY4"/>
+              </a:cxn>
+              <a:cxn ang="0">
+                <a:pos x="connsiteX5" y="connsiteY5"/>
+              </a:cxn>
+              <a:cxn ang="0">
+                <a:pos x="connsiteX6" y="connsiteY6"/>
+              </a:cxn>
+              <a:cxn ang="0">
+                <a:pos x="connsiteX7" y="connsiteY7"/>
+              </a:cxn>
+              <a:cxn ang="0">
+                <a:pos x="connsiteX8" y="connsiteY8"/>
+              </a:cxn>
+              <a:cxn ang="0">
+                <a:pos x="connsiteX9" y="connsiteY9"/>
+              </a:cxn>
+              <a:cxn ang="0">
+                <a:pos x="connsiteX10" y="connsiteY10"/>
+              </a:cxn>
+              <a:cxn ang="0">
+                <a:pos x="connsiteX11" y="connsiteY11"/>
+              </a:cxn>
+            </a:cxnLst>
+            <a:rect l="l" t="t" r="r" b="b"/>
+            <a:pathLst>
+              <a:path w="682479" h="847385">
+                <a:moveTo>
+                  <a:pt x="112847" y="0"/>
+                </a:moveTo>
+                <a:lnTo>
+                  <a:pt x="569632" y="0"/>
+                </a:lnTo>
+                <a:cubicBezTo>
+                  <a:pt x="631956" y="0"/>
+                  <a:pt x="682479" y="50523"/>
+                  <a:pt x="682479" y="112847"/>
+                </a:cubicBezTo>
+                <a:lnTo>
+                  <a:pt x="682479" y="564222"/>
+                </a:lnTo>
+                <a:cubicBezTo>
+                  <a:pt x="682479" y="626546"/>
+                  <a:pt x="631956" y="677069"/>
+                  <a:pt x="569632" y="677069"/>
+                </a:cubicBezTo>
+                <a:lnTo>
+                  <a:pt x="383870" y="677069"/>
+                </a:lnTo>
+                <a:lnTo>
+                  <a:pt x="192014" y="847385"/>
+                </a:lnTo>
+                <a:lnTo>
+                  <a:pt x="226964" y="677069"/>
+                </a:lnTo>
+                <a:lnTo>
+                  <a:pt x="112847" y="677069"/>
+                </a:lnTo>
+                <a:cubicBezTo>
+                  <a:pt x="50523" y="677069"/>
+                  <a:pt x="0" y="626546"/>
+                  <a:pt x="0" y="564222"/>
+                </a:cubicBezTo>
+                <a:lnTo>
+                  <a:pt x="0" y="112847"/>
+                </a:lnTo>
+                <a:cubicBezTo>
+                  <a:pt x="0" y="50523"/>
+                  <a:pt x="50523" y="0"/>
+                  <a:pt x="112847" y="0"/>
+                </a:cubicBezTo>
+                <a:close/>
+              </a:path>
+            </a:pathLst>
+          </a:custGeom>
+          <a:solidFill>
+            <a:schemeClr val="bg1"/>
+          </a:solidFill>
+          <a:ln w="25400">
+            <a:solidFill>
+              <a:schemeClr val="tx1">
+                <a:lumMod val="85000"/>
+                <a:lumOff val="15000"/>
+              </a:schemeClr>
+            </a:solidFill>
+          </a:ln>
+          <a:effectLst>
+            <a:outerShdw blurRad="50800" dist="76200" dir="5400000" algn="t" rotWithShape="0">
+              <a:prstClr val="black">
+                <a:alpha val="19000"/>
+              </a:prstClr>
+            </a:outerShdw>
+          </a:effectLst>
+        </p:spPr>
+        <p:style>
+          <a:lnRef idx="2">
+            <a:schemeClr val="accent1">
+              <a:shade val="50000"/>
+            </a:schemeClr>
+          </a:lnRef>
+          <a:fillRef idx="1">
+            <a:schemeClr val="accent1"/>
+          </a:fillRef>
+          <a:effectRef idx="0">
+            <a:schemeClr val="accent1"/>
+          </a:effectRef>
+          <a:fontRef idx="minor">
+            <a:schemeClr val="lt1"/>
+          </a:fontRef>
+        </p:style>
+        <p:txBody>
+          <a:bodyPr rtlCol="0" anchor="ctr"/>
+          <a:lstStyle/>
+          <a:p>
+            <a:pPr algn="ctr"/>
+            <a:endParaRPr lang="ko-KR" altLang="en-US">
+              <a:solidFill>
+                <a:prstClr val="white"/>
+              </a:solidFill>
+            </a:endParaRPr>
+          </a:p>
+        </p:txBody>
+      </p:sp>
+      <p:sp>
+        <p:nvSpPr>
+          <p:cNvPr id="16" name="자유형 15"/>
+          <p:cNvSpPr/>
+          <p:nvPr/>
+        </p:nvSpPr>
+        <p:spPr>
+          <a:xfrm>
+            <a:off x="559821" y="135731"/>
+            <a:ext cx="682479" cy="847385"/>
+          </a:xfrm>
+          <a:custGeom>
+            <a:avLst/>
+            <a:gdLst>
+              <a:gd name="connsiteX0" fmla="*/ 112847 w 682479"/>
+              <a:gd name="connsiteY0" fmla="*/ 0 h 847385"/>
+              <a:gd name="connsiteX1" fmla="*/ 569632 w 682479"/>
+              <a:gd name="connsiteY1" fmla="*/ 0 h 847385"/>
+              <a:gd name="connsiteX2" fmla="*/ 682479 w 682479"/>
+              <a:gd name="connsiteY2" fmla="*/ 112847 h 847385"/>
+              <a:gd name="connsiteX3" fmla="*/ 682479 w 682479"/>
+              <a:gd name="connsiteY3" fmla="*/ 564222 h 847385"/>
+              <a:gd name="connsiteX4" fmla="*/ 569632 w 682479"/>
+              <a:gd name="connsiteY4" fmla="*/ 677069 h 847385"/>
+              <a:gd name="connsiteX5" fmla="*/ 383870 w 682479"/>
+              <a:gd name="connsiteY5" fmla="*/ 677069 h 847385"/>
+              <a:gd name="connsiteX6" fmla="*/ 192014 w 682479"/>
+              <a:gd name="connsiteY6" fmla="*/ 847385 h 847385"/>
+              <a:gd name="connsiteX7" fmla="*/ 226964 w 682479"/>
+              <a:gd name="connsiteY7" fmla="*/ 677069 h 847385"/>
+              <a:gd name="connsiteX8" fmla="*/ 112847 w 682479"/>
+              <a:gd name="connsiteY8" fmla="*/ 677069 h 847385"/>
+              <a:gd name="connsiteX9" fmla="*/ 0 w 682479"/>
+              <a:gd name="connsiteY9" fmla="*/ 564222 h 847385"/>
+              <a:gd name="connsiteX10" fmla="*/ 0 w 682479"/>
+              <a:gd name="connsiteY10" fmla="*/ 112847 h 847385"/>
+              <a:gd name="connsiteX11" fmla="*/ 112847 w 682479"/>
+              <a:gd name="connsiteY11" fmla="*/ 0 h 847385"/>
+            </a:gdLst>
+            <a:ahLst/>
+            <a:cxnLst>
+              <a:cxn ang="0">
+                <a:pos x="connsiteX0" y="connsiteY0"/>
+              </a:cxn>
+              <a:cxn ang="0">
+                <a:pos x="connsiteX1" y="connsiteY1"/>
+              </a:cxn>
+              <a:cxn ang="0">
+                <a:pos x="connsiteX2" y="connsiteY2"/>
+              </a:cxn>
+              <a:cxn ang="0">
+                <a:pos x="connsiteX3" y="connsiteY3"/>
+              </a:cxn>
+              <a:cxn ang="0">
+                <a:pos x="connsiteX4" y="connsiteY4"/>
+              </a:cxn>
+              <a:cxn ang="0">
+                <a:pos x="connsiteX5" y="connsiteY5"/>
+              </a:cxn>
+              <a:cxn ang="0">
+                <a:pos x="connsiteX6" y="connsiteY6"/>
+              </a:cxn>
+              <a:cxn ang="0">
+                <a:pos x="connsiteX7" y="connsiteY7"/>
+              </a:cxn>
+              <a:cxn ang="0">
+                <a:pos x="connsiteX8" y="connsiteY8"/>
+              </a:cxn>
+              <a:cxn ang="0">
+                <a:pos x="connsiteX9" y="connsiteY9"/>
+              </a:cxn>
+              <a:cxn ang="0">
+                <a:pos x="connsiteX10" y="connsiteY10"/>
+              </a:cxn>
+              <a:cxn ang="0">
+                <a:pos x="connsiteX11" y="connsiteY11"/>
+              </a:cxn>
+            </a:cxnLst>
+            <a:rect l="l" t="t" r="r" b="b"/>
+            <a:pathLst>
+              <a:path w="682479" h="847385">
+                <a:moveTo>
+                  <a:pt x="112847" y="0"/>
+                </a:moveTo>
+                <a:lnTo>
+                  <a:pt x="569632" y="0"/>
+                </a:lnTo>
+                <a:cubicBezTo>
+                  <a:pt x="631956" y="0"/>
+                  <a:pt x="682479" y="50523"/>
+                  <a:pt x="682479" y="112847"/>
+                </a:cubicBezTo>
+                <a:lnTo>
+                  <a:pt x="682479" y="564222"/>
+                </a:lnTo>
+                <a:cubicBezTo>
+                  <a:pt x="682479" y="626546"/>
+                  <a:pt x="631956" y="677069"/>
+                  <a:pt x="569632" y="677069"/>
+                </a:cubicBezTo>
+                <a:lnTo>
+                  <a:pt x="383870" y="677069"/>
+                </a:lnTo>
+                <a:lnTo>
+                  <a:pt x="192014" y="847385"/>
+                </a:lnTo>
+                <a:lnTo>
+                  <a:pt x="226964" y="677069"/>
+                </a:lnTo>
+                <a:lnTo>
+                  <a:pt x="112847" y="677069"/>
+                </a:lnTo>
+                <a:cubicBezTo>
+                  <a:pt x="50523" y="677069"/>
+                  <a:pt x="0" y="626546"/>
+                  <a:pt x="0" y="564222"/>
+                </a:cubicBezTo>
+                <a:lnTo>
+                  <a:pt x="0" y="112847"/>
+                </a:lnTo>
+                <a:cubicBezTo>
+                  <a:pt x="0" y="50523"/>
+                  <a:pt x="50523" y="0"/>
+                  <a:pt x="112847" y="0"/>
+                </a:cubicBezTo>
+                <a:close/>
+              </a:path>
+            </a:pathLst>
+          </a:custGeom>
+          <a:solidFill>
+            <a:schemeClr val="tx1">
+              <a:lumMod val="75000"/>
+              <a:lumOff val="25000"/>
+            </a:schemeClr>
+          </a:solidFill>
+          <a:ln w="25400">
+            <a:solidFill>
+              <a:schemeClr val="tx1">
+                <a:lumMod val="85000"/>
+                <a:lumOff val="15000"/>
+              </a:schemeClr>
+            </a:solidFill>
+          </a:ln>
+          <a:effectLst>
+            <a:outerShdw blurRad="50800" dist="76200" dir="5400000" algn="t" rotWithShape="0">
+              <a:prstClr val="black">
+                <a:alpha val="19000"/>
+              </a:prstClr>
+            </a:outerShdw>
+          </a:effectLst>
+        </p:spPr>
+        <p:style>
+          <a:lnRef idx="2">
+            <a:schemeClr val="accent1">
+              <a:shade val="50000"/>
+            </a:schemeClr>
+          </a:lnRef>
+          <a:fillRef idx="1">
+            <a:schemeClr val="accent1"/>
+          </a:fillRef>
+          <a:effectRef idx="0">
+            <a:schemeClr val="accent1"/>
+          </a:effectRef>
+          <a:fontRef idx="minor">
+            <a:schemeClr val="lt1"/>
+          </a:fontRef>
+        </p:style>
+        <p:txBody>
+          <a:bodyPr rtlCol="0" anchor="ctr"/>
+          <a:lstStyle/>
+          <a:p>
+            <a:pPr algn="ctr"/>
+            <a:endParaRPr lang="ko-KR" altLang="en-US">
+              <a:solidFill>
+                <a:prstClr val="white"/>
+              </a:solidFill>
+            </a:endParaRPr>
+          </a:p>
+        </p:txBody>
+      </p:sp>
+      <p:sp>
+        <p:nvSpPr>
+          <p:cNvPr id="7" name="타원 6"/>
+          <p:cNvSpPr/>
+          <p:nvPr/>
+        </p:nvSpPr>
+        <p:spPr>
+          <a:xfrm>
+            <a:off x="696673" y="269081"/>
+            <a:ext cx="414000" cy="413544"/>
+          </a:xfrm>
+          <a:prstGeom prst="ellipse">
+            <a:avLst/>
+          </a:prstGeom>
+          <a:solidFill>
+            <a:srgbClr val="FF6600"/>
+          </a:solidFill>
+          <a:ln w="9525" cmpd="sng">
+            <a:solidFill>
+              <a:schemeClr val="tx1">
+                <a:lumMod val="75000"/>
+                <a:lumOff val="25000"/>
+              </a:schemeClr>
+            </a:solidFill>
+          </a:ln>
+          <a:effectLst>
+            <a:outerShdw sx="110000" sy="110000" algn="ctr" rotWithShape="0">
+              <a:schemeClr val="bg1"/>
+            </a:outerShdw>
+          </a:effectLst>
+        </p:spPr>
+        <p:style>
+          <a:lnRef idx="2">
+            <a:schemeClr val="accent1">
+              <a:shade val="50000"/>
+            </a:schemeClr>
+          </a:lnRef>
+          <a:fillRef idx="1">
+            <a:schemeClr val="accent1"/>
+          </a:fillRef>
+          <a:effectRef idx="0">
+            <a:schemeClr val="accent1"/>
+          </a:effectRef>
+          <a:fontRef idx="minor">
+            <a:schemeClr val="lt1"/>
+          </a:fontRef>
+        </p:style>
+        <p:txBody>
+          <a:bodyPr wrap="none" rtlCol="0" anchor="ctr"/>
+          <a:lstStyle/>
+          <a:p>
+            <a:pPr algn="ctr"/>
+            <a:r>
+              <a:rPr lang="en-US" altLang="ko-KR" b="1" dirty="0">
+                <a:solidFill>
+                  <a:prstClr val="white"/>
+                </a:solidFill>
+              </a:rPr>
+              <a:t>04</a:t>
+            </a:r>
+            <a:endParaRPr lang="ko-KR" altLang="en-US" b="1" dirty="0">
+              <a:solidFill>
+                <a:prstClr val="white"/>
+              </a:solidFill>
+            </a:endParaRPr>
+          </a:p>
+        </p:txBody>
+      </p:sp>
       <p:pic>
         <p:nvPicPr>
           <p:cNvPr id="24" name="그림 23">
@@ -10192,14 +12733,14 @@
           <p:nvPr/>
         </p:nvPicPr>
         <p:blipFill>
-          <a:blip r:embed="rId3"/>
+          <a:blip r:embed="rId2"/>
           <a:stretch>
             <a:fillRect/>
           </a:stretch>
         </p:blipFill>
         <p:spPr>
           <a:xfrm>
-            <a:off x="696673" y="3741783"/>
+            <a:off x="598743" y="1403907"/>
             <a:ext cx="933450" cy="333375"/>
           </a:xfrm>
           <a:prstGeom prst="rect">
@@ -10221,8 +12762,8 @@
         </p:nvSpPr>
         <p:spPr>
           <a:xfrm>
-            <a:off x="1286750" y="4246472"/>
-            <a:ext cx="10077341" cy="1128963"/>
+            <a:off x="1188820" y="1908596"/>
+            <a:ext cx="10077341" cy="1682961"/>
           </a:xfrm>
           <a:prstGeom prst="rect">
             <a:avLst/>
@@ -10287,6 +12828,16 @@
               <a:buChar char="-"/>
             </a:pPr>
             <a:r>
+              <a:rPr lang="en-US" altLang="ko-KR" sz="2400" b="1" dirty="0">
+                <a:solidFill>
+                  <a:schemeClr val="bg2">
+                    <a:lumMod val="25000"/>
+                  </a:schemeClr>
+                </a:solidFill>
+              </a:rPr>
+              <a:t>React</a:t>
+            </a:r>
+            <a:r>
               <a:rPr lang="ko-KR" altLang="en-US" sz="2400" b="1" dirty="0">
                 <a:solidFill>
                   <a:schemeClr val="bg2">
@@ -10294,7 +12845,35 @@
                   </a:schemeClr>
                 </a:solidFill>
               </a:rPr>
-              <a:t>대규모 프로젝트에 적합</a:t>
+              <a:t>의 넓은 커뮤니티 즉</a:t>
+            </a:r>
+            <a:r>
+              <a:rPr lang="en-US" altLang="ko-KR" sz="2400" b="1" dirty="0">
+                <a:solidFill>
+                  <a:schemeClr val="bg2">
+                    <a:lumMod val="25000"/>
+                  </a:schemeClr>
+                </a:solidFill>
+              </a:rPr>
+              <a:t>, </a:t>
+            </a:r>
+            <a:r>
+              <a:rPr lang="ko-KR" altLang="en-US" sz="2400" b="1" dirty="0">
+                <a:solidFill>
+                  <a:srgbClr val="FF0000"/>
+                </a:solidFill>
+              </a:rPr>
+              <a:t>오픈소스를 활용해서 빠르게 개발</a:t>
+            </a:r>
+            <a:r>
+              <a:rPr lang="ko-KR" altLang="en-US" sz="2400" b="1" dirty="0">
+                <a:solidFill>
+                  <a:schemeClr val="bg2">
+                    <a:lumMod val="25000"/>
+                  </a:schemeClr>
+                </a:solidFill>
+              </a:rPr>
+              <a:t>하고자 할 때 </a:t>
             </a:r>
             <a:endParaRPr lang="en-US" altLang="ko-KR" sz="2400" b="1" dirty="0">
               <a:solidFill>
@@ -10320,7 +12899,7 @@
         </p:nvSpPr>
         <p:spPr>
           <a:xfrm>
-            <a:off x="1892004" y="3640117"/>
+            <a:off x="1794074" y="1302241"/>
             <a:ext cx="3972768" cy="523220"/>
           </a:xfrm>
           <a:prstGeom prst="rect">
@@ -10348,7 +12927,7 @@
     </p:spTree>
     <p:extLst>
       <p:ext uri="{BB962C8B-B14F-4D97-AF65-F5344CB8AC3E}">
-        <p14:creationId xmlns:p14="http://schemas.microsoft.com/office/powerpoint/2010/main" val="3609804837"/>
+        <p14:creationId xmlns:p14="http://schemas.microsoft.com/office/powerpoint/2010/main" val="3947103394"/>
       </p:ext>
     </p:extLst>
   </p:cSld>

</xml_diff>

<commit_message>
update: update vue_react.ppt and peopleworx
</commit_message>
<xml_diff>
--- a/ppt/Vue_React.pptx
+++ b/ppt/Vue_React.pptx
@@ -12,9 +12,10 @@
     <p:sldId id="260" r:id="rId6"/>
     <p:sldId id="261" r:id="rId7"/>
     <p:sldId id="265" r:id="rId8"/>
-    <p:sldId id="262" r:id="rId9"/>
-    <p:sldId id="266" r:id="rId10"/>
-    <p:sldId id="267" r:id="rId11"/>
+    <p:sldId id="268" r:id="rId9"/>
+    <p:sldId id="262" r:id="rId10"/>
+    <p:sldId id="266" r:id="rId11"/>
+    <p:sldId id="267" r:id="rId12"/>
   </p:sldIdLst>
   <p:sldSz cx="12192000" cy="6858000"/>
   <p:notesSz cx="6858000" cy="9144000"/>
@@ -275,7 +276,7 @@
                 </a:solidFill>
               </a:rPr>
               <a:pPr/>
-              <a:t>2021-04-13</a:t>
+              <a:t>2021-04-21</a:t>
             </a:fld>
             <a:endParaRPr lang="ko-KR" altLang="en-US">
               <a:solidFill>
@@ -505,7 +506,7 @@
                 </a:solidFill>
               </a:rPr>
               <a:pPr/>
-              <a:t>2021-04-13</a:t>
+              <a:t>2021-04-21</a:t>
             </a:fld>
             <a:endParaRPr lang="ko-KR" altLang="en-US">
               <a:solidFill>
@@ -745,7 +746,7 @@
                 </a:solidFill>
               </a:rPr>
               <a:pPr/>
-              <a:t>2021-04-13</a:t>
+              <a:t>2021-04-21</a:t>
             </a:fld>
             <a:endParaRPr lang="ko-KR" altLang="en-US">
               <a:solidFill>
@@ -975,7 +976,7 @@
                 </a:solidFill>
               </a:rPr>
               <a:pPr/>
-              <a:t>2021-04-13</a:t>
+              <a:t>2021-04-21</a:t>
             </a:fld>
             <a:endParaRPr lang="ko-KR" altLang="en-US">
               <a:solidFill>
@@ -1282,7 +1283,7 @@
                 </a:solidFill>
               </a:rPr>
               <a:pPr/>
-              <a:t>2021-04-13</a:t>
+              <a:t>2021-04-21</a:t>
             </a:fld>
             <a:endParaRPr lang="ko-KR" altLang="en-US">
               <a:solidFill>
@@ -1579,7 +1580,7 @@
                 </a:solidFill>
               </a:rPr>
               <a:pPr/>
-              <a:t>2021-04-13</a:t>
+              <a:t>2021-04-21</a:t>
             </a:fld>
             <a:endParaRPr lang="ko-KR" altLang="en-US">
               <a:solidFill>
@@ -2023,7 +2024,7 @@
                 </a:solidFill>
               </a:rPr>
               <a:pPr/>
-              <a:t>2021-04-13</a:t>
+              <a:t>2021-04-21</a:t>
             </a:fld>
             <a:endParaRPr lang="ko-KR" altLang="en-US">
               <a:solidFill>
@@ -2196,7 +2197,7 @@
                 </a:solidFill>
               </a:rPr>
               <a:pPr/>
-              <a:t>2021-04-13</a:t>
+              <a:t>2021-04-21</a:t>
             </a:fld>
             <a:endParaRPr lang="ko-KR" altLang="en-US">
               <a:solidFill>
@@ -2341,7 +2342,7 @@
                 </a:solidFill>
               </a:rPr>
               <a:pPr/>
-              <a:t>2021-04-13</a:t>
+              <a:t>2021-04-21</a:t>
             </a:fld>
             <a:endParaRPr lang="ko-KR" altLang="en-US">
               <a:solidFill>
@@ -2684,7 +2685,7 @@
                 </a:solidFill>
               </a:rPr>
               <a:pPr/>
-              <a:t>2021-04-13</a:t>
+              <a:t>2021-04-21</a:t>
             </a:fld>
             <a:endParaRPr lang="ko-KR" altLang="en-US">
               <a:solidFill>
@@ -3004,7 +3005,7 @@
                 </a:solidFill>
               </a:rPr>
               <a:pPr/>
-              <a:t>2021-04-13</a:t>
+              <a:t>2021-04-21</a:t>
             </a:fld>
             <a:endParaRPr lang="ko-KR" altLang="en-US">
               <a:solidFill>
@@ -3277,7 +3278,7 @@
                 </a:solidFill>
               </a:rPr>
               <a:pPr/>
-              <a:t>2021-04-13</a:t>
+              <a:t>2021-04-21</a:t>
             </a:fld>
             <a:endParaRPr lang="ko-KR" altLang="en-US">
               <a:solidFill>
@@ -4949,7 +4950,7 @@
                   <a:prstClr val="white"/>
                 </a:solidFill>
               </a:rPr>
-              <a:t>향후 계획</a:t>
+              <a:t>결론 및 느낀 점</a:t>
             </a:r>
           </a:p>
         </p:txBody>
@@ -5379,6 +5380,928 @@
           </a:p>
         </p:txBody>
       </p:sp>
+      <p:pic>
+        <p:nvPicPr>
+          <p:cNvPr id="24" name="그림 23">
+            <a:extLst>
+              <a:ext uri="{FF2B5EF4-FFF2-40B4-BE49-F238E27FC236}">
+                <a16:creationId xmlns:a16="http://schemas.microsoft.com/office/drawing/2014/main" id="{AF28A506-BB3F-4E34-999D-091F1A335A4B}"/>
+              </a:ext>
+            </a:extLst>
+          </p:cNvPr>
+          <p:cNvPicPr>
+            <a:picLocks noChangeAspect="1"/>
+          </p:cNvPicPr>
+          <p:nvPr/>
+        </p:nvPicPr>
+        <p:blipFill>
+          <a:blip r:embed="rId2"/>
+          <a:stretch>
+            <a:fillRect/>
+          </a:stretch>
+        </p:blipFill>
+        <p:spPr>
+          <a:xfrm>
+            <a:off x="598743" y="1403907"/>
+            <a:ext cx="933450" cy="333375"/>
+          </a:xfrm>
+          <a:prstGeom prst="rect">
+            <a:avLst/>
+          </a:prstGeom>
+        </p:spPr>
+      </p:pic>
+      <p:sp>
+        <p:nvSpPr>
+          <p:cNvPr id="25" name="TextBox 24">
+            <a:extLst>
+              <a:ext uri="{FF2B5EF4-FFF2-40B4-BE49-F238E27FC236}">
+                <a16:creationId xmlns:a16="http://schemas.microsoft.com/office/drawing/2014/main" id="{1D3A90C7-6F27-4CAF-9CE0-CB06EFD813A0}"/>
+              </a:ext>
+            </a:extLst>
+          </p:cNvPr>
+          <p:cNvSpPr txBox="1"/>
+          <p:nvPr/>
+        </p:nvSpPr>
+        <p:spPr>
+          <a:xfrm>
+            <a:off x="1188820" y="1908596"/>
+            <a:ext cx="10077341" cy="1682961"/>
+          </a:xfrm>
+          <a:prstGeom prst="rect">
+            <a:avLst/>
+          </a:prstGeom>
+          <a:noFill/>
+        </p:spPr>
+        <p:txBody>
+          <a:bodyPr wrap="square" rtlCol="0">
+            <a:spAutoFit/>
+          </a:bodyPr>
+          <a:lstStyle/>
+          <a:p>
+            <a:pPr marL="342900" indent="-342900">
+              <a:lnSpc>
+                <a:spcPct val="150000"/>
+              </a:lnSpc>
+              <a:buFontTx/>
+              <a:buChar char="-"/>
+            </a:pPr>
+            <a:r>
+              <a:rPr lang="ko-KR" altLang="en-US" sz="2400" b="1" dirty="0">
+                <a:solidFill>
+                  <a:schemeClr val="bg2">
+                    <a:lumMod val="25000"/>
+                  </a:schemeClr>
+                </a:solidFill>
+              </a:rPr>
+              <a:t>서비스를 </a:t>
+            </a:r>
+            <a:r>
+              <a:rPr lang="ko-KR" altLang="en-US" sz="2400" b="1" dirty="0">
+                <a:solidFill>
+                  <a:srgbClr val="FF0000"/>
+                </a:solidFill>
+              </a:rPr>
+              <a:t>모바일로 확장</a:t>
+            </a:r>
+            <a:r>
+              <a:rPr lang="ko-KR" altLang="en-US" sz="2400" b="1" dirty="0">
+                <a:solidFill>
+                  <a:schemeClr val="bg2">
+                    <a:lumMod val="25000"/>
+                  </a:schemeClr>
+                </a:solidFill>
+              </a:rPr>
+              <a:t>하고자 할 때</a:t>
+            </a:r>
+            <a:endParaRPr lang="en-US" altLang="ko-KR" sz="2400" b="1" dirty="0">
+              <a:solidFill>
+                <a:schemeClr val="bg2">
+                  <a:lumMod val="25000"/>
+                </a:schemeClr>
+              </a:solidFill>
+            </a:endParaRPr>
+          </a:p>
+          <a:p>
+            <a:pPr marL="342900" indent="-342900">
+              <a:lnSpc>
+                <a:spcPct val="150000"/>
+              </a:lnSpc>
+              <a:buFontTx/>
+              <a:buChar char="-"/>
+            </a:pPr>
+            <a:r>
+              <a:rPr lang="en-US" altLang="ko-KR" sz="2400" b="1" dirty="0">
+                <a:solidFill>
+                  <a:schemeClr val="bg2">
+                    <a:lumMod val="25000"/>
+                  </a:schemeClr>
+                </a:solidFill>
+              </a:rPr>
+              <a:t>React</a:t>
+            </a:r>
+            <a:r>
+              <a:rPr lang="ko-KR" altLang="en-US" sz="2400" b="1" dirty="0">
+                <a:solidFill>
+                  <a:schemeClr val="bg2">
+                    <a:lumMod val="25000"/>
+                  </a:schemeClr>
+                </a:solidFill>
+              </a:rPr>
+              <a:t>의 넓은 커뮤니티 즉</a:t>
+            </a:r>
+            <a:r>
+              <a:rPr lang="en-US" altLang="ko-KR" sz="2400" b="1" dirty="0">
+                <a:solidFill>
+                  <a:schemeClr val="bg2">
+                    <a:lumMod val="25000"/>
+                  </a:schemeClr>
+                </a:solidFill>
+              </a:rPr>
+              <a:t>, </a:t>
+            </a:r>
+            <a:r>
+              <a:rPr lang="ko-KR" altLang="en-US" sz="2400" b="1" dirty="0">
+                <a:solidFill>
+                  <a:srgbClr val="FF0000"/>
+                </a:solidFill>
+              </a:rPr>
+              <a:t>오픈소스를 활용해서 빠르게 개발</a:t>
+            </a:r>
+            <a:r>
+              <a:rPr lang="ko-KR" altLang="en-US" sz="2400" b="1" dirty="0">
+                <a:solidFill>
+                  <a:schemeClr val="bg2">
+                    <a:lumMod val="25000"/>
+                  </a:schemeClr>
+                </a:solidFill>
+              </a:rPr>
+              <a:t>하고자 할 때 </a:t>
+            </a:r>
+            <a:endParaRPr lang="en-US" altLang="ko-KR" sz="2400" b="1" dirty="0">
+              <a:solidFill>
+                <a:schemeClr val="bg2">
+                  <a:lumMod val="25000"/>
+                </a:schemeClr>
+              </a:solidFill>
+            </a:endParaRPr>
+          </a:p>
+        </p:txBody>
+      </p:sp>
+      <p:sp>
+        <p:nvSpPr>
+          <p:cNvPr id="26" name="TextBox 25">
+            <a:extLst>
+              <a:ext uri="{FF2B5EF4-FFF2-40B4-BE49-F238E27FC236}">
+                <a16:creationId xmlns:a16="http://schemas.microsoft.com/office/drawing/2014/main" id="{99F1A16B-C332-41FF-9935-CCDD67A00B5F}"/>
+              </a:ext>
+            </a:extLst>
+          </p:cNvPr>
+          <p:cNvSpPr txBox="1"/>
+          <p:nvPr/>
+        </p:nvSpPr>
+        <p:spPr>
+          <a:xfrm>
+            <a:off x="1794074" y="1302241"/>
+            <a:ext cx="3972768" cy="523220"/>
+          </a:xfrm>
+          <a:prstGeom prst="rect">
+            <a:avLst/>
+          </a:prstGeom>
+          <a:noFill/>
+        </p:spPr>
+        <p:txBody>
+          <a:bodyPr wrap="square" rtlCol="0">
+            <a:spAutoFit/>
+          </a:bodyPr>
+          <a:lstStyle/>
+          <a:p>
+            <a:r>
+              <a:rPr lang="en-US" altLang="ko-KR" sz="2800" b="1" dirty="0"/>
+              <a:t>React</a:t>
+            </a:r>
+            <a:r>
+              <a:rPr lang="ko-KR" altLang="en-US" sz="2800" b="1" dirty="0"/>
+              <a:t>를 선택하는 경우</a:t>
+            </a:r>
+          </a:p>
+        </p:txBody>
+      </p:sp>
+    </p:spTree>
+    <p:extLst>
+      <p:ext uri="{BB962C8B-B14F-4D97-AF65-F5344CB8AC3E}">
+        <p14:creationId xmlns:p14="http://schemas.microsoft.com/office/powerpoint/2010/main" val="3947103394"/>
+      </p:ext>
+    </p:extLst>
+  </p:cSld>
+  <p:clrMapOvr>
+    <a:masterClrMapping/>
+  </p:clrMapOvr>
+</p:sld>
+</file>
+
+<file path=ppt/slides/slide11.xml><?xml version="1.0" encoding="utf-8"?>
+<p:sld xmlns:a="http://schemas.openxmlformats.org/drawingml/2006/main" xmlns:r="http://schemas.openxmlformats.org/officeDocument/2006/relationships" xmlns:p="http://schemas.openxmlformats.org/presentationml/2006/main">
+  <p:cSld>
+    <p:spTree>
+      <p:nvGrpSpPr>
+        <p:cNvPr id="1" name=""/>
+        <p:cNvGrpSpPr/>
+        <p:nvPr/>
+      </p:nvGrpSpPr>
+      <p:grpSpPr>
+        <a:xfrm>
+          <a:off x="0" y="0"/>
+          <a:ext cx="0" cy="0"/>
+          <a:chOff x="0" y="0"/>
+          <a:chExt cx="0" cy="0"/>
+        </a:xfrm>
+      </p:grpSpPr>
+      <p:sp>
+        <p:nvSpPr>
+          <p:cNvPr id="15" name="모서리가 둥근 직사각형 14"/>
+          <p:cNvSpPr/>
+          <p:nvPr/>
+        </p:nvSpPr>
+        <p:spPr>
+          <a:xfrm>
+            <a:off x="297543" y="581819"/>
+            <a:ext cx="11771086" cy="6142718"/>
+          </a:xfrm>
+          <a:prstGeom prst="roundRect">
+            <a:avLst>
+              <a:gd name="adj" fmla="val 3722"/>
+            </a:avLst>
+          </a:prstGeom>
+          <a:solidFill>
+            <a:schemeClr val="tx1">
+              <a:lumMod val="75000"/>
+              <a:lumOff val="25000"/>
+            </a:schemeClr>
+          </a:solidFill>
+          <a:ln w="25400">
+            <a:solidFill>
+              <a:schemeClr val="tx1">
+                <a:lumMod val="85000"/>
+                <a:lumOff val="15000"/>
+              </a:schemeClr>
+            </a:solidFill>
+          </a:ln>
+          <a:effectLst>
+            <a:outerShdw blurRad="50800" dist="76200" dir="5400000" algn="t" rotWithShape="0">
+              <a:prstClr val="black">
+                <a:alpha val="19000"/>
+              </a:prstClr>
+            </a:outerShdw>
+          </a:effectLst>
+        </p:spPr>
+        <p:style>
+          <a:lnRef idx="2">
+            <a:schemeClr val="accent1">
+              <a:shade val="50000"/>
+            </a:schemeClr>
+          </a:lnRef>
+          <a:fillRef idx="1">
+            <a:schemeClr val="accent1"/>
+          </a:fillRef>
+          <a:effectRef idx="0">
+            <a:schemeClr val="accent1"/>
+          </a:effectRef>
+          <a:fontRef idx="minor">
+            <a:schemeClr val="lt1"/>
+          </a:fontRef>
+        </p:style>
+        <p:txBody>
+          <a:bodyPr rtlCol="0" anchor="ctr"/>
+          <a:lstStyle/>
+          <a:p>
+            <a:pPr algn="ctr"/>
+            <a:endParaRPr lang="ko-KR" altLang="en-US">
+              <a:solidFill>
+                <a:prstClr val="white"/>
+              </a:solidFill>
+            </a:endParaRPr>
+          </a:p>
+        </p:txBody>
+      </p:sp>
+      <p:sp>
+        <p:nvSpPr>
+          <p:cNvPr id="8" name="모서리가 둥근 직사각형 7"/>
+          <p:cNvSpPr/>
+          <p:nvPr/>
+        </p:nvSpPr>
+        <p:spPr>
+          <a:xfrm>
+            <a:off x="246743" y="504825"/>
+            <a:ext cx="11771086" cy="6142718"/>
+          </a:xfrm>
+          <a:prstGeom prst="roundRect">
+            <a:avLst>
+              <a:gd name="adj" fmla="val 3722"/>
+            </a:avLst>
+          </a:prstGeom>
+          <a:solidFill>
+            <a:schemeClr val="bg1"/>
+          </a:solidFill>
+          <a:ln w="25400">
+            <a:solidFill>
+              <a:schemeClr val="tx1">
+                <a:lumMod val="85000"/>
+                <a:lumOff val="15000"/>
+              </a:schemeClr>
+            </a:solidFill>
+          </a:ln>
+          <a:effectLst>
+            <a:outerShdw blurRad="50800" dist="76200" dir="5400000" algn="t" rotWithShape="0">
+              <a:prstClr val="black">
+                <a:alpha val="19000"/>
+              </a:prstClr>
+            </a:outerShdw>
+          </a:effectLst>
+        </p:spPr>
+        <p:style>
+          <a:lnRef idx="2">
+            <a:schemeClr val="accent1">
+              <a:shade val="50000"/>
+            </a:schemeClr>
+          </a:lnRef>
+          <a:fillRef idx="1">
+            <a:schemeClr val="accent1"/>
+          </a:fillRef>
+          <a:effectRef idx="0">
+            <a:schemeClr val="accent1"/>
+          </a:effectRef>
+          <a:fontRef idx="minor">
+            <a:schemeClr val="lt1"/>
+          </a:fontRef>
+        </p:style>
+        <p:txBody>
+          <a:bodyPr rtlCol="0" anchor="ctr"/>
+          <a:lstStyle/>
+          <a:p>
+            <a:pPr algn="ctr"/>
+            <a:endParaRPr lang="ko-KR" altLang="en-US">
+              <a:solidFill>
+                <a:prstClr val="white"/>
+              </a:solidFill>
+            </a:endParaRPr>
+          </a:p>
+        </p:txBody>
+      </p:sp>
+      <p:sp>
+        <p:nvSpPr>
+          <p:cNvPr id="14" name="모서리가 둥근 직사각형 13"/>
+          <p:cNvSpPr/>
+          <p:nvPr/>
+        </p:nvSpPr>
+        <p:spPr>
+          <a:xfrm>
+            <a:off x="1407402" y="192881"/>
+            <a:ext cx="3558297" cy="677069"/>
+          </a:xfrm>
+          <a:prstGeom prst="roundRect">
+            <a:avLst/>
+          </a:prstGeom>
+          <a:solidFill>
+            <a:schemeClr val="bg1"/>
+          </a:solidFill>
+          <a:ln w="25400">
+            <a:solidFill>
+              <a:schemeClr val="tx1">
+                <a:lumMod val="85000"/>
+                <a:lumOff val="15000"/>
+              </a:schemeClr>
+            </a:solidFill>
+          </a:ln>
+          <a:effectLst>
+            <a:outerShdw blurRad="50800" dist="76200" dir="5400000" algn="t" rotWithShape="0">
+              <a:prstClr val="black">
+                <a:alpha val="19000"/>
+              </a:prstClr>
+            </a:outerShdw>
+          </a:effectLst>
+        </p:spPr>
+        <p:style>
+          <a:lnRef idx="2">
+            <a:schemeClr val="accent1">
+              <a:shade val="50000"/>
+            </a:schemeClr>
+          </a:lnRef>
+          <a:fillRef idx="1">
+            <a:schemeClr val="accent1"/>
+          </a:fillRef>
+          <a:effectRef idx="0">
+            <a:schemeClr val="accent1"/>
+          </a:effectRef>
+          <a:fontRef idx="minor">
+            <a:schemeClr val="lt1"/>
+          </a:fontRef>
+        </p:style>
+        <p:txBody>
+          <a:bodyPr rtlCol="0" anchor="ctr"/>
+          <a:lstStyle/>
+          <a:p>
+            <a:pPr algn="ctr"/>
+            <a:endParaRPr lang="ko-KR" altLang="en-US" sz="1600" dirty="0">
+              <a:solidFill>
+                <a:prstClr val="white"/>
+              </a:solidFill>
+            </a:endParaRPr>
+          </a:p>
+        </p:txBody>
+      </p:sp>
+      <p:sp>
+        <p:nvSpPr>
+          <p:cNvPr id="9" name="모서리가 둥근 직사각형 8"/>
+          <p:cNvSpPr/>
+          <p:nvPr/>
+        </p:nvSpPr>
+        <p:spPr>
+          <a:xfrm>
+            <a:off x="1356600" y="135731"/>
+            <a:ext cx="3551949" cy="677069"/>
+          </a:xfrm>
+          <a:prstGeom prst="roundRect">
+            <a:avLst/>
+          </a:prstGeom>
+          <a:solidFill>
+            <a:schemeClr val="tx1">
+              <a:lumMod val="75000"/>
+              <a:lumOff val="25000"/>
+            </a:schemeClr>
+          </a:solidFill>
+          <a:ln w="25400">
+            <a:solidFill>
+              <a:schemeClr val="tx1">
+                <a:lumMod val="85000"/>
+                <a:lumOff val="15000"/>
+              </a:schemeClr>
+            </a:solidFill>
+          </a:ln>
+          <a:effectLst>
+            <a:outerShdw blurRad="50800" dist="76200" dir="5400000" algn="t" rotWithShape="0">
+              <a:prstClr val="black">
+                <a:alpha val="19000"/>
+              </a:prstClr>
+            </a:outerShdw>
+          </a:effectLst>
+        </p:spPr>
+        <p:style>
+          <a:lnRef idx="2">
+            <a:schemeClr val="accent1">
+              <a:shade val="50000"/>
+            </a:schemeClr>
+          </a:lnRef>
+          <a:fillRef idx="1">
+            <a:schemeClr val="accent1"/>
+          </a:fillRef>
+          <a:effectRef idx="0">
+            <a:schemeClr val="accent1"/>
+          </a:effectRef>
+          <a:fontRef idx="minor">
+            <a:schemeClr val="lt1"/>
+          </a:fontRef>
+        </p:style>
+        <p:txBody>
+          <a:bodyPr rtlCol="0" anchor="ctr"/>
+          <a:lstStyle/>
+          <a:p>
+            <a:pPr algn="ctr"/>
+            <a:r>
+              <a:rPr lang="ko-KR" altLang="en-US" sz="2400" b="1" dirty="0">
+                <a:solidFill>
+                  <a:prstClr val="white"/>
+                </a:solidFill>
+              </a:rPr>
+              <a:t>향후 계획</a:t>
+            </a:r>
+          </a:p>
+        </p:txBody>
+      </p:sp>
+      <p:sp>
+        <p:nvSpPr>
+          <p:cNvPr id="17" name="자유형 16"/>
+          <p:cNvSpPr/>
+          <p:nvPr/>
+        </p:nvSpPr>
+        <p:spPr>
+          <a:xfrm>
+            <a:off x="604271" y="173831"/>
+            <a:ext cx="682479" cy="847385"/>
+          </a:xfrm>
+          <a:custGeom>
+            <a:avLst/>
+            <a:gdLst>
+              <a:gd name="connsiteX0" fmla="*/ 112847 w 682479"/>
+              <a:gd name="connsiteY0" fmla="*/ 0 h 847385"/>
+              <a:gd name="connsiteX1" fmla="*/ 569632 w 682479"/>
+              <a:gd name="connsiteY1" fmla="*/ 0 h 847385"/>
+              <a:gd name="connsiteX2" fmla="*/ 682479 w 682479"/>
+              <a:gd name="connsiteY2" fmla="*/ 112847 h 847385"/>
+              <a:gd name="connsiteX3" fmla="*/ 682479 w 682479"/>
+              <a:gd name="connsiteY3" fmla="*/ 564222 h 847385"/>
+              <a:gd name="connsiteX4" fmla="*/ 569632 w 682479"/>
+              <a:gd name="connsiteY4" fmla="*/ 677069 h 847385"/>
+              <a:gd name="connsiteX5" fmla="*/ 383870 w 682479"/>
+              <a:gd name="connsiteY5" fmla="*/ 677069 h 847385"/>
+              <a:gd name="connsiteX6" fmla="*/ 192014 w 682479"/>
+              <a:gd name="connsiteY6" fmla="*/ 847385 h 847385"/>
+              <a:gd name="connsiteX7" fmla="*/ 226964 w 682479"/>
+              <a:gd name="connsiteY7" fmla="*/ 677069 h 847385"/>
+              <a:gd name="connsiteX8" fmla="*/ 112847 w 682479"/>
+              <a:gd name="connsiteY8" fmla="*/ 677069 h 847385"/>
+              <a:gd name="connsiteX9" fmla="*/ 0 w 682479"/>
+              <a:gd name="connsiteY9" fmla="*/ 564222 h 847385"/>
+              <a:gd name="connsiteX10" fmla="*/ 0 w 682479"/>
+              <a:gd name="connsiteY10" fmla="*/ 112847 h 847385"/>
+              <a:gd name="connsiteX11" fmla="*/ 112847 w 682479"/>
+              <a:gd name="connsiteY11" fmla="*/ 0 h 847385"/>
+            </a:gdLst>
+            <a:ahLst/>
+            <a:cxnLst>
+              <a:cxn ang="0">
+                <a:pos x="connsiteX0" y="connsiteY0"/>
+              </a:cxn>
+              <a:cxn ang="0">
+                <a:pos x="connsiteX1" y="connsiteY1"/>
+              </a:cxn>
+              <a:cxn ang="0">
+                <a:pos x="connsiteX2" y="connsiteY2"/>
+              </a:cxn>
+              <a:cxn ang="0">
+                <a:pos x="connsiteX3" y="connsiteY3"/>
+              </a:cxn>
+              <a:cxn ang="0">
+                <a:pos x="connsiteX4" y="connsiteY4"/>
+              </a:cxn>
+              <a:cxn ang="0">
+                <a:pos x="connsiteX5" y="connsiteY5"/>
+              </a:cxn>
+              <a:cxn ang="0">
+                <a:pos x="connsiteX6" y="connsiteY6"/>
+              </a:cxn>
+              <a:cxn ang="0">
+                <a:pos x="connsiteX7" y="connsiteY7"/>
+              </a:cxn>
+              <a:cxn ang="0">
+                <a:pos x="connsiteX8" y="connsiteY8"/>
+              </a:cxn>
+              <a:cxn ang="0">
+                <a:pos x="connsiteX9" y="connsiteY9"/>
+              </a:cxn>
+              <a:cxn ang="0">
+                <a:pos x="connsiteX10" y="connsiteY10"/>
+              </a:cxn>
+              <a:cxn ang="0">
+                <a:pos x="connsiteX11" y="connsiteY11"/>
+              </a:cxn>
+            </a:cxnLst>
+            <a:rect l="l" t="t" r="r" b="b"/>
+            <a:pathLst>
+              <a:path w="682479" h="847385">
+                <a:moveTo>
+                  <a:pt x="112847" y="0"/>
+                </a:moveTo>
+                <a:lnTo>
+                  <a:pt x="569632" y="0"/>
+                </a:lnTo>
+                <a:cubicBezTo>
+                  <a:pt x="631956" y="0"/>
+                  <a:pt x="682479" y="50523"/>
+                  <a:pt x="682479" y="112847"/>
+                </a:cubicBezTo>
+                <a:lnTo>
+                  <a:pt x="682479" y="564222"/>
+                </a:lnTo>
+                <a:cubicBezTo>
+                  <a:pt x="682479" y="626546"/>
+                  <a:pt x="631956" y="677069"/>
+                  <a:pt x="569632" y="677069"/>
+                </a:cubicBezTo>
+                <a:lnTo>
+                  <a:pt x="383870" y="677069"/>
+                </a:lnTo>
+                <a:lnTo>
+                  <a:pt x="192014" y="847385"/>
+                </a:lnTo>
+                <a:lnTo>
+                  <a:pt x="226964" y="677069"/>
+                </a:lnTo>
+                <a:lnTo>
+                  <a:pt x="112847" y="677069"/>
+                </a:lnTo>
+                <a:cubicBezTo>
+                  <a:pt x="50523" y="677069"/>
+                  <a:pt x="0" y="626546"/>
+                  <a:pt x="0" y="564222"/>
+                </a:cubicBezTo>
+                <a:lnTo>
+                  <a:pt x="0" y="112847"/>
+                </a:lnTo>
+                <a:cubicBezTo>
+                  <a:pt x="0" y="50523"/>
+                  <a:pt x="50523" y="0"/>
+                  <a:pt x="112847" y="0"/>
+                </a:cubicBezTo>
+                <a:close/>
+              </a:path>
+            </a:pathLst>
+          </a:custGeom>
+          <a:solidFill>
+            <a:schemeClr val="bg1"/>
+          </a:solidFill>
+          <a:ln w="25400">
+            <a:solidFill>
+              <a:schemeClr val="tx1">
+                <a:lumMod val="85000"/>
+                <a:lumOff val="15000"/>
+              </a:schemeClr>
+            </a:solidFill>
+          </a:ln>
+          <a:effectLst>
+            <a:outerShdw blurRad="50800" dist="76200" dir="5400000" algn="t" rotWithShape="0">
+              <a:prstClr val="black">
+                <a:alpha val="19000"/>
+              </a:prstClr>
+            </a:outerShdw>
+          </a:effectLst>
+        </p:spPr>
+        <p:style>
+          <a:lnRef idx="2">
+            <a:schemeClr val="accent1">
+              <a:shade val="50000"/>
+            </a:schemeClr>
+          </a:lnRef>
+          <a:fillRef idx="1">
+            <a:schemeClr val="accent1"/>
+          </a:fillRef>
+          <a:effectRef idx="0">
+            <a:schemeClr val="accent1"/>
+          </a:effectRef>
+          <a:fontRef idx="minor">
+            <a:schemeClr val="lt1"/>
+          </a:fontRef>
+        </p:style>
+        <p:txBody>
+          <a:bodyPr rtlCol="0" anchor="ctr"/>
+          <a:lstStyle/>
+          <a:p>
+            <a:pPr algn="ctr"/>
+            <a:endParaRPr lang="ko-KR" altLang="en-US">
+              <a:solidFill>
+                <a:prstClr val="white"/>
+              </a:solidFill>
+            </a:endParaRPr>
+          </a:p>
+        </p:txBody>
+      </p:sp>
+      <p:sp>
+        <p:nvSpPr>
+          <p:cNvPr id="16" name="자유형 15"/>
+          <p:cNvSpPr/>
+          <p:nvPr/>
+        </p:nvSpPr>
+        <p:spPr>
+          <a:xfrm>
+            <a:off x="559821" y="135731"/>
+            <a:ext cx="682479" cy="847385"/>
+          </a:xfrm>
+          <a:custGeom>
+            <a:avLst/>
+            <a:gdLst>
+              <a:gd name="connsiteX0" fmla="*/ 112847 w 682479"/>
+              <a:gd name="connsiteY0" fmla="*/ 0 h 847385"/>
+              <a:gd name="connsiteX1" fmla="*/ 569632 w 682479"/>
+              <a:gd name="connsiteY1" fmla="*/ 0 h 847385"/>
+              <a:gd name="connsiteX2" fmla="*/ 682479 w 682479"/>
+              <a:gd name="connsiteY2" fmla="*/ 112847 h 847385"/>
+              <a:gd name="connsiteX3" fmla="*/ 682479 w 682479"/>
+              <a:gd name="connsiteY3" fmla="*/ 564222 h 847385"/>
+              <a:gd name="connsiteX4" fmla="*/ 569632 w 682479"/>
+              <a:gd name="connsiteY4" fmla="*/ 677069 h 847385"/>
+              <a:gd name="connsiteX5" fmla="*/ 383870 w 682479"/>
+              <a:gd name="connsiteY5" fmla="*/ 677069 h 847385"/>
+              <a:gd name="connsiteX6" fmla="*/ 192014 w 682479"/>
+              <a:gd name="connsiteY6" fmla="*/ 847385 h 847385"/>
+              <a:gd name="connsiteX7" fmla="*/ 226964 w 682479"/>
+              <a:gd name="connsiteY7" fmla="*/ 677069 h 847385"/>
+              <a:gd name="connsiteX8" fmla="*/ 112847 w 682479"/>
+              <a:gd name="connsiteY8" fmla="*/ 677069 h 847385"/>
+              <a:gd name="connsiteX9" fmla="*/ 0 w 682479"/>
+              <a:gd name="connsiteY9" fmla="*/ 564222 h 847385"/>
+              <a:gd name="connsiteX10" fmla="*/ 0 w 682479"/>
+              <a:gd name="connsiteY10" fmla="*/ 112847 h 847385"/>
+              <a:gd name="connsiteX11" fmla="*/ 112847 w 682479"/>
+              <a:gd name="connsiteY11" fmla="*/ 0 h 847385"/>
+            </a:gdLst>
+            <a:ahLst/>
+            <a:cxnLst>
+              <a:cxn ang="0">
+                <a:pos x="connsiteX0" y="connsiteY0"/>
+              </a:cxn>
+              <a:cxn ang="0">
+                <a:pos x="connsiteX1" y="connsiteY1"/>
+              </a:cxn>
+              <a:cxn ang="0">
+                <a:pos x="connsiteX2" y="connsiteY2"/>
+              </a:cxn>
+              <a:cxn ang="0">
+                <a:pos x="connsiteX3" y="connsiteY3"/>
+              </a:cxn>
+              <a:cxn ang="0">
+                <a:pos x="connsiteX4" y="connsiteY4"/>
+              </a:cxn>
+              <a:cxn ang="0">
+                <a:pos x="connsiteX5" y="connsiteY5"/>
+              </a:cxn>
+              <a:cxn ang="0">
+                <a:pos x="connsiteX6" y="connsiteY6"/>
+              </a:cxn>
+              <a:cxn ang="0">
+                <a:pos x="connsiteX7" y="connsiteY7"/>
+              </a:cxn>
+              <a:cxn ang="0">
+                <a:pos x="connsiteX8" y="connsiteY8"/>
+              </a:cxn>
+              <a:cxn ang="0">
+                <a:pos x="connsiteX9" y="connsiteY9"/>
+              </a:cxn>
+              <a:cxn ang="0">
+                <a:pos x="connsiteX10" y="connsiteY10"/>
+              </a:cxn>
+              <a:cxn ang="0">
+                <a:pos x="connsiteX11" y="connsiteY11"/>
+              </a:cxn>
+            </a:cxnLst>
+            <a:rect l="l" t="t" r="r" b="b"/>
+            <a:pathLst>
+              <a:path w="682479" h="847385">
+                <a:moveTo>
+                  <a:pt x="112847" y="0"/>
+                </a:moveTo>
+                <a:lnTo>
+                  <a:pt x="569632" y="0"/>
+                </a:lnTo>
+                <a:cubicBezTo>
+                  <a:pt x="631956" y="0"/>
+                  <a:pt x="682479" y="50523"/>
+                  <a:pt x="682479" y="112847"/>
+                </a:cubicBezTo>
+                <a:lnTo>
+                  <a:pt x="682479" y="564222"/>
+                </a:lnTo>
+                <a:cubicBezTo>
+                  <a:pt x="682479" y="626546"/>
+                  <a:pt x="631956" y="677069"/>
+                  <a:pt x="569632" y="677069"/>
+                </a:cubicBezTo>
+                <a:lnTo>
+                  <a:pt x="383870" y="677069"/>
+                </a:lnTo>
+                <a:lnTo>
+                  <a:pt x="192014" y="847385"/>
+                </a:lnTo>
+                <a:lnTo>
+                  <a:pt x="226964" y="677069"/>
+                </a:lnTo>
+                <a:lnTo>
+                  <a:pt x="112847" y="677069"/>
+                </a:lnTo>
+                <a:cubicBezTo>
+                  <a:pt x="50523" y="677069"/>
+                  <a:pt x="0" y="626546"/>
+                  <a:pt x="0" y="564222"/>
+                </a:cubicBezTo>
+                <a:lnTo>
+                  <a:pt x="0" y="112847"/>
+                </a:lnTo>
+                <a:cubicBezTo>
+                  <a:pt x="0" y="50523"/>
+                  <a:pt x="50523" y="0"/>
+                  <a:pt x="112847" y="0"/>
+                </a:cubicBezTo>
+                <a:close/>
+              </a:path>
+            </a:pathLst>
+          </a:custGeom>
+          <a:solidFill>
+            <a:schemeClr val="tx1">
+              <a:lumMod val="75000"/>
+              <a:lumOff val="25000"/>
+            </a:schemeClr>
+          </a:solidFill>
+          <a:ln w="25400">
+            <a:solidFill>
+              <a:schemeClr val="tx1">
+                <a:lumMod val="85000"/>
+                <a:lumOff val="15000"/>
+              </a:schemeClr>
+            </a:solidFill>
+          </a:ln>
+          <a:effectLst>
+            <a:outerShdw blurRad="50800" dist="76200" dir="5400000" algn="t" rotWithShape="0">
+              <a:prstClr val="black">
+                <a:alpha val="19000"/>
+              </a:prstClr>
+            </a:outerShdw>
+          </a:effectLst>
+        </p:spPr>
+        <p:style>
+          <a:lnRef idx="2">
+            <a:schemeClr val="accent1">
+              <a:shade val="50000"/>
+            </a:schemeClr>
+          </a:lnRef>
+          <a:fillRef idx="1">
+            <a:schemeClr val="accent1"/>
+          </a:fillRef>
+          <a:effectRef idx="0">
+            <a:schemeClr val="accent1"/>
+          </a:effectRef>
+          <a:fontRef idx="minor">
+            <a:schemeClr val="lt1"/>
+          </a:fontRef>
+        </p:style>
+        <p:txBody>
+          <a:bodyPr rtlCol="0" anchor="ctr"/>
+          <a:lstStyle/>
+          <a:p>
+            <a:pPr algn="ctr"/>
+            <a:endParaRPr lang="ko-KR" altLang="en-US">
+              <a:solidFill>
+                <a:prstClr val="white"/>
+              </a:solidFill>
+            </a:endParaRPr>
+          </a:p>
+        </p:txBody>
+      </p:sp>
+      <p:sp>
+        <p:nvSpPr>
+          <p:cNvPr id="7" name="타원 6"/>
+          <p:cNvSpPr/>
+          <p:nvPr/>
+        </p:nvSpPr>
+        <p:spPr>
+          <a:xfrm>
+            <a:off x="696673" y="269081"/>
+            <a:ext cx="414000" cy="413544"/>
+          </a:xfrm>
+          <a:prstGeom prst="ellipse">
+            <a:avLst/>
+          </a:prstGeom>
+          <a:solidFill>
+            <a:srgbClr val="FF6600"/>
+          </a:solidFill>
+          <a:ln w="9525" cmpd="sng">
+            <a:solidFill>
+              <a:schemeClr val="tx1">
+                <a:lumMod val="75000"/>
+                <a:lumOff val="25000"/>
+              </a:schemeClr>
+            </a:solidFill>
+          </a:ln>
+          <a:effectLst>
+            <a:outerShdw sx="110000" sy="110000" algn="ctr" rotWithShape="0">
+              <a:schemeClr val="bg1"/>
+            </a:outerShdw>
+          </a:effectLst>
+        </p:spPr>
+        <p:style>
+          <a:lnRef idx="2">
+            <a:schemeClr val="accent1">
+              <a:shade val="50000"/>
+            </a:schemeClr>
+          </a:lnRef>
+          <a:fillRef idx="1">
+            <a:schemeClr val="accent1"/>
+          </a:fillRef>
+          <a:effectRef idx="0">
+            <a:schemeClr val="accent1"/>
+          </a:effectRef>
+          <a:fontRef idx="minor">
+            <a:schemeClr val="lt1"/>
+          </a:fontRef>
+        </p:style>
+        <p:txBody>
+          <a:bodyPr wrap="none" rtlCol="0" anchor="ctr"/>
+          <a:lstStyle/>
+          <a:p>
+            <a:pPr algn="ctr"/>
+            <a:r>
+              <a:rPr lang="en-US" altLang="ko-KR" b="1" dirty="0">
+                <a:solidFill>
+                  <a:prstClr val="white"/>
+                </a:solidFill>
+              </a:rPr>
+              <a:t>06</a:t>
+            </a:r>
+            <a:endParaRPr lang="ko-KR" altLang="en-US" b="1" dirty="0">
+              <a:solidFill>
+                <a:prstClr val="white"/>
+              </a:solidFill>
+            </a:endParaRPr>
+          </a:p>
+        </p:txBody>
+      </p:sp>
       <p:sp>
         <p:nvSpPr>
           <p:cNvPr id="25" name="TextBox 24">
@@ -5624,7 +6547,7 @@
                   </a:schemeClr>
                 </a:solidFill>
               </a:rPr>
-              <a:t>로 채택한 상황에서 다른 팀과의 협업에 문제가 없는가</a:t>
+              <a:t>로 채택한 상황에서 다른 팀과의 정보 공유 및 협업에 문제가 없는가</a:t>
             </a:r>
             <a:r>
               <a:rPr lang="en-US" altLang="ko-KR" sz="2400" b="1" dirty="0">
@@ -11253,13 +12176,26 @@
           <a:p>
             <a:pPr algn="ctr"/>
             <a:r>
-              <a:rPr lang="ko-KR" altLang="en-US" sz="2400" b="1" dirty="0">
+              <a:rPr lang="en-US" altLang="ko-KR" sz="2400" b="1" dirty="0" err="1">
                 <a:solidFill>
                   <a:prstClr val="white"/>
                 </a:solidFill>
               </a:rPr>
-              <a:t>결론 및 느낀 점</a:t>
-            </a:r>
+              <a:t>Todo</a:t>
+            </a:r>
+            <a:r>
+              <a:rPr lang="en-US" altLang="ko-KR" sz="2400" b="1" dirty="0">
+                <a:solidFill>
+                  <a:prstClr val="white"/>
+                </a:solidFill>
+              </a:rPr>
+              <a:t> App</a:t>
+            </a:r>
+            <a:endParaRPr lang="ko-KR" altLang="en-US" sz="2400" b="1" dirty="0">
+              <a:solidFill>
+                <a:prstClr val="white"/>
+              </a:solidFill>
+            </a:endParaRPr>
           </a:p>
         </p:txBody>
       </p:sp>
@@ -11688,296 +12624,12 @@
           </a:p>
         </p:txBody>
       </p:sp>
-      <p:sp>
-        <p:nvSpPr>
-          <p:cNvPr id="20" name="TextBox 19">
+      <p:pic>
+        <p:nvPicPr>
+          <p:cNvPr id="2" name="그림 1">
             <a:extLst>
               <a:ext uri="{FF2B5EF4-FFF2-40B4-BE49-F238E27FC236}">
-                <a16:creationId xmlns:a16="http://schemas.microsoft.com/office/drawing/2014/main" id="{39CB6F91-90AF-48B9-90B1-567149A842C4}"/>
-              </a:ext>
-            </a:extLst>
-          </p:cNvPr>
-          <p:cNvSpPr txBox="1"/>
-          <p:nvPr/>
-        </p:nvSpPr>
-        <p:spPr>
-          <a:xfrm>
-            <a:off x="1242300" y="1932519"/>
-            <a:ext cx="10077341" cy="3344955"/>
-          </a:xfrm>
-          <a:prstGeom prst="rect">
-            <a:avLst/>
-          </a:prstGeom>
-          <a:noFill/>
-        </p:spPr>
-        <p:txBody>
-          <a:bodyPr wrap="square" rtlCol="0">
-            <a:spAutoFit/>
-          </a:bodyPr>
-          <a:lstStyle/>
-          <a:p>
-            <a:pPr marL="342900" indent="-342900">
-              <a:lnSpc>
-                <a:spcPct val="150000"/>
-              </a:lnSpc>
-              <a:buFontTx/>
-              <a:buChar char="-"/>
-            </a:pPr>
-            <a:r>
-              <a:rPr lang="ko-KR" altLang="en-US" sz="2400" b="1" dirty="0">
-                <a:solidFill>
-                  <a:schemeClr val="bg2">
-                    <a:lumMod val="25000"/>
-                  </a:schemeClr>
-                </a:solidFill>
-              </a:rPr>
-              <a:t>기존의 </a:t>
-            </a:r>
-            <a:r>
-              <a:rPr lang="en-US" altLang="ko-KR" sz="2400" b="1" dirty="0">
-                <a:solidFill>
-                  <a:srgbClr val="FF0000"/>
-                </a:solidFill>
-              </a:rPr>
-              <a:t>HTML </a:t>
-            </a:r>
-            <a:r>
-              <a:rPr lang="ko-KR" altLang="en-US" sz="2400" b="1" dirty="0">
-                <a:solidFill>
-                  <a:srgbClr val="FF0000"/>
-                </a:solidFill>
-              </a:rPr>
-              <a:t>템플릿을 </a:t>
-            </a:r>
-            <a:r>
-              <a:rPr lang="en-US" altLang="ko-KR" sz="2400" b="1" dirty="0">
-                <a:solidFill>
-                  <a:srgbClr val="FF0000"/>
-                </a:solidFill>
-              </a:rPr>
-              <a:t>Vue</a:t>
-            </a:r>
-            <a:r>
-              <a:rPr lang="ko-KR" altLang="en-US" sz="2400" b="1" dirty="0">
-                <a:solidFill>
-                  <a:srgbClr val="FF0000"/>
-                </a:solidFill>
-              </a:rPr>
-              <a:t>로 이전하기 용이</a:t>
-            </a:r>
-            <a:r>
-              <a:rPr lang="ko-KR" altLang="en-US" sz="2400" b="1" dirty="0">
-                <a:solidFill>
-                  <a:schemeClr val="bg2">
-                    <a:lumMod val="25000"/>
-                  </a:schemeClr>
-                </a:solidFill>
-              </a:rPr>
-              <a:t>할 것이라 생각</a:t>
-            </a:r>
-            <a:endParaRPr lang="en-US" altLang="ko-KR" sz="2400" b="1" dirty="0">
-              <a:solidFill>
-                <a:schemeClr val="bg2">
-                  <a:lumMod val="25000"/>
-                </a:schemeClr>
-              </a:solidFill>
-            </a:endParaRPr>
-          </a:p>
-          <a:p>
-            <a:pPr marL="342900" indent="-342900">
-              <a:lnSpc>
-                <a:spcPct val="150000"/>
-              </a:lnSpc>
-              <a:buFontTx/>
-              <a:buChar char="-"/>
-            </a:pPr>
-            <a:r>
-              <a:rPr lang="ko-KR" altLang="en-US" sz="2400" b="1" dirty="0">
-                <a:solidFill>
-                  <a:schemeClr val="bg2">
-                    <a:lumMod val="25000"/>
-                  </a:schemeClr>
-                </a:solidFill>
-              </a:rPr>
-              <a:t>정식 문서가 </a:t>
-            </a:r>
-            <a:r>
-              <a:rPr lang="en-US" altLang="ko-KR" sz="2400" b="1" dirty="0">
-                <a:solidFill>
-                  <a:schemeClr val="bg2">
-                    <a:lumMod val="25000"/>
-                  </a:schemeClr>
-                </a:solidFill>
-              </a:rPr>
-              <a:t>React</a:t>
-            </a:r>
-            <a:r>
-              <a:rPr lang="ko-KR" altLang="en-US" sz="2400" b="1" dirty="0">
-                <a:solidFill>
-                  <a:schemeClr val="bg2">
-                    <a:lumMod val="25000"/>
-                  </a:schemeClr>
-                </a:solidFill>
-              </a:rPr>
-              <a:t>에 비해 읽기 쉽고 체계적</a:t>
-            </a:r>
-            <a:endParaRPr lang="en-US" altLang="ko-KR" sz="2400" b="1" dirty="0">
-              <a:solidFill>
-                <a:schemeClr val="bg2">
-                  <a:lumMod val="25000"/>
-                </a:schemeClr>
-              </a:solidFill>
-            </a:endParaRPr>
-          </a:p>
-          <a:p>
-            <a:pPr marL="342900" indent="-342900">
-              <a:lnSpc>
-                <a:spcPct val="150000"/>
-              </a:lnSpc>
-              <a:buFontTx/>
-              <a:buChar char="-"/>
-            </a:pPr>
-            <a:r>
-              <a:rPr lang="en-US" altLang="ko-KR" sz="2400" b="1" dirty="0">
-                <a:solidFill>
-                  <a:srgbClr val="FF0000"/>
-                </a:solidFill>
-              </a:rPr>
-              <a:t>Right Way</a:t>
-            </a:r>
-            <a:r>
-              <a:rPr lang="en-US" altLang="ko-KR" sz="2400" b="1" dirty="0">
-                <a:solidFill>
-                  <a:schemeClr val="bg2">
-                    <a:lumMod val="25000"/>
-                  </a:schemeClr>
-                </a:solidFill>
-              </a:rPr>
-              <a:t> </a:t>
-            </a:r>
-            <a:r>
-              <a:rPr lang="ko-KR" altLang="en-US" sz="2400" b="1" dirty="0">
-                <a:solidFill>
-                  <a:schemeClr val="bg2">
-                    <a:lumMod val="25000"/>
-                  </a:schemeClr>
-                </a:solidFill>
-              </a:rPr>
-              <a:t>제공</a:t>
-            </a:r>
-            <a:endParaRPr lang="en-US" altLang="ko-KR" sz="2400" b="1" dirty="0">
-              <a:solidFill>
-                <a:schemeClr val="bg2">
-                  <a:lumMod val="25000"/>
-                </a:schemeClr>
-              </a:solidFill>
-            </a:endParaRPr>
-          </a:p>
-          <a:p>
-            <a:pPr marL="342900" indent="-342900">
-              <a:lnSpc>
-                <a:spcPct val="150000"/>
-              </a:lnSpc>
-              <a:buFontTx/>
-              <a:buChar char="-"/>
-            </a:pPr>
-            <a:r>
-              <a:rPr lang="ko-KR" altLang="en-US" sz="2400" b="1" dirty="0">
-                <a:solidFill>
-                  <a:schemeClr val="bg2">
-                    <a:lumMod val="25000"/>
-                  </a:schemeClr>
-                </a:solidFill>
-              </a:rPr>
-              <a:t>따라서 빠르게 실제로 개발해야 할 상황일 경우 사용</a:t>
-            </a:r>
-            <a:endParaRPr lang="en-US" altLang="ko-KR" sz="2400" b="1" dirty="0">
-              <a:solidFill>
-                <a:schemeClr val="bg2">
-                  <a:lumMod val="25000"/>
-                </a:schemeClr>
-              </a:solidFill>
-            </a:endParaRPr>
-          </a:p>
-          <a:p>
-            <a:pPr marL="342900" indent="-342900">
-              <a:lnSpc>
-                <a:spcPct val="150000"/>
-              </a:lnSpc>
-              <a:buFontTx/>
-              <a:buChar char="-"/>
-            </a:pPr>
-            <a:endParaRPr lang="en-US" altLang="ko-KR" sz="2400" b="1" dirty="0">
-              <a:solidFill>
-                <a:schemeClr val="bg2">
-                  <a:lumMod val="25000"/>
-                </a:schemeClr>
-              </a:solidFill>
-            </a:endParaRPr>
-          </a:p>
-          <a:p>
-            <a:pPr marL="342900" indent="-342900">
-              <a:lnSpc>
-                <a:spcPct val="150000"/>
-              </a:lnSpc>
-              <a:buFontTx/>
-              <a:buChar char="-"/>
-            </a:pPr>
-            <a:endParaRPr lang="ko-KR" altLang="en-US" sz="2400" b="1" dirty="0">
-              <a:solidFill>
-                <a:schemeClr val="bg2">
-                  <a:lumMod val="25000"/>
-                </a:schemeClr>
-              </a:solidFill>
-            </a:endParaRPr>
-          </a:p>
-        </p:txBody>
-      </p:sp>
-      <p:sp>
-        <p:nvSpPr>
-          <p:cNvPr id="21" name="TextBox 20">
-            <a:extLst>
-              <a:ext uri="{FF2B5EF4-FFF2-40B4-BE49-F238E27FC236}">
-                <a16:creationId xmlns:a16="http://schemas.microsoft.com/office/drawing/2014/main" id="{2108CDEF-C932-4734-8594-3CA0CB97CCA5}"/>
-              </a:ext>
-            </a:extLst>
-          </p:cNvPr>
-          <p:cNvSpPr txBox="1"/>
-          <p:nvPr/>
-        </p:nvSpPr>
-        <p:spPr>
-          <a:xfrm>
-            <a:off x="1847554" y="1326164"/>
-            <a:ext cx="3764969" cy="523220"/>
-          </a:xfrm>
-          <a:prstGeom prst="rect">
-            <a:avLst/>
-          </a:prstGeom>
-          <a:noFill/>
-        </p:spPr>
-        <p:txBody>
-          <a:bodyPr wrap="square" rtlCol="0">
-            <a:spAutoFit/>
-          </a:bodyPr>
-          <a:lstStyle/>
-          <a:p>
-            <a:r>
-              <a:rPr lang="en-US" altLang="ko-KR" sz="2800" b="1" dirty="0"/>
-              <a:t>Vue</a:t>
-            </a:r>
-            <a:r>
-              <a:rPr lang="ko-KR" altLang="en-US" sz="2800" b="1" dirty="0"/>
-              <a:t>를 선택하는 경우</a:t>
-            </a:r>
-          </a:p>
-        </p:txBody>
-      </p:sp>
-      <p:pic>
-        <p:nvPicPr>
-          <p:cNvPr id="22" name="그림 21">
-            <a:extLst>
-              <a:ext uri="{FF2B5EF4-FFF2-40B4-BE49-F238E27FC236}">
-                <a16:creationId xmlns:a16="http://schemas.microsoft.com/office/drawing/2014/main" id="{3F307485-821A-4C17-A885-5C6C9BC68D8F}"/>
+                <a16:creationId xmlns:a16="http://schemas.microsoft.com/office/drawing/2014/main" id="{ABC80A93-5755-4490-8742-B3B8D5AA5DC5}"/>
               </a:ext>
             </a:extLst>
           </p:cNvPr>
@@ -11994,7 +12646,97 @@
         </p:blipFill>
         <p:spPr>
           <a:xfrm>
-            <a:off x="669413" y="1421376"/>
+            <a:off x="1273060" y="1426607"/>
+            <a:ext cx="4305489" cy="4664279"/>
+          </a:xfrm>
+          <a:prstGeom prst="rect">
+            <a:avLst/>
+          </a:prstGeom>
+        </p:spPr>
+      </p:pic>
+      <p:pic>
+        <p:nvPicPr>
+          <p:cNvPr id="3" name="그림 2">
+            <a:extLst>
+              <a:ext uri="{FF2B5EF4-FFF2-40B4-BE49-F238E27FC236}">
+                <a16:creationId xmlns:a16="http://schemas.microsoft.com/office/drawing/2014/main" id="{4DB8858D-3D8A-49BA-8871-5D48D2AB0361}"/>
+              </a:ext>
+            </a:extLst>
+          </p:cNvPr>
+          <p:cNvPicPr>
+            <a:picLocks noChangeAspect="1"/>
+          </p:cNvPicPr>
+          <p:nvPr/>
+        </p:nvPicPr>
+        <p:blipFill>
+          <a:blip r:embed="rId3"/>
+          <a:stretch>
+            <a:fillRect/>
+          </a:stretch>
+        </p:blipFill>
+        <p:spPr>
+          <a:xfrm>
+            <a:off x="6645444" y="1426606"/>
+            <a:ext cx="4305490" cy="4664280"/>
+          </a:xfrm>
+          <a:prstGeom prst="rect">
+            <a:avLst/>
+          </a:prstGeom>
+        </p:spPr>
+      </p:pic>
+      <p:pic>
+        <p:nvPicPr>
+          <p:cNvPr id="11" name="그림 10">
+            <a:extLst>
+              <a:ext uri="{FF2B5EF4-FFF2-40B4-BE49-F238E27FC236}">
+                <a16:creationId xmlns:a16="http://schemas.microsoft.com/office/drawing/2014/main" id="{92672627-4068-4A6D-86CC-FD63E3689AFF}"/>
+              </a:ext>
+            </a:extLst>
+          </p:cNvPr>
+          <p:cNvPicPr>
+            <a:picLocks noChangeAspect="1"/>
+          </p:cNvPicPr>
+          <p:nvPr/>
+        </p:nvPicPr>
+        <p:blipFill>
+          <a:blip r:embed="rId4"/>
+          <a:stretch>
+            <a:fillRect/>
+          </a:stretch>
+        </p:blipFill>
+        <p:spPr>
+          <a:xfrm>
+            <a:off x="2959079" y="1015206"/>
+            <a:ext cx="933450" cy="333375"/>
+          </a:xfrm>
+          <a:prstGeom prst="rect">
+            <a:avLst/>
+          </a:prstGeom>
+        </p:spPr>
+      </p:pic>
+      <p:pic>
+        <p:nvPicPr>
+          <p:cNvPr id="12" name="그림 11">
+            <a:extLst>
+              <a:ext uri="{FF2B5EF4-FFF2-40B4-BE49-F238E27FC236}">
+                <a16:creationId xmlns:a16="http://schemas.microsoft.com/office/drawing/2014/main" id="{D0FCDC1B-D2FE-4F1A-B4BE-CB8C691FEAB3}"/>
+              </a:ext>
+            </a:extLst>
+          </p:cNvPr>
+          <p:cNvPicPr>
+            <a:picLocks noChangeAspect="1"/>
+          </p:cNvPicPr>
+          <p:nvPr/>
+        </p:nvPicPr>
+        <p:blipFill>
+          <a:blip r:embed="rId5"/>
+          <a:stretch>
+            <a:fillRect/>
+          </a:stretch>
+        </p:blipFill>
+        <p:spPr>
+          <a:xfrm>
+            <a:off x="8331464" y="1021216"/>
             <a:ext cx="933450" cy="332795"/>
           </a:xfrm>
           <a:prstGeom prst="rect">
@@ -12005,7 +12747,7 @@
     </p:spTree>
     <p:extLst>
       <p:ext uri="{BB962C8B-B14F-4D97-AF65-F5344CB8AC3E}">
-        <p14:creationId xmlns:p14="http://schemas.microsoft.com/office/powerpoint/2010/main" val="3609804837"/>
+        <p14:creationId xmlns:p14="http://schemas.microsoft.com/office/powerpoint/2010/main" val="2883193677"/>
       </p:ext>
     </p:extLst>
   </p:cSld>
@@ -12708,7 +13450,7 @@
                   <a:prstClr val="white"/>
                 </a:solidFill>
               </a:rPr>
-              <a:t>04</a:t>
+              <a:t>05</a:t>
             </a:r>
             <a:endParaRPr lang="ko-KR" altLang="en-US" b="1" dirty="0">
               <a:solidFill>
@@ -12718,12 +13460,246 @@
           </a:p>
         </p:txBody>
       </p:sp>
+      <p:sp>
+        <p:nvSpPr>
+          <p:cNvPr id="20" name="TextBox 19">
+            <a:extLst>
+              <a:ext uri="{FF2B5EF4-FFF2-40B4-BE49-F238E27FC236}">
+                <a16:creationId xmlns:a16="http://schemas.microsoft.com/office/drawing/2014/main" id="{39CB6F91-90AF-48B9-90B1-567149A842C4}"/>
+              </a:ext>
+            </a:extLst>
+          </p:cNvPr>
+          <p:cNvSpPr txBox="1"/>
+          <p:nvPr/>
+        </p:nvSpPr>
+        <p:spPr>
+          <a:xfrm>
+            <a:off x="1242300" y="1932519"/>
+            <a:ext cx="10077341" cy="2790957"/>
+          </a:xfrm>
+          <a:prstGeom prst="rect">
+            <a:avLst/>
+          </a:prstGeom>
+          <a:noFill/>
+        </p:spPr>
+        <p:txBody>
+          <a:bodyPr wrap="square" rtlCol="0">
+            <a:spAutoFit/>
+          </a:bodyPr>
+          <a:lstStyle/>
+          <a:p>
+            <a:pPr marL="342900" indent="-342900">
+              <a:lnSpc>
+                <a:spcPct val="150000"/>
+              </a:lnSpc>
+              <a:buFontTx/>
+              <a:buChar char="-"/>
+            </a:pPr>
+            <a:r>
+              <a:rPr lang="ko-KR" altLang="en-US" sz="2400" b="1" dirty="0">
+                <a:solidFill>
+                  <a:schemeClr val="bg2">
+                    <a:lumMod val="25000"/>
+                  </a:schemeClr>
+                </a:solidFill>
+              </a:rPr>
+              <a:t>정식 문서가 </a:t>
+            </a:r>
+            <a:r>
+              <a:rPr lang="en-US" altLang="ko-KR" sz="2400" b="1" dirty="0">
+                <a:solidFill>
+                  <a:schemeClr val="bg2">
+                    <a:lumMod val="25000"/>
+                  </a:schemeClr>
+                </a:solidFill>
+              </a:rPr>
+              <a:t>React</a:t>
+            </a:r>
+            <a:r>
+              <a:rPr lang="ko-KR" altLang="en-US" sz="2400" b="1" dirty="0">
+                <a:solidFill>
+                  <a:schemeClr val="bg2">
+                    <a:lumMod val="25000"/>
+                  </a:schemeClr>
+                </a:solidFill>
+              </a:rPr>
+              <a:t>에 비해 읽기 쉬움</a:t>
+            </a:r>
+            <a:endParaRPr lang="en-US" altLang="ko-KR" sz="2400" b="1" dirty="0">
+              <a:solidFill>
+                <a:schemeClr val="bg2">
+                  <a:lumMod val="25000"/>
+                </a:schemeClr>
+              </a:solidFill>
+            </a:endParaRPr>
+          </a:p>
+          <a:p>
+            <a:pPr marL="342900" indent="-342900">
+              <a:lnSpc>
+                <a:spcPct val="150000"/>
+              </a:lnSpc>
+              <a:buFontTx/>
+              <a:buChar char="-"/>
+            </a:pPr>
+            <a:r>
+              <a:rPr lang="en-US" altLang="ko-KR" sz="2400" b="1" dirty="0">
+                <a:solidFill>
+                  <a:srgbClr val="FF0000"/>
+                </a:solidFill>
+              </a:rPr>
+              <a:t>Right Way</a:t>
+            </a:r>
+            <a:r>
+              <a:rPr lang="en-US" altLang="ko-KR" sz="2400" b="1" dirty="0">
+                <a:solidFill>
+                  <a:schemeClr val="bg2">
+                    <a:lumMod val="25000"/>
+                  </a:schemeClr>
+                </a:solidFill>
+              </a:rPr>
+              <a:t> </a:t>
+            </a:r>
+            <a:r>
+              <a:rPr lang="ko-KR" altLang="en-US" sz="2400" b="1" dirty="0">
+                <a:solidFill>
+                  <a:schemeClr val="bg2">
+                    <a:lumMod val="25000"/>
+                  </a:schemeClr>
+                </a:solidFill>
+              </a:rPr>
+              <a:t>제공</a:t>
+            </a:r>
+            <a:endParaRPr lang="en-US" altLang="ko-KR" sz="2400" b="1" dirty="0">
+              <a:solidFill>
+                <a:schemeClr val="bg2">
+                  <a:lumMod val="25000"/>
+                </a:schemeClr>
+              </a:solidFill>
+            </a:endParaRPr>
+          </a:p>
+          <a:p>
+            <a:pPr marL="342900" indent="-342900">
+              <a:lnSpc>
+                <a:spcPct val="150000"/>
+              </a:lnSpc>
+              <a:buFontTx/>
+              <a:buChar char="-"/>
+            </a:pPr>
+            <a:r>
+              <a:rPr lang="ko-KR" altLang="en-US" sz="2400" b="1" dirty="0">
+                <a:solidFill>
+                  <a:schemeClr val="bg2">
+                    <a:lumMod val="25000"/>
+                  </a:schemeClr>
+                </a:solidFill>
+              </a:rPr>
+              <a:t>따라서 </a:t>
+            </a:r>
+            <a:r>
+              <a:rPr lang="ko-KR" altLang="en-US" sz="2400" b="1" dirty="0">
+                <a:solidFill>
+                  <a:srgbClr val="FF0000"/>
+                </a:solidFill>
+              </a:rPr>
+              <a:t>빠르게 실제로 개발해야 할 상황일 </a:t>
+            </a:r>
+            <a:r>
+              <a:rPr lang="ko-KR" altLang="en-US" sz="2400" b="1" dirty="0">
+                <a:solidFill>
+                  <a:schemeClr val="bg2">
+                    <a:lumMod val="25000"/>
+                  </a:schemeClr>
+                </a:solidFill>
+              </a:rPr>
+              <a:t>경우 사용</a:t>
+            </a:r>
+            <a:endParaRPr lang="en-US" altLang="ko-KR" sz="2400" b="1" dirty="0">
+              <a:solidFill>
+                <a:schemeClr val="bg2">
+                  <a:lumMod val="25000"/>
+                </a:schemeClr>
+              </a:solidFill>
+            </a:endParaRPr>
+          </a:p>
+          <a:p>
+            <a:pPr marL="342900" indent="-342900">
+              <a:lnSpc>
+                <a:spcPct val="150000"/>
+              </a:lnSpc>
+              <a:buFontTx/>
+              <a:buChar char="-"/>
+            </a:pPr>
+            <a:endParaRPr lang="en-US" altLang="ko-KR" sz="2400" b="1" dirty="0">
+              <a:solidFill>
+                <a:schemeClr val="bg2">
+                  <a:lumMod val="25000"/>
+                </a:schemeClr>
+              </a:solidFill>
+            </a:endParaRPr>
+          </a:p>
+          <a:p>
+            <a:pPr marL="342900" indent="-342900">
+              <a:lnSpc>
+                <a:spcPct val="150000"/>
+              </a:lnSpc>
+              <a:buFontTx/>
+              <a:buChar char="-"/>
+            </a:pPr>
+            <a:endParaRPr lang="ko-KR" altLang="en-US" sz="2400" b="1" dirty="0">
+              <a:solidFill>
+                <a:schemeClr val="bg2">
+                  <a:lumMod val="25000"/>
+                </a:schemeClr>
+              </a:solidFill>
+            </a:endParaRPr>
+          </a:p>
+        </p:txBody>
+      </p:sp>
+      <p:sp>
+        <p:nvSpPr>
+          <p:cNvPr id="21" name="TextBox 20">
+            <a:extLst>
+              <a:ext uri="{FF2B5EF4-FFF2-40B4-BE49-F238E27FC236}">
+                <a16:creationId xmlns:a16="http://schemas.microsoft.com/office/drawing/2014/main" id="{2108CDEF-C932-4734-8594-3CA0CB97CCA5}"/>
+              </a:ext>
+            </a:extLst>
+          </p:cNvPr>
+          <p:cNvSpPr txBox="1"/>
+          <p:nvPr/>
+        </p:nvSpPr>
+        <p:spPr>
+          <a:xfrm>
+            <a:off x="1847554" y="1326164"/>
+            <a:ext cx="3764969" cy="523220"/>
+          </a:xfrm>
+          <a:prstGeom prst="rect">
+            <a:avLst/>
+          </a:prstGeom>
+          <a:noFill/>
+        </p:spPr>
+        <p:txBody>
+          <a:bodyPr wrap="square" rtlCol="0">
+            <a:spAutoFit/>
+          </a:bodyPr>
+          <a:lstStyle/>
+          <a:p>
+            <a:r>
+              <a:rPr lang="en-US" altLang="ko-KR" sz="2800" b="1" dirty="0"/>
+              <a:t>Vue</a:t>
+            </a:r>
+            <a:r>
+              <a:rPr lang="ko-KR" altLang="en-US" sz="2800" b="1" dirty="0"/>
+              <a:t>를 선택하는 경우</a:t>
+            </a:r>
+          </a:p>
+        </p:txBody>
+      </p:sp>
       <p:pic>
         <p:nvPicPr>
-          <p:cNvPr id="24" name="그림 23">
+          <p:cNvPr id="22" name="그림 21">
             <a:extLst>
               <a:ext uri="{FF2B5EF4-FFF2-40B4-BE49-F238E27FC236}">
-                <a16:creationId xmlns:a16="http://schemas.microsoft.com/office/drawing/2014/main" id="{AF28A506-BB3F-4E34-999D-091F1A335A4B}"/>
+                <a16:creationId xmlns:a16="http://schemas.microsoft.com/office/drawing/2014/main" id="{3F307485-821A-4C17-A885-5C6C9BC68D8F}"/>
               </a:ext>
             </a:extLst>
           </p:cNvPr>
@@ -12740,194 +13716,18 @@
         </p:blipFill>
         <p:spPr>
           <a:xfrm>
-            <a:off x="598743" y="1403907"/>
-            <a:ext cx="933450" cy="333375"/>
+            <a:off x="669413" y="1421376"/>
+            <a:ext cx="933450" cy="332795"/>
           </a:xfrm>
           <a:prstGeom prst="rect">
             <a:avLst/>
           </a:prstGeom>
         </p:spPr>
       </p:pic>
-      <p:sp>
-        <p:nvSpPr>
-          <p:cNvPr id="25" name="TextBox 24">
-            <a:extLst>
-              <a:ext uri="{FF2B5EF4-FFF2-40B4-BE49-F238E27FC236}">
-                <a16:creationId xmlns:a16="http://schemas.microsoft.com/office/drawing/2014/main" id="{1D3A90C7-6F27-4CAF-9CE0-CB06EFD813A0}"/>
-              </a:ext>
-            </a:extLst>
-          </p:cNvPr>
-          <p:cNvSpPr txBox="1"/>
-          <p:nvPr/>
-        </p:nvSpPr>
-        <p:spPr>
-          <a:xfrm>
-            <a:off x="1188820" y="1908596"/>
-            <a:ext cx="10077341" cy="1682961"/>
-          </a:xfrm>
-          <a:prstGeom prst="rect">
-            <a:avLst/>
-          </a:prstGeom>
-          <a:noFill/>
-        </p:spPr>
-        <p:txBody>
-          <a:bodyPr wrap="square" rtlCol="0">
-            <a:spAutoFit/>
-          </a:bodyPr>
-          <a:lstStyle/>
-          <a:p>
-            <a:pPr marL="342900" indent="-342900">
-              <a:lnSpc>
-                <a:spcPct val="150000"/>
-              </a:lnSpc>
-              <a:buFontTx/>
-              <a:buChar char="-"/>
-            </a:pPr>
-            <a:r>
-              <a:rPr lang="ko-KR" altLang="en-US" sz="2400" b="1" dirty="0">
-                <a:solidFill>
-                  <a:schemeClr val="bg2">
-                    <a:lumMod val="25000"/>
-                  </a:schemeClr>
-                </a:solidFill>
-              </a:rPr>
-              <a:t>서비스를 </a:t>
-            </a:r>
-            <a:r>
-              <a:rPr lang="ko-KR" altLang="en-US" sz="2400" b="1" dirty="0">
-                <a:solidFill>
-                  <a:srgbClr val="FF0000"/>
-                </a:solidFill>
-              </a:rPr>
-              <a:t>모바일로 확장</a:t>
-            </a:r>
-            <a:r>
-              <a:rPr lang="ko-KR" altLang="en-US" sz="2400" b="1" dirty="0">
-                <a:solidFill>
-                  <a:schemeClr val="bg2">
-                    <a:lumMod val="25000"/>
-                  </a:schemeClr>
-                </a:solidFill>
-              </a:rPr>
-              <a:t>하고자 할 때</a:t>
-            </a:r>
-            <a:endParaRPr lang="en-US" altLang="ko-KR" sz="2400" b="1" dirty="0">
-              <a:solidFill>
-                <a:schemeClr val="bg2">
-                  <a:lumMod val="25000"/>
-                </a:schemeClr>
-              </a:solidFill>
-            </a:endParaRPr>
-          </a:p>
-          <a:p>
-            <a:pPr marL="342900" indent="-342900">
-              <a:lnSpc>
-                <a:spcPct val="150000"/>
-              </a:lnSpc>
-              <a:buFontTx/>
-              <a:buChar char="-"/>
-            </a:pPr>
-            <a:r>
-              <a:rPr lang="en-US" altLang="ko-KR" sz="2400" b="1" dirty="0">
-                <a:solidFill>
-                  <a:schemeClr val="bg2">
-                    <a:lumMod val="25000"/>
-                  </a:schemeClr>
-                </a:solidFill>
-              </a:rPr>
-              <a:t>React</a:t>
-            </a:r>
-            <a:r>
-              <a:rPr lang="ko-KR" altLang="en-US" sz="2400" b="1" dirty="0">
-                <a:solidFill>
-                  <a:schemeClr val="bg2">
-                    <a:lumMod val="25000"/>
-                  </a:schemeClr>
-                </a:solidFill>
-              </a:rPr>
-              <a:t>의 넓은 커뮤니티 즉</a:t>
-            </a:r>
-            <a:r>
-              <a:rPr lang="en-US" altLang="ko-KR" sz="2400" b="1" dirty="0">
-                <a:solidFill>
-                  <a:schemeClr val="bg2">
-                    <a:lumMod val="25000"/>
-                  </a:schemeClr>
-                </a:solidFill>
-              </a:rPr>
-              <a:t>, </a:t>
-            </a:r>
-            <a:r>
-              <a:rPr lang="ko-KR" altLang="en-US" sz="2400" b="1" dirty="0">
-                <a:solidFill>
-                  <a:srgbClr val="FF0000"/>
-                </a:solidFill>
-              </a:rPr>
-              <a:t>오픈소스를 활용해서 빠르게 개발</a:t>
-            </a:r>
-            <a:r>
-              <a:rPr lang="ko-KR" altLang="en-US" sz="2400" b="1" dirty="0">
-                <a:solidFill>
-                  <a:schemeClr val="bg2">
-                    <a:lumMod val="25000"/>
-                  </a:schemeClr>
-                </a:solidFill>
-              </a:rPr>
-              <a:t>하고자 할 때 </a:t>
-            </a:r>
-            <a:endParaRPr lang="en-US" altLang="ko-KR" sz="2400" b="1" dirty="0">
-              <a:solidFill>
-                <a:schemeClr val="bg2">
-                  <a:lumMod val="25000"/>
-                </a:schemeClr>
-              </a:solidFill>
-            </a:endParaRPr>
-          </a:p>
-        </p:txBody>
-      </p:sp>
-      <p:sp>
-        <p:nvSpPr>
-          <p:cNvPr id="26" name="TextBox 25">
-            <a:extLst>
-              <a:ext uri="{FF2B5EF4-FFF2-40B4-BE49-F238E27FC236}">
-                <a16:creationId xmlns:a16="http://schemas.microsoft.com/office/drawing/2014/main" id="{99F1A16B-C332-41FF-9935-CCDD67A00B5F}"/>
-              </a:ext>
-            </a:extLst>
-          </p:cNvPr>
-          <p:cNvSpPr txBox="1"/>
-          <p:nvPr/>
-        </p:nvSpPr>
-        <p:spPr>
-          <a:xfrm>
-            <a:off x="1794074" y="1302241"/>
-            <a:ext cx="3972768" cy="523220"/>
-          </a:xfrm>
-          <a:prstGeom prst="rect">
-            <a:avLst/>
-          </a:prstGeom>
-          <a:noFill/>
-        </p:spPr>
-        <p:txBody>
-          <a:bodyPr wrap="square" rtlCol="0">
-            <a:spAutoFit/>
-          </a:bodyPr>
-          <a:lstStyle/>
-          <a:p>
-            <a:r>
-              <a:rPr lang="en-US" altLang="ko-KR" sz="2800" b="1" dirty="0"/>
-              <a:t>React</a:t>
-            </a:r>
-            <a:r>
-              <a:rPr lang="ko-KR" altLang="en-US" sz="2800" b="1" dirty="0"/>
-              <a:t>를 선택하는 경우</a:t>
-            </a:r>
-          </a:p>
-        </p:txBody>
-      </p:sp>
     </p:spTree>
     <p:extLst>
       <p:ext uri="{BB962C8B-B14F-4D97-AF65-F5344CB8AC3E}">
-        <p14:creationId xmlns:p14="http://schemas.microsoft.com/office/powerpoint/2010/main" val="3947103394"/>
+        <p14:creationId xmlns:p14="http://schemas.microsoft.com/office/powerpoint/2010/main" val="3609804837"/>
       </p:ext>
     </p:extLst>
   </p:cSld>

</xml_diff>